<commit_message>
Added Java sources and JavaDocs for some libraries
</commit_message>
<xml_diff>
--- a/doc/diagrams/UiComponent.pptx
+++ b/doc/diagrams/UiComponent.pptx
@@ -192,7 +192,7 @@
           <a:p>
             <a:fld id="{DC50A2AC-D691-437C-A69B-81ECFE08AD4B}" type="datetimeFigureOut">
               <a:rPr lang="en-SG" smtClean="0"/>
-              <a:t>9/7/2012</a:t>
+              <a:t>13/7/2012</a:t>
             </a:fld>
             <a:endParaRPr lang="en-SG"/>
           </a:p>
@@ -731,7 +731,7 @@
             <a:fld id="{1D8BD707-D9CF-40AE-B4C6-C98DA3205C09}" type="datetimeFigureOut">
               <a:rPr lang="en-US" smtClean="0"/>
               <a:pPr/>
-              <a:t>7/9/2012</a:t>
+              <a:t>7/13/2012</a:t>
             </a:fld>
             <a:endParaRPr lang="en-US"/>
           </a:p>
@@ -898,7 +898,7 @@
             <a:fld id="{1D8BD707-D9CF-40AE-B4C6-C98DA3205C09}" type="datetimeFigureOut">
               <a:rPr lang="en-US" smtClean="0"/>
               <a:pPr/>
-              <a:t>7/9/2012</a:t>
+              <a:t>7/13/2012</a:t>
             </a:fld>
             <a:endParaRPr lang="en-US"/>
           </a:p>
@@ -1075,7 +1075,7 @@
             <a:fld id="{1D8BD707-D9CF-40AE-B4C6-C98DA3205C09}" type="datetimeFigureOut">
               <a:rPr lang="en-US" smtClean="0"/>
               <a:pPr/>
-              <a:t>7/9/2012</a:t>
+              <a:t>7/13/2012</a:t>
             </a:fld>
             <a:endParaRPr lang="en-US"/>
           </a:p>
@@ -1242,7 +1242,7 @@
             <a:fld id="{1D8BD707-D9CF-40AE-B4C6-C98DA3205C09}" type="datetimeFigureOut">
               <a:rPr lang="en-US" smtClean="0"/>
               <a:pPr/>
-              <a:t>7/9/2012</a:t>
+              <a:t>7/13/2012</a:t>
             </a:fld>
             <a:endParaRPr lang="en-US"/>
           </a:p>
@@ -1485,7 +1485,7 @@
             <a:fld id="{1D8BD707-D9CF-40AE-B4C6-C98DA3205C09}" type="datetimeFigureOut">
               <a:rPr lang="en-US" smtClean="0"/>
               <a:pPr/>
-              <a:t>7/9/2012</a:t>
+              <a:t>7/13/2012</a:t>
             </a:fld>
             <a:endParaRPr lang="en-US"/>
           </a:p>
@@ -1770,7 +1770,7 @@
             <a:fld id="{1D8BD707-D9CF-40AE-B4C6-C98DA3205C09}" type="datetimeFigureOut">
               <a:rPr lang="en-US" smtClean="0"/>
               <a:pPr/>
-              <a:t>7/9/2012</a:t>
+              <a:t>7/13/2012</a:t>
             </a:fld>
             <a:endParaRPr lang="en-US"/>
           </a:p>
@@ -2189,7 +2189,7 @@
             <a:fld id="{1D8BD707-D9CF-40AE-B4C6-C98DA3205C09}" type="datetimeFigureOut">
               <a:rPr lang="en-US" smtClean="0"/>
               <a:pPr/>
-              <a:t>7/9/2012</a:t>
+              <a:t>7/13/2012</a:t>
             </a:fld>
             <a:endParaRPr lang="en-US"/>
           </a:p>
@@ -2304,7 +2304,7 @@
             <a:fld id="{1D8BD707-D9CF-40AE-B4C6-C98DA3205C09}" type="datetimeFigureOut">
               <a:rPr lang="en-US" smtClean="0"/>
               <a:pPr/>
-              <a:t>7/9/2012</a:t>
+              <a:t>7/13/2012</a:t>
             </a:fld>
             <a:endParaRPr lang="en-US"/>
           </a:p>
@@ -2396,7 +2396,7 @@
             <a:fld id="{1D8BD707-D9CF-40AE-B4C6-C98DA3205C09}" type="datetimeFigureOut">
               <a:rPr lang="en-US" smtClean="0"/>
               <a:pPr/>
-              <a:t>7/9/2012</a:t>
+              <a:t>7/13/2012</a:t>
             </a:fld>
             <a:endParaRPr lang="en-US"/>
           </a:p>
@@ -2670,7 +2670,7 @@
             <a:fld id="{1D8BD707-D9CF-40AE-B4C6-C98DA3205C09}" type="datetimeFigureOut">
               <a:rPr lang="en-US" smtClean="0"/>
               <a:pPr/>
-              <a:t>7/9/2012</a:t>
+              <a:t>7/13/2012</a:t>
             </a:fld>
             <a:endParaRPr lang="en-US"/>
           </a:p>
@@ -2920,7 +2920,7 @@
             <a:fld id="{1D8BD707-D9CF-40AE-B4C6-C98DA3205C09}" type="datetimeFigureOut">
               <a:rPr lang="en-US" smtClean="0"/>
               <a:pPr/>
-              <a:t>7/9/2012</a:t>
+              <a:t>7/13/2012</a:t>
             </a:fld>
             <a:endParaRPr lang="en-US"/>
           </a:p>
@@ -3130,7 +3130,7 @@
             <a:fld id="{1D8BD707-D9CF-40AE-B4C6-C98DA3205C09}" type="datetimeFigureOut">
               <a:rPr lang="en-US" smtClean="0"/>
               <a:pPr/>
-              <a:t>7/9/2012</a:t>
+              <a:t>7/13/2012</a:t>
             </a:fld>
             <a:endParaRPr lang="en-US"/>
           </a:p>
@@ -3674,7 +3674,7 @@
             <a:bodyPr rtlCol="0" anchor="t" anchorCtr="0"/>
             <a:lstStyle/>
             <a:p>
-              <a:pPr algn="ctr"/>
+              <a:pPr algn="r"/>
               <a:r>
                 <a:rPr lang="en-US" sz="1400" b="1" dirty="0" err="1" smtClean="0">
                   <a:solidFill>
@@ -3813,7 +3813,7 @@
             <a:bodyPr rtlCol="0" anchor="t" anchorCtr="0"/>
             <a:lstStyle/>
             <a:p>
-              <a:pPr algn="ctr"/>
+              <a:pPr algn="r"/>
               <a:r>
                 <a:rPr lang="en-US" sz="1400" b="1" dirty="0" smtClean="0">
                   <a:solidFill>
@@ -3899,486 +3899,21 @@
           </p:txBody>
         </p:sp>
       </p:grpSp>
-      <p:sp>
-        <p:nvSpPr>
-          <p:cNvPr id="197" name="Rectangle 196"/>
-          <p:cNvSpPr/>
-          <p:nvPr/>
-        </p:nvSpPr>
-        <p:spPr>
-          <a:xfrm>
-            <a:off x="3307242" y="1258887"/>
-            <a:ext cx="1466850" cy="377438"/>
-          </a:xfrm>
-          <a:prstGeom prst="rect">
-            <a:avLst/>
-          </a:prstGeom>
-        </p:spPr>
-        <p:style>
-          <a:lnRef idx="2">
-            <a:schemeClr val="accent2">
-              <a:shade val="50000"/>
-            </a:schemeClr>
-          </a:lnRef>
-          <a:fillRef idx="1">
-            <a:schemeClr val="accent2"/>
-          </a:fillRef>
-          <a:effectRef idx="0">
-            <a:schemeClr val="accent2"/>
-          </a:effectRef>
-          <a:fontRef idx="minor">
-            <a:schemeClr val="lt1"/>
-          </a:fontRef>
-        </p:style>
-        <p:txBody>
-          <a:bodyPr rtlCol="0" anchor="ctr"/>
-          <a:lstStyle/>
-          <a:p>
-            <a:pPr algn="ctr"/>
-            <a:r>
-              <a:rPr lang="en-US" sz="1600" b="1" dirty="0" err="1" smtClean="0"/>
-              <a:t>ActionServlet</a:t>
-            </a:r>
-            <a:endParaRPr lang="en-SG" sz="1600" b="1" dirty="0"/>
-          </a:p>
-        </p:txBody>
-      </p:sp>
-      <p:sp>
-        <p:nvSpPr>
-          <p:cNvPr id="198" name="Rectangle 197"/>
-          <p:cNvSpPr/>
-          <p:nvPr/>
-        </p:nvSpPr>
-        <p:spPr>
-          <a:xfrm>
-            <a:off x="2716692" y="1988128"/>
-            <a:ext cx="1466850" cy="609600"/>
-          </a:xfrm>
-          <a:prstGeom prst="rect">
-            <a:avLst/>
-          </a:prstGeom>
-        </p:spPr>
-        <p:style>
-          <a:lnRef idx="2">
-            <a:schemeClr val="accent2">
-              <a:shade val="50000"/>
-            </a:schemeClr>
-          </a:lnRef>
-          <a:fillRef idx="1">
-            <a:schemeClr val="accent2"/>
-          </a:fillRef>
-          <a:effectRef idx="0">
-            <a:schemeClr val="accent2"/>
-          </a:effectRef>
-          <a:fontRef idx="minor">
-            <a:schemeClr val="lt1"/>
-          </a:fontRef>
-        </p:style>
-        <p:txBody>
-          <a:bodyPr rtlCol="0" anchor="ctr"/>
-          <a:lstStyle/>
-          <a:p>
-            <a:pPr algn="ctr"/>
-            <a:r>
-              <a:rPr lang="en-US" sz="1600" b="1" dirty="0" smtClean="0"/>
-              <a:t>_</a:t>
-            </a:r>
-            <a:r>
-              <a:rPr lang="en-US" sz="1600" b="1" dirty="0" err="1" smtClean="0"/>
-              <a:t>xyz_Servlet</a:t>
-            </a:r>
-            <a:endParaRPr lang="en-SG" sz="1600" b="1" dirty="0"/>
-          </a:p>
-        </p:txBody>
-      </p:sp>
-      <p:sp>
-        <p:nvSpPr>
-          <p:cNvPr id="199" name="Isosceles Triangle 198"/>
-          <p:cNvSpPr/>
-          <p:nvPr/>
-        </p:nvSpPr>
-        <p:spPr>
-          <a:xfrm>
-            <a:off x="3900729" y="1639887"/>
-            <a:ext cx="276225" cy="228600"/>
-          </a:xfrm>
-          <a:prstGeom prst="triangle">
-            <a:avLst/>
-          </a:prstGeom>
-        </p:spPr>
-        <p:style>
-          <a:lnRef idx="2">
-            <a:schemeClr val="accent2">
-              <a:shade val="50000"/>
-            </a:schemeClr>
-          </a:lnRef>
-          <a:fillRef idx="1">
-            <a:schemeClr val="accent2"/>
-          </a:fillRef>
-          <a:effectRef idx="0">
-            <a:schemeClr val="accent2"/>
-          </a:effectRef>
-          <a:fontRef idx="minor">
-            <a:schemeClr val="lt1"/>
-          </a:fontRef>
-        </p:style>
-        <p:txBody>
-          <a:bodyPr rtlCol="0" anchor="ctr"/>
-          <a:lstStyle/>
-          <a:p>
-            <a:pPr algn="ctr"/>
-            <a:endParaRPr lang="en-SG"/>
-          </a:p>
-        </p:txBody>
-      </p:sp>
-      <p:sp>
-        <p:nvSpPr>
-          <p:cNvPr id="200" name="Rectangle 199"/>
-          <p:cNvSpPr/>
-          <p:nvPr/>
-        </p:nvSpPr>
-        <p:spPr>
-          <a:xfrm>
-            <a:off x="5468615" y="1988128"/>
-            <a:ext cx="1466850" cy="609600"/>
-          </a:xfrm>
-          <a:prstGeom prst="rect">
-            <a:avLst/>
-          </a:prstGeom>
-        </p:spPr>
-        <p:style>
-          <a:lnRef idx="2">
-            <a:schemeClr val="accent6">
-              <a:shade val="50000"/>
-            </a:schemeClr>
-          </a:lnRef>
-          <a:fillRef idx="1">
-            <a:schemeClr val="accent6"/>
-          </a:fillRef>
-          <a:effectRef idx="0">
-            <a:schemeClr val="accent6"/>
-          </a:effectRef>
-          <a:fontRef idx="minor">
-            <a:schemeClr val="lt1"/>
-          </a:fontRef>
-        </p:style>
-        <p:txBody>
-          <a:bodyPr rtlCol="0" anchor="ctr"/>
-          <a:lstStyle/>
-          <a:p>
-            <a:pPr algn="ctr"/>
-            <a:r>
-              <a:rPr lang="en-US" sz="1600" b="1" dirty="0" smtClean="0"/>
-              <a:t>_</a:t>
-            </a:r>
-            <a:r>
-              <a:rPr lang="en-US" sz="1600" b="1" dirty="0" err="1" smtClean="0"/>
-              <a:t>xyz_Helper</a:t>
-            </a:r>
-            <a:endParaRPr lang="en-SG" sz="1600" b="1" dirty="0"/>
-          </a:p>
-        </p:txBody>
-      </p:sp>
       <p:cxnSp>
         <p:nvCxnSpPr>
-          <p:cNvPr id="201" name="Elbow Connector 200"/>
-          <p:cNvCxnSpPr>
-            <a:stCxn id="199" idx="3"/>
-          </p:cNvCxnSpPr>
+          <p:cNvPr id="208" name="Straight Arrow Connector 207"/>
+          <p:cNvCxnSpPr/>
           <p:nvPr/>
         </p:nvCxnSpPr>
         <p:spPr>
-          <a:xfrm rot="16200000" flipH="1">
-            <a:off x="3972179" y="1935150"/>
-            <a:ext cx="134239" cy="912"/>
-          </a:xfrm>
-          <a:prstGeom prst="bentConnector3">
-            <a:avLst/>
-          </a:prstGeom>
-        </p:spPr>
-        <p:style>
-          <a:lnRef idx="2">
-            <a:schemeClr val="accent2">
-              <a:shade val="50000"/>
-            </a:schemeClr>
-          </a:lnRef>
-          <a:fillRef idx="1">
-            <a:schemeClr val="accent2"/>
-          </a:fillRef>
-          <a:effectRef idx="0">
-            <a:schemeClr val="accent2"/>
-          </a:effectRef>
-          <a:fontRef idx="minor">
-            <a:schemeClr val="lt1"/>
-          </a:fontRef>
-        </p:style>
-      </p:cxnSp>
-      <p:sp>
-        <p:nvSpPr>
-          <p:cNvPr id="202" name="Rectangle 201"/>
-          <p:cNvSpPr/>
-          <p:nvPr/>
-        </p:nvSpPr>
-        <p:spPr>
-          <a:xfrm>
-            <a:off x="5480901" y="1258887"/>
-            <a:ext cx="1454388" cy="373296"/>
-          </a:xfrm>
-          <a:prstGeom prst="rect">
-            <a:avLst/>
-          </a:prstGeom>
-        </p:spPr>
-        <p:style>
-          <a:lnRef idx="2">
-            <a:schemeClr val="accent6">
-              <a:shade val="50000"/>
-            </a:schemeClr>
-          </a:lnRef>
-          <a:fillRef idx="1">
-            <a:schemeClr val="accent6"/>
-          </a:fillRef>
-          <a:effectRef idx="0">
-            <a:schemeClr val="accent6"/>
-          </a:effectRef>
-          <a:fontRef idx="minor">
-            <a:schemeClr val="lt1"/>
-          </a:fontRef>
-        </p:style>
-        <p:txBody>
-          <a:bodyPr rtlCol="0" anchor="ctr"/>
-          <a:lstStyle/>
-          <a:p>
-            <a:pPr algn="ctr"/>
-            <a:r>
-              <a:rPr lang="en-US" sz="1600" b="1" dirty="0" smtClean="0"/>
-              <a:t>Helper</a:t>
-            </a:r>
-            <a:endParaRPr lang="en-SG" sz="1600" b="1" dirty="0"/>
-          </a:p>
-        </p:txBody>
-      </p:sp>
-      <p:sp>
-        <p:nvSpPr>
-          <p:cNvPr id="203" name="Isosceles Triangle 202"/>
-          <p:cNvSpPr/>
-          <p:nvPr/>
-        </p:nvSpPr>
-        <p:spPr>
-          <a:xfrm>
-            <a:off x="6061435" y="1620902"/>
-            <a:ext cx="276225" cy="228600"/>
-          </a:xfrm>
-          <a:prstGeom prst="triangle">
-            <a:avLst/>
-          </a:prstGeom>
-        </p:spPr>
-        <p:style>
-          <a:lnRef idx="2">
-            <a:schemeClr val="accent6">
-              <a:shade val="50000"/>
-            </a:schemeClr>
-          </a:lnRef>
-          <a:fillRef idx="1">
-            <a:schemeClr val="accent6"/>
-          </a:fillRef>
-          <a:effectRef idx="0">
-            <a:schemeClr val="accent6"/>
-          </a:effectRef>
-          <a:fontRef idx="minor">
-            <a:schemeClr val="lt1"/>
-          </a:fontRef>
-        </p:style>
-        <p:txBody>
-          <a:bodyPr rtlCol="0" anchor="ctr"/>
-          <a:lstStyle/>
-          <a:p>
-            <a:pPr algn="ctr"/>
-            <a:endParaRPr lang="en-SG"/>
-          </a:p>
-        </p:txBody>
-      </p:sp>
-      <p:cxnSp>
-        <p:nvCxnSpPr>
-          <p:cNvPr id="204" name="Elbow Connector 203"/>
-          <p:cNvCxnSpPr>
-            <a:stCxn id="203" idx="3"/>
-            <a:endCxn id="200" idx="0"/>
-          </p:cNvCxnSpPr>
-          <p:nvPr/>
-        </p:nvCxnSpPr>
-        <p:spPr>
-          <a:xfrm rot="16200000" flipH="1">
-            <a:off x="6131481" y="1917569"/>
-            <a:ext cx="138626" cy="2492"/>
+          <a:xfrm rot="5400000" flipH="1" flipV="1">
+            <a:off x="2763103" y="-863835"/>
+            <a:ext cx="1266442" cy="4896113"/>
           </a:xfrm>
           <a:prstGeom prst="bentConnector3">
             <a:avLst>
-              <a:gd name="adj1" fmla="val 50000"/>
+              <a:gd name="adj1" fmla="val 129932"/>
             </a:avLst>
-          </a:prstGeom>
-        </p:spPr>
-        <p:style>
-          <a:lnRef idx="2">
-            <a:schemeClr val="accent6">
-              <a:shade val="50000"/>
-            </a:schemeClr>
-          </a:lnRef>
-          <a:fillRef idx="1">
-            <a:schemeClr val="accent6"/>
-          </a:fillRef>
-          <a:effectRef idx="0">
-            <a:schemeClr val="accent6"/>
-          </a:effectRef>
-          <a:fontRef idx="minor">
-            <a:schemeClr val="lt1"/>
-          </a:fontRef>
-        </p:style>
-      </p:cxnSp>
-      <p:sp>
-        <p:nvSpPr>
-          <p:cNvPr id="205" name="Folded Corner 204"/>
-          <p:cNvSpPr/>
-          <p:nvPr/>
-        </p:nvSpPr>
-        <p:spPr>
-          <a:xfrm>
-            <a:off x="5468438" y="3614677"/>
-            <a:ext cx="1466850" cy="609600"/>
-          </a:xfrm>
-          <a:prstGeom prst="foldedCorner">
-            <a:avLst/>
-          </a:prstGeom>
-        </p:spPr>
-        <p:style>
-          <a:lnRef idx="2">
-            <a:schemeClr val="accent4">
-              <a:shade val="50000"/>
-            </a:schemeClr>
-          </a:lnRef>
-          <a:fillRef idx="1">
-            <a:schemeClr val="accent4"/>
-          </a:fillRef>
-          <a:effectRef idx="0">
-            <a:schemeClr val="accent4"/>
-          </a:effectRef>
-          <a:fontRef idx="minor">
-            <a:schemeClr val="lt1"/>
-          </a:fontRef>
-        </p:style>
-        <p:txBody>
-          <a:bodyPr rtlCol="0" anchor="ctr"/>
-          <a:lstStyle/>
-          <a:p>
-            <a:pPr algn="ctr"/>
-            <a:r>
-              <a:rPr lang="en-US" sz="1600" b="1" dirty="0" smtClean="0"/>
-              <a:t>_xyz_.</a:t>
-            </a:r>
-            <a:r>
-              <a:rPr lang="en-US" sz="1600" b="1" dirty="0" err="1" smtClean="0"/>
-              <a:t>jsp</a:t>
-            </a:r>
-            <a:endParaRPr lang="en-SG" sz="1600" b="1" dirty="0"/>
-          </a:p>
-        </p:txBody>
-      </p:sp>
-      <p:cxnSp>
-        <p:nvCxnSpPr>
-          <p:cNvPr id="206" name="Straight Arrow Connector 205"/>
-          <p:cNvCxnSpPr>
-            <a:stCxn id="198" idx="3"/>
-            <a:endCxn id="200" idx="1"/>
-          </p:cNvCxnSpPr>
-          <p:nvPr/>
-        </p:nvCxnSpPr>
-        <p:spPr>
-          <a:xfrm>
-            <a:off x="4183542" y="2292928"/>
-            <a:ext cx="1285073" cy="0"/>
-          </a:xfrm>
-          <a:prstGeom prst="straightConnector1">
-            <a:avLst/>
-          </a:prstGeom>
-          <a:ln w="38100">
-            <a:solidFill>
-              <a:schemeClr val="accent2">
-                <a:lumMod val="75000"/>
-              </a:schemeClr>
-            </a:solidFill>
-            <a:prstDash val="sysDot"/>
-            <a:tailEnd type="arrow"/>
-          </a:ln>
-        </p:spPr>
-        <p:style>
-          <a:lnRef idx="1">
-            <a:schemeClr val="accent1"/>
-          </a:lnRef>
-          <a:fillRef idx="0">
-            <a:schemeClr val="accent1"/>
-          </a:fillRef>
-          <a:effectRef idx="0">
-            <a:schemeClr val="accent1"/>
-          </a:effectRef>
-          <a:fontRef idx="minor">
-            <a:schemeClr val="tx1"/>
-          </a:fontRef>
-        </p:style>
-      </p:cxnSp>
-      <p:cxnSp>
-        <p:nvCxnSpPr>
-          <p:cNvPr id="207" name="Elbow Connector 206"/>
-          <p:cNvCxnSpPr>
-            <a:stCxn id="205" idx="0"/>
-          </p:cNvCxnSpPr>
-          <p:nvPr/>
-        </p:nvCxnSpPr>
-        <p:spPr>
-          <a:xfrm rot="16200000" flipV="1">
-            <a:off x="5733726" y="3146540"/>
-            <a:ext cx="933958" cy="2316"/>
-          </a:xfrm>
-          <a:prstGeom prst="bentConnector3">
-            <a:avLst>
-              <a:gd name="adj1" fmla="val 50000"/>
-            </a:avLst>
-          </a:prstGeom>
-          <a:ln>
-            <a:prstDash val="sysDot"/>
-            <a:tailEnd type="arrow"/>
-          </a:ln>
-        </p:spPr>
-        <p:style>
-          <a:lnRef idx="2">
-            <a:schemeClr val="accent4">
-              <a:shade val="50000"/>
-            </a:schemeClr>
-          </a:lnRef>
-          <a:fillRef idx="1">
-            <a:schemeClr val="accent4"/>
-          </a:fillRef>
-          <a:effectRef idx="0">
-            <a:schemeClr val="accent4"/>
-          </a:effectRef>
-          <a:fontRef idx="minor">
-            <a:schemeClr val="lt1"/>
-          </a:fontRef>
-        </p:style>
-      </p:cxnSp>
-      <p:cxnSp>
-        <p:nvCxnSpPr>
-          <p:cNvPr id="208" name="Straight Arrow Connector 207"/>
-          <p:cNvCxnSpPr>
-            <a:stCxn id="209" idx="3"/>
-          </p:cNvCxnSpPr>
-          <p:nvPr/>
-        </p:nvCxnSpPr>
-        <p:spPr>
-          <a:xfrm flipV="1">
-            <a:off x="1351501" y="2369128"/>
-            <a:ext cx="1405115" cy="2203"/>
-          </a:xfrm>
-          <a:prstGeom prst="straightConnector1">
-            <a:avLst/>
           </a:prstGeom>
           <a:ln w="38100">
             <a:solidFill>
@@ -4528,13 +4063,232 @@
       </p:sp>
       <p:sp>
         <p:nvSpPr>
-          <p:cNvPr id="210" name="TextBox 209"/>
+          <p:cNvPr id="211" name="Folded Corner 210"/>
+          <p:cNvSpPr/>
+          <p:nvPr/>
+        </p:nvSpPr>
+        <p:spPr>
+          <a:xfrm>
+            <a:off x="261200" y="2597729"/>
+            <a:ext cx="1143000" cy="1405783"/>
+          </a:xfrm>
+          <a:prstGeom prst="foldedCorner">
+            <a:avLst/>
+          </a:prstGeom>
+          <a:solidFill>
+            <a:schemeClr val="bg1"/>
+          </a:solidFill>
+          <a:ln>
+            <a:solidFill>
+              <a:schemeClr val="tx1"/>
+            </a:solidFill>
+          </a:ln>
+        </p:spPr>
+        <p:style>
+          <a:lnRef idx="2">
+            <a:schemeClr val="accent4">
+              <a:shade val="50000"/>
+            </a:schemeClr>
+          </a:lnRef>
+          <a:fillRef idx="1">
+            <a:schemeClr val="accent4"/>
+          </a:fillRef>
+          <a:effectRef idx="0">
+            <a:schemeClr val="accent4"/>
+          </a:effectRef>
+          <a:fontRef idx="minor">
+            <a:schemeClr val="lt1"/>
+          </a:fontRef>
+        </p:style>
+        <p:txBody>
+          <a:bodyPr rtlCol="0" anchor="ctr"/>
+          <a:lstStyle/>
+          <a:p>
+            <a:pPr algn="ctr"/>
+            <a:r>
+              <a:rPr lang="en-US" sz="1600" b="1" dirty="0" smtClean="0">
+                <a:solidFill>
+                  <a:schemeClr val="tx1"/>
+                </a:solidFill>
+              </a:rPr>
+              <a:t>Web page</a:t>
+            </a:r>
+            <a:endParaRPr lang="en-SG" sz="1600" b="1" dirty="0">
+              <a:solidFill>
+                <a:schemeClr val="tx1"/>
+              </a:solidFill>
+            </a:endParaRPr>
+          </a:p>
+        </p:txBody>
+      </p:sp>
+      <p:grpSp>
+        <p:nvGrpSpPr>
+          <p:cNvPr id="30" name="Group 29"/>
+          <p:cNvGrpSpPr/>
+          <p:nvPr/>
+        </p:nvGrpSpPr>
+        <p:grpSpPr>
+          <a:xfrm>
+            <a:off x="2851680" y="3965768"/>
+            <a:ext cx="1640617" cy="609600"/>
+            <a:chOff x="2904698" y="3849687"/>
+            <a:chExt cx="1640617" cy="609600"/>
+          </a:xfrm>
+        </p:grpSpPr>
+        <p:sp>
+          <p:nvSpPr>
+            <p:cNvPr id="213" name="Folded Corner 212"/>
+            <p:cNvSpPr/>
+            <p:nvPr/>
+          </p:nvSpPr>
+          <p:spPr>
+            <a:xfrm>
+              <a:off x="2904698" y="3849687"/>
+              <a:ext cx="1464715" cy="420881"/>
+            </a:xfrm>
+            <a:prstGeom prst="foldedCorner">
+              <a:avLst/>
+            </a:prstGeom>
+          </p:spPr>
+          <p:style>
+            <a:lnRef idx="2">
+              <a:schemeClr val="accent3">
+                <a:shade val="50000"/>
+              </a:schemeClr>
+            </a:lnRef>
+            <a:fillRef idx="1">
+              <a:schemeClr val="accent3"/>
+            </a:fillRef>
+            <a:effectRef idx="0">
+              <a:schemeClr val="accent3"/>
+            </a:effectRef>
+            <a:fontRef idx="minor">
+              <a:schemeClr val="lt1"/>
+            </a:fontRef>
+          </p:style>
+          <p:txBody>
+            <a:bodyPr rtlCol="0" anchor="ctr"/>
+            <a:lstStyle/>
+            <a:p>
+              <a:pPr algn="ctr"/>
+              <a:r>
+                <a:rPr lang="en-US" sz="1600" b="1" dirty="0" smtClean="0"/>
+                <a:t>*.</a:t>
+              </a:r>
+              <a:r>
+                <a:rPr lang="en-US" sz="1600" b="1" dirty="0" err="1" smtClean="0"/>
+                <a:t>js</a:t>
+              </a:r>
+              <a:endParaRPr lang="en-SG" sz="1600" b="1" dirty="0"/>
+            </a:p>
+          </p:txBody>
+        </p:sp>
+        <p:sp>
+          <p:nvSpPr>
+            <p:cNvPr id="214" name="Folded Corner 213"/>
+            <p:cNvSpPr/>
+            <p:nvPr/>
+          </p:nvSpPr>
+          <p:spPr>
+            <a:xfrm>
+              <a:off x="3004400" y="3935145"/>
+              <a:ext cx="1464715" cy="420881"/>
+            </a:xfrm>
+            <a:prstGeom prst="foldedCorner">
+              <a:avLst/>
+            </a:prstGeom>
+          </p:spPr>
+          <p:style>
+            <a:lnRef idx="2">
+              <a:schemeClr val="accent3">
+                <a:shade val="50000"/>
+              </a:schemeClr>
+            </a:lnRef>
+            <a:fillRef idx="1">
+              <a:schemeClr val="accent3"/>
+            </a:fillRef>
+            <a:effectRef idx="0">
+              <a:schemeClr val="accent3"/>
+            </a:effectRef>
+            <a:fontRef idx="minor">
+              <a:schemeClr val="lt1"/>
+            </a:fontRef>
+          </p:style>
+          <p:txBody>
+            <a:bodyPr rtlCol="0" anchor="ctr"/>
+            <a:lstStyle/>
+            <a:p>
+              <a:pPr algn="ctr"/>
+              <a:r>
+                <a:rPr lang="en-US" sz="1600" b="1" dirty="0" smtClean="0"/>
+                <a:t>*.</a:t>
+              </a:r>
+              <a:r>
+                <a:rPr lang="en-US" sz="1600" b="1" dirty="0" err="1" smtClean="0"/>
+                <a:t>js</a:t>
+              </a:r>
+              <a:endParaRPr lang="en-SG" sz="1600" b="1" dirty="0"/>
+            </a:p>
+          </p:txBody>
+        </p:sp>
+        <p:sp>
+          <p:nvSpPr>
+            <p:cNvPr id="215" name="Folded Corner 214"/>
+            <p:cNvSpPr/>
+            <p:nvPr/>
+          </p:nvSpPr>
+          <p:spPr>
+            <a:xfrm>
+              <a:off x="3080600" y="4038406"/>
+              <a:ext cx="1464715" cy="420881"/>
+            </a:xfrm>
+            <a:prstGeom prst="foldedCorner">
+              <a:avLst/>
+            </a:prstGeom>
+          </p:spPr>
+          <p:style>
+            <a:lnRef idx="2">
+              <a:schemeClr val="accent3">
+                <a:shade val="50000"/>
+              </a:schemeClr>
+            </a:lnRef>
+            <a:fillRef idx="1">
+              <a:schemeClr val="accent3"/>
+            </a:fillRef>
+            <a:effectRef idx="0">
+              <a:schemeClr val="accent3"/>
+            </a:effectRef>
+            <a:fontRef idx="minor">
+              <a:schemeClr val="lt1"/>
+            </a:fontRef>
+          </p:style>
+          <p:txBody>
+            <a:bodyPr rtlCol="0" anchor="ctr"/>
+            <a:lstStyle/>
+            <a:p>
+              <a:pPr algn="ctr"/>
+              <a:r>
+                <a:rPr lang="en-US" sz="1600" b="1" dirty="0" smtClean="0"/>
+                <a:t>*.</a:t>
+              </a:r>
+              <a:r>
+                <a:rPr lang="en-US" sz="1600" b="1" dirty="0" err="1" smtClean="0"/>
+                <a:t>js</a:t>
+              </a:r>
+              <a:endParaRPr lang="en-SG" sz="1600" b="1" dirty="0"/>
+            </a:p>
+          </p:txBody>
+        </p:sp>
+      </p:grpSp>
+      <p:sp>
+        <p:nvSpPr>
+          <p:cNvPr id="217" name="TextBox 216"/>
           <p:cNvSpPr txBox="1"/>
           <p:nvPr/>
         </p:nvSpPr>
         <p:spPr>
           <a:xfrm>
-            <a:off x="4411073" y="1985151"/>
+            <a:off x="2471000" y="3399481"/>
             <a:ext cx="1066800" cy="307777"/>
           </a:xfrm>
           <a:prstGeom prst="rect">
@@ -4634,295 +4388,194 @@
           <a:p>
             <a:pPr algn="r"/>
             <a:r>
-              <a:rPr lang="en-US" dirty="0" smtClean="0">
-                <a:solidFill>
-                  <a:schemeClr val="accent2">
-                    <a:lumMod val="75000"/>
-                  </a:schemeClr>
-                </a:solidFill>
-              </a:rPr>
+              <a:rPr lang="en-US" dirty="0" smtClean="0"/>
               <a:t>&lt;&lt;create&gt;&gt;</a:t>
             </a:r>
-            <a:endParaRPr lang="en-SG" dirty="0">
-              <a:solidFill>
-                <a:schemeClr val="accent2">
-                  <a:lumMod val="75000"/>
-                </a:schemeClr>
-              </a:solidFill>
-            </a:endParaRPr>
-          </a:p>
-        </p:txBody>
-      </p:sp>
-      <p:sp>
-        <p:nvSpPr>
-          <p:cNvPr id="211" name="Folded Corner 210"/>
-          <p:cNvSpPr/>
+            <a:endParaRPr lang="en-SG" dirty="0"/>
+          </a:p>
+        </p:txBody>
+      </p:sp>
+      <p:grpSp>
+        <p:nvGrpSpPr>
+          <p:cNvPr id="31" name="Group 30"/>
+          <p:cNvGrpSpPr/>
           <p:nvPr/>
-        </p:nvSpPr>
+        </p:nvGrpSpPr>
+        <p:grpSpPr>
+          <a:xfrm>
+            <a:off x="2938936" y="4759593"/>
+            <a:ext cx="1545900" cy="527703"/>
+            <a:chOff x="2928200" y="4617384"/>
+            <a:chExt cx="1545900" cy="527703"/>
+          </a:xfrm>
+        </p:grpSpPr>
+        <p:sp>
+          <p:nvSpPr>
+            <p:cNvPr id="212" name="Folded Corner 211"/>
+            <p:cNvSpPr/>
+            <p:nvPr/>
+          </p:nvSpPr>
+          <p:spPr>
+            <a:xfrm>
+              <a:off x="2928200" y="4617384"/>
+              <a:ext cx="1464715" cy="374591"/>
+            </a:xfrm>
+            <a:prstGeom prst="foldedCorner">
+              <a:avLst/>
+            </a:prstGeom>
+          </p:spPr>
+          <p:style>
+            <a:lnRef idx="2">
+              <a:schemeClr val="accent5">
+                <a:shade val="50000"/>
+              </a:schemeClr>
+            </a:lnRef>
+            <a:fillRef idx="1">
+              <a:schemeClr val="accent5"/>
+            </a:fillRef>
+            <a:effectRef idx="0">
+              <a:schemeClr val="accent5"/>
+            </a:effectRef>
+            <a:fontRef idx="minor">
+              <a:schemeClr val="lt1"/>
+            </a:fontRef>
+          </p:style>
+          <p:txBody>
+            <a:bodyPr rtlCol="0" anchor="ctr"/>
+            <a:lstStyle/>
+            <a:p>
+              <a:pPr algn="ctr"/>
+              <a:r>
+                <a:rPr lang="en-US" sz="1600" b="1" dirty="0" smtClean="0"/>
+                <a:t>*.</a:t>
+              </a:r>
+              <a:r>
+                <a:rPr lang="en-US" sz="1600" b="1" dirty="0" err="1" smtClean="0"/>
+                <a:t>css</a:t>
+              </a:r>
+              <a:endParaRPr lang="en-SG" sz="1600" b="1" dirty="0"/>
+            </a:p>
+          </p:txBody>
+        </p:sp>
+        <p:sp>
+          <p:nvSpPr>
+            <p:cNvPr id="218" name="Folded Corner 217"/>
+            <p:cNvSpPr/>
+            <p:nvPr/>
+          </p:nvSpPr>
+          <p:spPr>
+            <a:xfrm>
+              <a:off x="2967369" y="4699993"/>
+              <a:ext cx="1464715" cy="374591"/>
+            </a:xfrm>
+            <a:prstGeom prst="foldedCorner">
+              <a:avLst/>
+            </a:prstGeom>
+          </p:spPr>
+          <p:style>
+            <a:lnRef idx="2">
+              <a:schemeClr val="accent5">
+                <a:shade val="50000"/>
+              </a:schemeClr>
+            </a:lnRef>
+            <a:fillRef idx="1">
+              <a:schemeClr val="accent5"/>
+            </a:fillRef>
+            <a:effectRef idx="0">
+              <a:schemeClr val="accent5"/>
+            </a:effectRef>
+            <a:fontRef idx="minor">
+              <a:schemeClr val="lt1"/>
+            </a:fontRef>
+          </p:style>
+          <p:txBody>
+            <a:bodyPr rtlCol="0" anchor="ctr"/>
+            <a:lstStyle/>
+            <a:p>
+              <a:pPr algn="ctr"/>
+              <a:r>
+                <a:rPr lang="en-US" sz="1600" b="1" dirty="0" smtClean="0"/>
+                <a:t>*.</a:t>
+              </a:r>
+              <a:r>
+                <a:rPr lang="en-US" sz="1600" b="1" dirty="0" err="1" smtClean="0"/>
+                <a:t>css</a:t>
+              </a:r>
+              <a:endParaRPr lang="en-SG" sz="1600" b="1" dirty="0"/>
+            </a:p>
+          </p:txBody>
+        </p:sp>
+        <p:sp>
+          <p:nvSpPr>
+            <p:cNvPr id="219" name="Folded Corner 218"/>
+            <p:cNvSpPr/>
+            <p:nvPr/>
+          </p:nvSpPr>
+          <p:spPr>
+            <a:xfrm>
+              <a:off x="3009385" y="4770496"/>
+              <a:ext cx="1464715" cy="374591"/>
+            </a:xfrm>
+            <a:prstGeom prst="foldedCorner">
+              <a:avLst/>
+            </a:prstGeom>
+          </p:spPr>
+          <p:style>
+            <a:lnRef idx="2">
+              <a:schemeClr val="accent5">
+                <a:shade val="50000"/>
+              </a:schemeClr>
+            </a:lnRef>
+            <a:fillRef idx="1">
+              <a:schemeClr val="accent5"/>
+            </a:fillRef>
+            <a:effectRef idx="0">
+              <a:schemeClr val="accent5"/>
+            </a:effectRef>
+            <a:fontRef idx="minor">
+              <a:schemeClr val="lt1"/>
+            </a:fontRef>
+          </p:style>
+          <p:txBody>
+            <a:bodyPr rtlCol="0" anchor="ctr"/>
+            <a:lstStyle/>
+            <a:p>
+              <a:pPr algn="ctr"/>
+              <a:r>
+                <a:rPr lang="en-US" sz="1600" b="1" dirty="0" smtClean="0"/>
+                <a:t>*.</a:t>
+              </a:r>
+              <a:r>
+                <a:rPr lang="en-US" sz="1600" b="1" dirty="0" err="1" smtClean="0"/>
+                <a:t>css</a:t>
+              </a:r>
+              <a:endParaRPr lang="en-SG" sz="1600" b="1" dirty="0"/>
+            </a:p>
+          </p:txBody>
+        </p:sp>
+      </p:grpSp>
+      <p:cxnSp>
+        <p:nvCxnSpPr>
+          <p:cNvPr id="220" name="Elbow Connector 219"/>
+          <p:cNvCxnSpPr>
+            <a:stCxn id="211" idx="2"/>
+            <a:endCxn id="215" idx="1"/>
+          </p:cNvCxnSpPr>
+          <p:nvPr/>
+        </p:nvCxnSpPr>
         <p:spPr>
-          <a:xfrm>
-            <a:off x="261200" y="2597729"/>
-            <a:ext cx="1143000" cy="1405783"/>
+          <a:xfrm rot="16200000" flipH="1">
+            <a:off x="1749433" y="3086779"/>
+            <a:ext cx="361416" cy="2194882"/>
           </a:xfrm>
-          <a:prstGeom prst="foldedCorner">
+          <a:prstGeom prst="bentConnector2">
             <a:avLst/>
           </a:prstGeom>
-          <a:solidFill>
-            <a:schemeClr val="bg1"/>
-          </a:solidFill>
           <a:ln>
             <a:solidFill>
               <a:schemeClr val="tx1"/>
             </a:solidFill>
-          </a:ln>
-        </p:spPr>
-        <p:style>
-          <a:lnRef idx="2">
-            <a:schemeClr val="accent4">
-              <a:shade val="50000"/>
-            </a:schemeClr>
-          </a:lnRef>
-          <a:fillRef idx="1">
-            <a:schemeClr val="accent4"/>
-          </a:fillRef>
-          <a:effectRef idx="0">
-            <a:schemeClr val="accent4"/>
-          </a:effectRef>
-          <a:fontRef idx="minor">
-            <a:schemeClr val="lt1"/>
-          </a:fontRef>
-        </p:style>
-        <p:txBody>
-          <a:bodyPr rtlCol="0" anchor="ctr"/>
-          <a:lstStyle/>
-          <a:p>
-            <a:pPr algn="ctr"/>
-            <a:r>
-              <a:rPr lang="en-US" sz="1600" b="1" dirty="0" smtClean="0">
-                <a:solidFill>
-                  <a:schemeClr val="tx1"/>
-                </a:solidFill>
-              </a:rPr>
-              <a:t>Web page</a:t>
-            </a:r>
-            <a:endParaRPr lang="en-SG" sz="1600" b="1" dirty="0">
-              <a:solidFill>
-                <a:schemeClr val="tx1"/>
-              </a:solidFill>
-            </a:endParaRPr>
-          </a:p>
-        </p:txBody>
-      </p:sp>
-      <p:sp>
-        <p:nvSpPr>
-          <p:cNvPr id="212" name="Folded Corner 211"/>
-          <p:cNvSpPr/>
-          <p:nvPr/>
-        </p:nvSpPr>
-        <p:spPr>
-          <a:xfrm>
-            <a:off x="2928200" y="4617384"/>
-            <a:ext cx="1464715" cy="374591"/>
-          </a:xfrm>
-          <a:prstGeom prst="foldedCorner">
-            <a:avLst/>
-          </a:prstGeom>
-        </p:spPr>
-        <p:style>
-          <a:lnRef idx="2">
-            <a:schemeClr val="accent5">
-              <a:shade val="50000"/>
-            </a:schemeClr>
-          </a:lnRef>
-          <a:fillRef idx="1">
-            <a:schemeClr val="accent5"/>
-          </a:fillRef>
-          <a:effectRef idx="0">
-            <a:schemeClr val="accent5"/>
-          </a:effectRef>
-          <a:fontRef idx="minor">
-            <a:schemeClr val="lt1"/>
-          </a:fontRef>
-        </p:style>
-        <p:txBody>
-          <a:bodyPr rtlCol="0" anchor="ctr"/>
-          <a:lstStyle/>
-          <a:p>
-            <a:pPr algn="ctr"/>
-            <a:r>
-              <a:rPr lang="en-US" sz="1600" b="1" dirty="0" smtClean="0"/>
-              <a:t>*.</a:t>
-            </a:r>
-            <a:r>
-              <a:rPr lang="en-US" sz="1600" b="1" dirty="0" err="1" smtClean="0"/>
-              <a:t>css</a:t>
-            </a:r>
-            <a:endParaRPr lang="en-SG" sz="1600" b="1" dirty="0"/>
-          </a:p>
-        </p:txBody>
-      </p:sp>
-      <p:sp>
-        <p:nvSpPr>
-          <p:cNvPr id="213" name="Folded Corner 212"/>
-          <p:cNvSpPr/>
-          <p:nvPr/>
-        </p:nvSpPr>
-        <p:spPr>
-          <a:xfrm>
-            <a:off x="2904698" y="3849687"/>
-            <a:ext cx="1464715" cy="420881"/>
-          </a:xfrm>
-          <a:prstGeom prst="foldedCorner">
-            <a:avLst/>
-          </a:prstGeom>
-        </p:spPr>
-        <p:style>
-          <a:lnRef idx="2">
-            <a:schemeClr val="accent3">
-              <a:shade val="50000"/>
-            </a:schemeClr>
-          </a:lnRef>
-          <a:fillRef idx="1">
-            <a:schemeClr val="accent3"/>
-          </a:fillRef>
-          <a:effectRef idx="0">
-            <a:schemeClr val="accent3"/>
-          </a:effectRef>
-          <a:fontRef idx="minor">
-            <a:schemeClr val="lt1"/>
-          </a:fontRef>
-        </p:style>
-        <p:txBody>
-          <a:bodyPr rtlCol="0" anchor="ctr"/>
-          <a:lstStyle/>
-          <a:p>
-            <a:pPr algn="ctr"/>
-            <a:r>
-              <a:rPr lang="en-US" sz="1600" b="1" dirty="0" smtClean="0"/>
-              <a:t>*.</a:t>
-            </a:r>
-            <a:r>
-              <a:rPr lang="en-US" sz="1600" b="1" dirty="0" err="1" smtClean="0"/>
-              <a:t>js</a:t>
-            </a:r>
-            <a:endParaRPr lang="en-SG" sz="1600" b="1" dirty="0"/>
-          </a:p>
-        </p:txBody>
-      </p:sp>
-      <p:sp>
-        <p:nvSpPr>
-          <p:cNvPr id="214" name="Folded Corner 213"/>
-          <p:cNvSpPr/>
-          <p:nvPr/>
-        </p:nvSpPr>
-        <p:spPr>
-          <a:xfrm>
-            <a:off x="3004400" y="3935145"/>
-            <a:ext cx="1464715" cy="420881"/>
-          </a:xfrm>
-          <a:prstGeom prst="foldedCorner">
-            <a:avLst/>
-          </a:prstGeom>
-        </p:spPr>
-        <p:style>
-          <a:lnRef idx="2">
-            <a:schemeClr val="accent3">
-              <a:shade val="50000"/>
-            </a:schemeClr>
-          </a:lnRef>
-          <a:fillRef idx="1">
-            <a:schemeClr val="accent3"/>
-          </a:fillRef>
-          <a:effectRef idx="0">
-            <a:schemeClr val="accent3"/>
-          </a:effectRef>
-          <a:fontRef idx="minor">
-            <a:schemeClr val="lt1"/>
-          </a:fontRef>
-        </p:style>
-        <p:txBody>
-          <a:bodyPr rtlCol="0" anchor="ctr"/>
-          <a:lstStyle/>
-          <a:p>
-            <a:pPr algn="ctr"/>
-            <a:r>
-              <a:rPr lang="en-US" sz="1600" b="1" dirty="0" smtClean="0"/>
-              <a:t>*.</a:t>
-            </a:r>
-            <a:r>
-              <a:rPr lang="en-US" sz="1600" b="1" dirty="0" err="1" smtClean="0"/>
-              <a:t>js</a:t>
-            </a:r>
-            <a:endParaRPr lang="en-SG" sz="1600" b="1" dirty="0"/>
-          </a:p>
-        </p:txBody>
-      </p:sp>
-      <p:sp>
-        <p:nvSpPr>
-          <p:cNvPr id="215" name="Folded Corner 214"/>
-          <p:cNvSpPr/>
-          <p:nvPr/>
-        </p:nvSpPr>
-        <p:spPr>
-          <a:xfrm>
-            <a:off x="3080600" y="4038406"/>
-            <a:ext cx="1464715" cy="420881"/>
-          </a:xfrm>
-          <a:prstGeom prst="foldedCorner">
-            <a:avLst/>
-          </a:prstGeom>
-        </p:spPr>
-        <p:style>
-          <a:lnRef idx="2">
-            <a:schemeClr val="accent3">
-              <a:shade val="50000"/>
-            </a:schemeClr>
-          </a:lnRef>
-          <a:fillRef idx="1">
-            <a:schemeClr val="accent3"/>
-          </a:fillRef>
-          <a:effectRef idx="0">
-            <a:schemeClr val="accent3"/>
-          </a:effectRef>
-          <a:fontRef idx="minor">
-            <a:schemeClr val="lt1"/>
-          </a:fontRef>
-        </p:style>
-        <p:txBody>
-          <a:bodyPr rtlCol="0" anchor="ctr"/>
-          <a:lstStyle/>
-          <a:p>
-            <a:pPr algn="ctr"/>
-            <a:r>
-              <a:rPr lang="en-US" sz="1600" b="1" dirty="0" smtClean="0"/>
-              <a:t>*.</a:t>
-            </a:r>
-            <a:r>
-              <a:rPr lang="en-US" sz="1600" b="1" dirty="0" err="1" smtClean="0"/>
-              <a:t>js</a:t>
-            </a:r>
-            <a:endParaRPr lang="en-SG" sz="1600" b="1" dirty="0"/>
-          </a:p>
-        </p:txBody>
-      </p:sp>
-      <p:cxnSp>
-        <p:nvCxnSpPr>
-          <p:cNvPr id="216" name="Elbow Connector 215"/>
-          <p:cNvCxnSpPr/>
-          <p:nvPr/>
-        </p:nvCxnSpPr>
-        <p:spPr>
-          <a:xfrm rot="10800000">
-            <a:off x="1404200" y="3697288"/>
-            <a:ext cx="4064239" cy="12700"/>
-          </a:xfrm>
-          <a:prstGeom prst="bentConnector3">
-            <a:avLst>
-              <a:gd name="adj1" fmla="val 50000"/>
-            </a:avLst>
-          </a:prstGeom>
-          <a:ln>
-            <a:prstDash val="sysDot"/>
+            <a:prstDash val="dash"/>
             <a:tailEnd type="arrow"/>
           </a:ln>
         </p:spPr>
@@ -4943,15 +4596,883 @@
           </a:fontRef>
         </p:style>
       </p:cxnSp>
-      <p:sp>
-        <p:nvSpPr>
-          <p:cNvPr id="217" name="TextBox 216"/>
+      <p:cxnSp>
+        <p:nvCxnSpPr>
+          <p:cNvPr id="221" name="Elbow Connector 220"/>
+          <p:cNvCxnSpPr>
+            <a:stCxn id="211" idx="2"/>
+            <a:endCxn id="219" idx="1"/>
+          </p:cNvCxnSpPr>
+          <p:nvPr/>
+        </p:nvCxnSpPr>
+        <p:spPr>
+          <a:xfrm rot="16200000" flipH="1">
+            <a:off x="1378166" y="3458045"/>
+            <a:ext cx="1096489" cy="2187421"/>
+          </a:xfrm>
+          <a:prstGeom prst="bentConnector2">
+            <a:avLst/>
+          </a:prstGeom>
+          <a:ln>
+            <a:solidFill>
+              <a:schemeClr val="tx1"/>
+            </a:solidFill>
+            <a:prstDash val="dash"/>
+            <a:tailEnd type="arrow"/>
+          </a:ln>
+        </p:spPr>
+        <p:style>
+          <a:lnRef idx="2">
+            <a:schemeClr val="accent4">
+              <a:shade val="50000"/>
+            </a:schemeClr>
+          </a:lnRef>
+          <a:fillRef idx="1">
+            <a:schemeClr val="accent4"/>
+          </a:fillRef>
+          <a:effectRef idx="0">
+            <a:schemeClr val="accent4"/>
+          </a:effectRef>
+          <a:fontRef idx="minor">
+            <a:schemeClr val="lt1"/>
+          </a:fontRef>
+        </p:style>
+      </p:cxnSp>
+      <p:grpSp>
+        <p:nvGrpSpPr>
+          <p:cNvPr id="9" name="Group 8"/>
+          <p:cNvGrpSpPr/>
+          <p:nvPr/>
+        </p:nvGrpSpPr>
+        <p:grpSpPr>
+          <a:xfrm>
+            <a:off x="5342765" y="3653134"/>
+            <a:ext cx="1605272" cy="733515"/>
+            <a:chOff x="5468438" y="3614677"/>
+            <a:chExt cx="1605272" cy="733515"/>
+          </a:xfrm>
+        </p:grpSpPr>
+        <p:sp>
+          <p:nvSpPr>
+            <p:cNvPr id="205" name="Folded Corner 204"/>
+            <p:cNvSpPr/>
+            <p:nvPr/>
+          </p:nvSpPr>
+          <p:spPr>
+            <a:xfrm>
+              <a:off x="5468438" y="3614677"/>
+              <a:ext cx="1466850" cy="609600"/>
+            </a:xfrm>
+            <a:prstGeom prst="foldedCorner">
+              <a:avLst/>
+            </a:prstGeom>
+          </p:spPr>
+          <p:style>
+            <a:lnRef idx="2">
+              <a:schemeClr val="accent4">
+                <a:shade val="50000"/>
+              </a:schemeClr>
+            </a:lnRef>
+            <a:fillRef idx="1">
+              <a:schemeClr val="accent4"/>
+            </a:fillRef>
+            <a:effectRef idx="0">
+              <a:schemeClr val="accent4"/>
+            </a:effectRef>
+            <a:fontRef idx="minor">
+              <a:schemeClr val="lt1"/>
+            </a:fontRef>
+          </p:style>
+          <p:txBody>
+            <a:bodyPr rtlCol="0" anchor="ctr"/>
+            <a:lstStyle/>
+            <a:p>
+              <a:pPr algn="ctr"/>
+              <a:r>
+                <a:rPr lang="en-US" sz="1600" b="1" dirty="0" smtClean="0"/>
+                <a:t>_xyz_.</a:t>
+              </a:r>
+              <a:r>
+                <a:rPr lang="en-US" sz="1600" b="1" dirty="0" err="1" smtClean="0"/>
+                <a:t>jsp</a:t>
+              </a:r>
+              <a:endParaRPr lang="en-SG" sz="1600" b="1" dirty="0"/>
+            </a:p>
+          </p:txBody>
+        </p:sp>
+        <p:sp>
+          <p:nvSpPr>
+            <p:cNvPr id="222" name="Folded Corner 221"/>
+            <p:cNvSpPr/>
+            <p:nvPr/>
+          </p:nvSpPr>
+          <p:spPr>
+            <a:xfrm>
+              <a:off x="5528526" y="3684109"/>
+              <a:ext cx="1466850" cy="609600"/>
+            </a:xfrm>
+            <a:prstGeom prst="foldedCorner">
+              <a:avLst/>
+            </a:prstGeom>
+          </p:spPr>
+          <p:style>
+            <a:lnRef idx="2">
+              <a:schemeClr val="accent4">
+                <a:shade val="50000"/>
+              </a:schemeClr>
+            </a:lnRef>
+            <a:fillRef idx="1">
+              <a:schemeClr val="accent4"/>
+            </a:fillRef>
+            <a:effectRef idx="0">
+              <a:schemeClr val="accent4"/>
+            </a:effectRef>
+            <a:fontRef idx="minor">
+              <a:schemeClr val="lt1"/>
+            </a:fontRef>
+          </p:style>
+          <p:txBody>
+            <a:bodyPr rtlCol="0" anchor="ctr"/>
+            <a:lstStyle/>
+            <a:p>
+              <a:pPr algn="ctr"/>
+              <a:r>
+                <a:rPr lang="en-US" sz="1600" b="1" dirty="0" smtClean="0"/>
+                <a:t>_xyz_.</a:t>
+              </a:r>
+              <a:r>
+                <a:rPr lang="en-US" sz="1600" b="1" dirty="0" err="1" smtClean="0"/>
+                <a:t>jsp</a:t>
+              </a:r>
+              <a:endParaRPr lang="en-SG" sz="1600" b="1" dirty="0"/>
+            </a:p>
+          </p:txBody>
+        </p:sp>
+        <p:sp>
+          <p:nvSpPr>
+            <p:cNvPr id="223" name="Folded Corner 222"/>
+            <p:cNvSpPr/>
+            <p:nvPr/>
+          </p:nvSpPr>
+          <p:spPr>
+            <a:xfrm>
+              <a:off x="5606860" y="3738592"/>
+              <a:ext cx="1466850" cy="609600"/>
+            </a:xfrm>
+            <a:prstGeom prst="foldedCorner">
+              <a:avLst/>
+            </a:prstGeom>
+          </p:spPr>
+          <p:style>
+            <a:lnRef idx="2">
+              <a:schemeClr val="accent4">
+                <a:shade val="50000"/>
+              </a:schemeClr>
+            </a:lnRef>
+            <a:fillRef idx="1">
+              <a:schemeClr val="accent4"/>
+            </a:fillRef>
+            <a:effectRef idx="0">
+              <a:schemeClr val="accent4"/>
+            </a:effectRef>
+            <a:fontRef idx="minor">
+              <a:schemeClr val="lt1"/>
+            </a:fontRef>
+          </p:style>
+          <p:txBody>
+            <a:bodyPr rtlCol="0" anchor="ctr"/>
+            <a:lstStyle/>
+            <a:p>
+              <a:pPr algn="ctr"/>
+              <a:r>
+                <a:rPr lang="en-US" sz="1600" b="1" dirty="0" smtClean="0"/>
+                <a:t>_xyz_.</a:t>
+              </a:r>
+              <a:r>
+                <a:rPr lang="en-US" sz="1600" b="1" dirty="0" err="1" smtClean="0"/>
+                <a:t>jsp</a:t>
+              </a:r>
+              <a:endParaRPr lang="en-SG" sz="1600" b="1" dirty="0"/>
+            </a:p>
+          </p:txBody>
+        </p:sp>
+      </p:grpSp>
+      <p:sp>
+        <p:nvSpPr>
+          <p:cNvPr id="226" name="Rounded Rectangle 225"/>
+          <p:cNvSpPr/>
+          <p:nvPr/>
+        </p:nvSpPr>
+        <p:spPr>
+          <a:xfrm>
+            <a:off x="7881200" y="114387"/>
+            <a:ext cx="914400" cy="5525997"/>
+          </a:xfrm>
+          <a:prstGeom prst="roundRect">
+            <a:avLst>
+              <a:gd name="adj" fmla="val 23209"/>
+            </a:avLst>
+          </a:prstGeom>
+          <a:solidFill>
+            <a:schemeClr val="bg1">
+              <a:lumMod val="85000"/>
+            </a:schemeClr>
+          </a:solidFill>
+          <a:ln>
+            <a:solidFill>
+              <a:schemeClr val="bg1">
+                <a:lumMod val="75000"/>
+              </a:schemeClr>
+            </a:solidFill>
+          </a:ln>
+        </p:spPr>
+        <p:style>
+          <a:lnRef idx="2">
+            <a:schemeClr val="accent1">
+              <a:shade val="50000"/>
+            </a:schemeClr>
+          </a:lnRef>
+          <a:fillRef idx="1">
+            <a:schemeClr val="accent1"/>
+          </a:fillRef>
+          <a:effectRef idx="0">
+            <a:schemeClr val="accent1"/>
+          </a:effectRef>
+          <a:fontRef idx="minor">
+            <a:schemeClr val="lt1"/>
+          </a:fontRef>
+        </p:style>
+        <p:txBody>
+          <a:bodyPr vert="vert270" rtlCol="0" anchor="t" anchorCtr="1"/>
+          <a:lstStyle/>
+          <a:p>
+            <a:pPr algn="r"/>
+            <a:r>
+              <a:rPr lang="en-US" sz="1600" b="1" dirty="0" smtClean="0"/>
+              <a:t>Logic</a:t>
+            </a:r>
+            <a:endParaRPr lang="en-SG" sz="1600" b="1" dirty="0"/>
+          </a:p>
+        </p:txBody>
+      </p:sp>
+      <p:sp>
+        <p:nvSpPr>
+          <p:cNvPr id="227" name="Rectangle 226"/>
+          <p:cNvSpPr/>
+          <p:nvPr/>
+        </p:nvSpPr>
+        <p:spPr>
+          <a:xfrm>
+            <a:off x="8338400" y="-36513"/>
+            <a:ext cx="609600" cy="5867400"/>
+          </a:xfrm>
+          <a:prstGeom prst="rect">
+            <a:avLst/>
+          </a:prstGeom>
+          <a:solidFill>
+            <a:schemeClr val="bg1"/>
+          </a:solidFill>
+          <a:ln>
+            <a:noFill/>
+          </a:ln>
+          <a:effectLst>
+            <a:softEdge rad="63500"/>
+          </a:effectLst>
+        </p:spPr>
+        <p:style>
+          <a:lnRef idx="2">
+            <a:schemeClr val="accent1">
+              <a:shade val="50000"/>
+            </a:schemeClr>
+          </a:lnRef>
+          <a:fillRef idx="1">
+            <a:schemeClr val="accent1"/>
+          </a:fillRef>
+          <a:effectRef idx="0">
+            <a:schemeClr val="accent1"/>
+          </a:effectRef>
+          <a:fontRef idx="minor">
+            <a:schemeClr val="lt1"/>
+          </a:fontRef>
+        </p:style>
+        <p:txBody>
+          <a:bodyPr rtlCol="0" anchor="ctr"/>
+          <a:lstStyle/>
+          <a:p>
+            <a:pPr algn="ctr"/>
+            <a:endParaRPr lang="en-SG"/>
+          </a:p>
+        </p:txBody>
+      </p:sp>
+      <p:sp>
+        <p:nvSpPr>
+          <p:cNvPr id="230" name="Rectangle 229"/>
+          <p:cNvSpPr/>
+          <p:nvPr/>
+        </p:nvSpPr>
+        <p:spPr>
+          <a:xfrm>
+            <a:off x="2712604" y="645975"/>
+            <a:ext cx="1466850" cy="199692"/>
+          </a:xfrm>
+          <a:prstGeom prst="rect">
+            <a:avLst/>
+          </a:prstGeom>
+        </p:spPr>
+        <p:style>
+          <a:lnRef idx="2">
+            <a:schemeClr val="accent1">
+              <a:shade val="50000"/>
+            </a:schemeClr>
+          </a:lnRef>
+          <a:fillRef idx="1">
+            <a:schemeClr val="accent1"/>
+          </a:fillRef>
+          <a:effectRef idx="0">
+            <a:schemeClr val="accent1"/>
+          </a:effectRef>
+          <a:fontRef idx="minor">
+            <a:schemeClr val="lt1"/>
+          </a:fontRef>
+        </p:style>
+        <p:txBody>
+          <a:bodyPr rtlCol="0" anchor="ctr"/>
+          <a:lstStyle/>
+          <a:p>
+            <a:pPr algn="ctr"/>
+            <a:r>
+              <a:rPr lang="en-US" sz="1600" b="1" dirty="0" err="1" smtClean="0"/>
+              <a:t>LoginFilter</a:t>
+            </a:r>
+            <a:endParaRPr lang="en-SG" sz="1600" b="1" dirty="0"/>
+          </a:p>
+        </p:txBody>
+      </p:sp>
+      <p:cxnSp>
+        <p:nvCxnSpPr>
+          <p:cNvPr id="96" name="Straight Arrow Connector 207"/>
+          <p:cNvCxnSpPr>
+            <a:stCxn id="205" idx="1"/>
+          </p:cNvCxnSpPr>
+          <p:nvPr/>
+        </p:nvCxnSpPr>
+        <p:spPr>
+          <a:xfrm rot="10800000">
+            <a:off x="1404203" y="3742156"/>
+            <a:ext cx="3938562" cy="215778"/>
+          </a:xfrm>
+          <a:prstGeom prst="bentConnector3">
+            <a:avLst>
+              <a:gd name="adj1" fmla="val 15028"/>
+            </a:avLst>
+          </a:prstGeom>
+          <a:ln w="25400">
+            <a:solidFill>
+              <a:schemeClr val="accent4">
+                <a:lumMod val="75000"/>
+              </a:schemeClr>
+            </a:solidFill>
+            <a:prstDash val="sysDash"/>
+            <a:tailEnd type="arrow"/>
+          </a:ln>
+        </p:spPr>
+        <p:style>
+          <a:lnRef idx="1">
+            <a:schemeClr val="accent1"/>
+          </a:lnRef>
+          <a:fillRef idx="0">
+            <a:schemeClr val="accent1"/>
+          </a:fillRef>
+          <a:effectRef idx="0">
+            <a:schemeClr val="accent1"/>
+          </a:effectRef>
+          <a:fontRef idx="minor">
+            <a:schemeClr val="tx1"/>
+          </a:fontRef>
+        </p:style>
+      </p:cxnSp>
+      <p:cxnSp>
+        <p:nvCxnSpPr>
+          <p:cNvPr id="112" name="Straight Arrow Connector 207"/>
+          <p:cNvCxnSpPr/>
+          <p:nvPr/>
+        </p:nvCxnSpPr>
+        <p:spPr>
+          <a:xfrm rot="16200000" flipV="1">
+            <a:off x="4066478" y="2060481"/>
+            <a:ext cx="881473" cy="2267463"/>
+          </a:xfrm>
+          <a:prstGeom prst="bentConnector3">
+            <a:avLst>
+              <a:gd name="adj1" fmla="val 50000"/>
+            </a:avLst>
+          </a:prstGeom>
+          <a:ln w="25400">
+            <a:solidFill>
+              <a:schemeClr val="accent4">
+                <a:lumMod val="75000"/>
+              </a:schemeClr>
+            </a:solidFill>
+            <a:prstDash val="sysDash"/>
+            <a:tailEnd type="arrow"/>
+          </a:ln>
+        </p:spPr>
+        <p:style>
+          <a:lnRef idx="1">
+            <a:schemeClr val="accent1"/>
+          </a:lnRef>
+          <a:fillRef idx="0">
+            <a:schemeClr val="accent1"/>
+          </a:fillRef>
+          <a:effectRef idx="0">
+            <a:schemeClr val="accent1"/>
+          </a:effectRef>
+          <a:fontRef idx="minor">
+            <a:schemeClr val="tx1"/>
+          </a:fontRef>
+        </p:style>
+      </p:cxnSp>
+      <p:grpSp>
+        <p:nvGrpSpPr>
+          <p:cNvPr id="114" name="Group 113"/>
+          <p:cNvGrpSpPr/>
+          <p:nvPr/>
+        </p:nvGrpSpPr>
+        <p:grpSpPr>
+          <a:xfrm>
+            <a:off x="2671664" y="877597"/>
+            <a:ext cx="1820633" cy="1894064"/>
+            <a:chOff x="2644706" y="841228"/>
+            <a:chExt cx="1820633" cy="1894064"/>
+          </a:xfrm>
+        </p:grpSpPr>
+        <p:grpSp>
+          <p:nvGrpSpPr>
+            <p:cNvPr id="128" name="Group 127"/>
+            <p:cNvGrpSpPr/>
+            <p:nvPr/>
+          </p:nvGrpSpPr>
+          <p:grpSpPr>
+            <a:xfrm>
+              <a:off x="2644706" y="841228"/>
+              <a:ext cx="1820633" cy="1894064"/>
+              <a:chOff x="-3638550" y="1371600"/>
+              <a:chExt cx="4781550" cy="2481840"/>
+            </a:xfrm>
+            <a:solidFill>
+              <a:schemeClr val="bg1"/>
+            </a:solidFill>
+          </p:grpSpPr>
+          <p:sp>
+            <p:nvSpPr>
+              <p:cNvPr id="129" name="Rectangle 128"/>
+              <p:cNvSpPr/>
+              <p:nvPr/>
+            </p:nvSpPr>
+            <p:spPr>
+              <a:xfrm>
+                <a:off x="-3638550" y="1523999"/>
+                <a:ext cx="4781550" cy="2329441"/>
+              </a:xfrm>
+              <a:prstGeom prst="rect">
+                <a:avLst/>
+              </a:prstGeom>
+              <a:grpFill/>
+              <a:ln>
+                <a:solidFill>
+                  <a:schemeClr val="tx2">
+                    <a:lumMod val="40000"/>
+                    <a:lumOff val="60000"/>
+                  </a:schemeClr>
+                </a:solidFill>
+              </a:ln>
+            </p:spPr>
+            <p:style>
+              <a:lnRef idx="2">
+                <a:schemeClr val="accent1">
+                  <a:shade val="50000"/>
+                </a:schemeClr>
+              </a:lnRef>
+              <a:fillRef idx="1">
+                <a:schemeClr val="accent1"/>
+              </a:fillRef>
+              <a:effectRef idx="0">
+                <a:schemeClr val="accent1"/>
+              </a:effectRef>
+              <a:fontRef idx="minor">
+                <a:schemeClr val="lt1"/>
+              </a:fontRef>
+            </p:style>
+            <p:txBody>
+              <a:bodyPr rtlCol="0" anchor="t" anchorCtr="0"/>
+              <a:lstStyle/>
+              <a:p>
+                <a:pPr algn="r"/>
+                <a:r>
+                  <a:rPr lang="en-US" sz="1400" b="1" dirty="0" err="1" smtClean="0">
+                    <a:solidFill>
+                      <a:schemeClr val="tx2"/>
+                    </a:solidFill>
+                  </a:rPr>
+                  <a:t>ui</a:t>
+                </a:r>
+                <a:r>
+                  <a:rPr lang="en-US" sz="1400" b="1" dirty="0" smtClean="0">
+                    <a:solidFill>
+                      <a:schemeClr val="tx2"/>
+                    </a:solidFill>
+                  </a:rPr>
+                  <a:t>::helper</a:t>
+                </a:r>
+                <a:endParaRPr lang="en-SG" sz="1400" b="1" dirty="0">
+                  <a:solidFill>
+                    <a:schemeClr val="tx2"/>
+                  </a:solidFill>
+                </a:endParaRPr>
+              </a:p>
+            </p:txBody>
+          </p:sp>
+          <p:sp>
+            <p:nvSpPr>
+              <p:cNvPr id="130" name="Rectangle 129"/>
+              <p:cNvSpPr/>
+              <p:nvPr/>
+            </p:nvSpPr>
+            <p:spPr>
+              <a:xfrm>
+                <a:off x="647700" y="1371600"/>
+                <a:ext cx="495300" cy="152400"/>
+              </a:xfrm>
+              <a:prstGeom prst="rect">
+                <a:avLst/>
+              </a:prstGeom>
+              <a:grpFill/>
+              <a:ln>
+                <a:solidFill>
+                  <a:schemeClr val="tx2">
+                    <a:lumMod val="40000"/>
+                    <a:lumOff val="60000"/>
+                  </a:schemeClr>
+                </a:solidFill>
+              </a:ln>
+            </p:spPr>
+            <p:style>
+              <a:lnRef idx="2">
+                <a:schemeClr val="accent1">
+                  <a:shade val="50000"/>
+                </a:schemeClr>
+              </a:lnRef>
+              <a:fillRef idx="1">
+                <a:schemeClr val="accent1"/>
+              </a:fillRef>
+              <a:effectRef idx="0">
+                <a:schemeClr val="accent1"/>
+              </a:effectRef>
+              <a:fontRef idx="minor">
+                <a:schemeClr val="lt1"/>
+              </a:fontRef>
+            </p:style>
+            <p:txBody>
+              <a:bodyPr rtlCol="0" anchor="t" anchorCtr="0"/>
+              <a:lstStyle/>
+              <a:p>
+                <a:endParaRPr lang="en-SG" sz="1400" b="1">
+                  <a:solidFill>
+                    <a:schemeClr val="tx2"/>
+                  </a:solidFill>
+                </a:endParaRPr>
+              </a:p>
+            </p:txBody>
+          </p:sp>
+        </p:grpSp>
+        <p:sp>
+          <p:nvSpPr>
+            <p:cNvPr id="202" name="Rectangle 201"/>
+            <p:cNvSpPr/>
+            <p:nvPr/>
+          </p:nvSpPr>
+          <p:spPr>
+            <a:xfrm>
+              <a:off x="2760094" y="1242699"/>
+              <a:ext cx="1226777" cy="297095"/>
+            </a:xfrm>
+            <a:prstGeom prst="rect">
+              <a:avLst/>
+            </a:prstGeom>
+          </p:spPr>
+          <p:style>
+            <a:lnRef idx="2">
+              <a:schemeClr val="accent6">
+                <a:shade val="50000"/>
+              </a:schemeClr>
+            </a:lnRef>
+            <a:fillRef idx="1">
+              <a:schemeClr val="accent6"/>
+            </a:fillRef>
+            <a:effectRef idx="0">
+              <a:schemeClr val="accent6"/>
+            </a:effectRef>
+            <a:fontRef idx="minor">
+              <a:schemeClr val="lt1"/>
+            </a:fontRef>
+          </p:style>
+          <p:txBody>
+            <a:bodyPr rtlCol="0" anchor="ctr"/>
+            <a:lstStyle/>
+            <a:p>
+              <a:pPr algn="ctr"/>
+              <a:r>
+                <a:rPr lang="en-US" sz="1600" b="1" dirty="0" smtClean="0"/>
+                <a:t>Helper</a:t>
+              </a:r>
+              <a:endParaRPr lang="en-SG" sz="1600" b="1" dirty="0"/>
+            </a:p>
+          </p:txBody>
+        </p:sp>
+        <p:sp>
+          <p:nvSpPr>
+            <p:cNvPr id="203" name="Isosceles Triangle 202"/>
+            <p:cNvSpPr/>
+            <p:nvPr/>
+          </p:nvSpPr>
+          <p:spPr>
+            <a:xfrm>
+              <a:off x="3281917" y="1534646"/>
+              <a:ext cx="276225" cy="228600"/>
+            </a:xfrm>
+            <a:prstGeom prst="triangle">
+              <a:avLst/>
+            </a:prstGeom>
+          </p:spPr>
+          <p:style>
+            <a:lnRef idx="2">
+              <a:schemeClr val="accent6">
+                <a:shade val="50000"/>
+              </a:schemeClr>
+            </a:lnRef>
+            <a:fillRef idx="1">
+              <a:schemeClr val="accent6"/>
+            </a:fillRef>
+            <a:effectRef idx="0">
+              <a:schemeClr val="accent6"/>
+            </a:effectRef>
+            <a:fontRef idx="minor">
+              <a:schemeClr val="lt1"/>
+            </a:fontRef>
+          </p:style>
+          <p:txBody>
+            <a:bodyPr rtlCol="0" anchor="ctr"/>
+            <a:lstStyle/>
+            <a:p>
+              <a:pPr algn="ctr"/>
+              <a:endParaRPr lang="en-SG"/>
+            </a:p>
+          </p:txBody>
+        </p:sp>
+        <p:cxnSp>
+          <p:nvCxnSpPr>
+            <p:cNvPr id="204" name="Elbow Connector 203"/>
+            <p:cNvCxnSpPr>
+              <a:stCxn id="203" idx="3"/>
+              <a:endCxn id="200" idx="0"/>
+            </p:cNvCxnSpPr>
+            <p:nvPr/>
+          </p:nvCxnSpPr>
+          <p:spPr>
+            <a:xfrm>
+              <a:off x="3420030" y="1763246"/>
+              <a:ext cx="0" cy="325476"/>
+            </a:xfrm>
+            <a:prstGeom prst="straightConnector1">
+              <a:avLst/>
+            </a:prstGeom>
+          </p:spPr>
+          <p:style>
+            <a:lnRef idx="2">
+              <a:schemeClr val="accent6">
+                <a:shade val="50000"/>
+              </a:schemeClr>
+            </a:lnRef>
+            <a:fillRef idx="1">
+              <a:schemeClr val="accent6"/>
+            </a:fillRef>
+            <a:effectRef idx="0">
+              <a:schemeClr val="accent6"/>
+            </a:effectRef>
+            <a:fontRef idx="minor">
+              <a:schemeClr val="lt1"/>
+            </a:fontRef>
+          </p:style>
+        </p:cxnSp>
+        <p:grpSp>
+          <p:nvGrpSpPr>
+            <p:cNvPr id="7" name="Group 6"/>
+            <p:cNvGrpSpPr/>
+            <p:nvPr/>
+          </p:nvGrpSpPr>
+          <p:grpSpPr>
+            <a:xfrm>
+              <a:off x="2731647" y="2088722"/>
+              <a:ext cx="1504057" cy="461935"/>
+              <a:chOff x="5468615" y="1988128"/>
+              <a:chExt cx="1602470" cy="686901"/>
+            </a:xfrm>
+          </p:grpSpPr>
+          <p:sp>
+            <p:nvSpPr>
+              <p:cNvPr id="200" name="Rectangle 199"/>
+              <p:cNvSpPr/>
+              <p:nvPr/>
+            </p:nvSpPr>
+            <p:spPr>
+              <a:xfrm>
+                <a:off x="5468615" y="1988128"/>
+                <a:ext cx="1466850" cy="609600"/>
+              </a:xfrm>
+              <a:prstGeom prst="rect">
+                <a:avLst/>
+              </a:prstGeom>
+            </p:spPr>
+            <p:style>
+              <a:lnRef idx="2">
+                <a:schemeClr val="accent6">
+                  <a:shade val="50000"/>
+                </a:schemeClr>
+              </a:lnRef>
+              <a:fillRef idx="1">
+                <a:schemeClr val="accent6"/>
+              </a:fillRef>
+              <a:effectRef idx="0">
+                <a:schemeClr val="accent6"/>
+              </a:effectRef>
+              <a:fontRef idx="minor">
+                <a:schemeClr val="lt1"/>
+              </a:fontRef>
+            </p:style>
+            <p:txBody>
+              <a:bodyPr rtlCol="0" anchor="ctr"/>
+              <a:lstStyle/>
+              <a:p>
+                <a:pPr algn="ctr"/>
+                <a:r>
+                  <a:rPr lang="en-US" sz="1600" b="1" dirty="0" smtClean="0"/>
+                  <a:t>_</a:t>
+                </a:r>
+                <a:r>
+                  <a:rPr lang="en-US" sz="1600" b="1" dirty="0" err="1" smtClean="0"/>
+                  <a:t>xyz_Helper</a:t>
+                </a:r>
+                <a:endParaRPr lang="en-SG" sz="1600" b="1" dirty="0"/>
+              </a:p>
+            </p:txBody>
+          </p:sp>
+          <p:sp>
+            <p:nvSpPr>
+              <p:cNvPr id="237" name="Rectangle 236"/>
+              <p:cNvSpPr/>
+              <p:nvPr/>
+            </p:nvSpPr>
+            <p:spPr>
+              <a:xfrm>
+                <a:off x="5526281" y="2022345"/>
+                <a:ext cx="1466850" cy="609600"/>
+              </a:xfrm>
+              <a:prstGeom prst="rect">
+                <a:avLst/>
+              </a:prstGeom>
+            </p:spPr>
+            <p:style>
+              <a:lnRef idx="2">
+                <a:schemeClr val="accent6">
+                  <a:shade val="50000"/>
+                </a:schemeClr>
+              </a:lnRef>
+              <a:fillRef idx="1">
+                <a:schemeClr val="accent6"/>
+              </a:fillRef>
+              <a:effectRef idx="0">
+                <a:schemeClr val="accent6"/>
+              </a:effectRef>
+              <a:fontRef idx="minor">
+                <a:schemeClr val="lt1"/>
+              </a:fontRef>
+            </p:style>
+            <p:txBody>
+              <a:bodyPr rtlCol="0" anchor="ctr"/>
+              <a:lstStyle/>
+              <a:p>
+                <a:pPr algn="ctr"/>
+                <a:r>
+                  <a:rPr lang="en-US" sz="1600" b="1" dirty="0" smtClean="0"/>
+                  <a:t>_</a:t>
+                </a:r>
+                <a:r>
+                  <a:rPr lang="en-US" sz="1600" b="1" dirty="0" err="1" smtClean="0"/>
+                  <a:t>xyz_Helper</a:t>
+                </a:r>
+                <a:endParaRPr lang="en-SG" sz="1600" b="1" dirty="0"/>
+              </a:p>
+            </p:txBody>
+          </p:sp>
+          <p:sp>
+            <p:nvSpPr>
+              <p:cNvPr id="238" name="Rectangle 237"/>
+              <p:cNvSpPr/>
+              <p:nvPr/>
+            </p:nvSpPr>
+            <p:spPr>
+              <a:xfrm>
+                <a:off x="5604235" y="2065429"/>
+                <a:ext cx="1466850" cy="609600"/>
+              </a:xfrm>
+              <a:prstGeom prst="rect">
+                <a:avLst/>
+              </a:prstGeom>
+            </p:spPr>
+            <p:style>
+              <a:lnRef idx="2">
+                <a:schemeClr val="accent6">
+                  <a:shade val="50000"/>
+                </a:schemeClr>
+              </a:lnRef>
+              <a:fillRef idx="1">
+                <a:schemeClr val="accent6"/>
+              </a:fillRef>
+              <a:effectRef idx="0">
+                <a:schemeClr val="accent6"/>
+              </a:effectRef>
+              <a:fontRef idx="minor">
+                <a:schemeClr val="lt1"/>
+              </a:fontRef>
+            </p:style>
+            <p:txBody>
+              <a:bodyPr rtlCol="0" anchor="ctr"/>
+              <a:lstStyle/>
+              <a:p>
+                <a:pPr algn="ctr"/>
+                <a:r>
+                  <a:rPr lang="en-US" sz="1600" b="1" dirty="0" smtClean="0"/>
+                  <a:t>_</a:t>
+                </a:r>
+                <a:r>
+                  <a:rPr lang="en-US" sz="1600" b="1" dirty="0" err="1" smtClean="0"/>
+                  <a:t>xyz_Helper</a:t>
+                </a:r>
+                <a:endParaRPr lang="en-SG" sz="1600" b="1" dirty="0"/>
+              </a:p>
+            </p:txBody>
+          </p:sp>
+        </p:grpSp>
+      </p:grpSp>
+      <p:sp>
+        <p:nvSpPr>
+          <p:cNvPr id="210" name="TextBox 209"/>
           <p:cNvSpPr txBox="1"/>
           <p:nvPr/>
         </p:nvSpPr>
         <p:spPr>
           <a:xfrm>
-            <a:off x="2471000" y="3399481"/>
+            <a:off x="4336053" y="1530740"/>
             <a:ext cx="1066800" cy="307777"/>
           </a:xfrm>
           <a:prstGeom prst="rect">
@@ -5051,302 +5572,466 @@
           <a:p>
             <a:pPr algn="r"/>
             <a:r>
-              <a:rPr lang="en-US" dirty="0" smtClean="0"/>
+              <a:rPr lang="en-US" dirty="0" smtClean="0">
+                <a:solidFill>
+                  <a:schemeClr val="accent2">
+                    <a:lumMod val="75000"/>
+                  </a:schemeClr>
+                </a:solidFill>
+              </a:rPr>
               <a:t>&lt;&lt;create&gt;&gt;</a:t>
             </a:r>
-            <a:endParaRPr lang="en-SG" dirty="0"/>
-          </a:p>
-        </p:txBody>
-      </p:sp>
-      <p:sp>
-        <p:nvSpPr>
-          <p:cNvPr id="218" name="Folded Corner 217"/>
-          <p:cNvSpPr/>
+            <a:endParaRPr lang="en-SG" dirty="0">
+              <a:solidFill>
+                <a:schemeClr val="accent2">
+                  <a:lumMod val="75000"/>
+                </a:schemeClr>
+              </a:solidFill>
+            </a:endParaRPr>
+          </a:p>
+        </p:txBody>
+      </p:sp>
+      <p:grpSp>
+        <p:nvGrpSpPr>
+          <p:cNvPr id="135" name="Group 134"/>
+          <p:cNvGrpSpPr/>
           <p:nvPr/>
-        </p:nvSpPr>
-        <p:spPr>
+        </p:nvGrpSpPr>
+        <p:grpSpPr>
           <a:xfrm>
-            <a:off x="2967369" y="4699993"/>
-            <a:ext cx="1464715" cy="374591"/>
+            <a:off x="5342765" y="834694"/>
+            <a:ext cx="1789186" cy="1894064"/>
+            <a:chOff x="5342765" y="834694"/>
+            <a:chExt cx="1789186" cy="1894064"/>
           </a:xfrm>
-          <a:prstGeom prst="foldedCorner">
-            <a:avLst/>
-          </a:prstGeom>
-        </p:spPr>
-        <p:style>
-          <a:lnRef idx="2">
-            <a:schemeClr val="accent5">
-              <a:shade val="50000"/>
-            </a:schemeClr>
-          </a:lnRef>
-          <a:fillRef idx="1">
-            <a:schemeClr val="accent5"/>
-          </a:fillRef>
-          <a:effectRef idx="0">
-            <a:schemeClr val="accent5"/>
-          </a:effectRef>
-          <a:fontRef idx="minor">
-            <a:schemeClr val="lt1"/>
-          </a:fontRef>
-        </p:style>
-        <p:txBody>
-          <a:bodyPr rtlCol="0" anchor="ctr"/>
-          <a:lstStyle/>
-          <a:p>
-            <a:pPr algn="ctr"/>
-            <a:r>
-              <a:rPr lang="en-US" sz="1600" b="1" dirty="0" smtClean="0"/>
-              <a:t>*.</a:t>
-            </a:r>
-            <a:r>
-              <a:rPr lang="en-US" sz="1600" b="1" dirty="0" err="1" smtClean="0"/>
-              <a:t>css</a:t>
-            </a:r>
-            <a:endParaRPr lang="en-SG" sz="1600" b="1" dirty="0"/>
-          </a:p>
-        </p:txBody>
-      </p:sp>
-      <p:sp>
-        <p:nvSpPr>
-          <p:cNvPr id="219" name="Folded Corner 218"/>
-          <p:cNvSpPr/>
-          <p:nvPr/>
-        </p:nvSpPr>
-        <p:spPr>
-          <a:xfrm>
-            <a:off x="3009385" y="4770496"/>
-            <a:ext cx="1464715" cy="374591"/>
-          </a:xfrm>
-          <a:prstGeom prst="foldedCorner">
-            <a:avLst/>
-          </a:prstGeom>
-        </p:spPr>
-        <p:style>
-          <a:lnRef idx="2">
-            <a:schemeClr val="accent5">
-              <a:shade val="50000"/>
-            </a:schemeClr>
-          </a:lnRef>
-          <a:fillRef idx="1">
-            <a:schemeClr val="accent5"/>
-          </a:fillRef>
-          <a:effectRef idx="0">
-            <a:schemeClr val="accent5"/>
-          </a:effectRef>
-          <a:fontRef idx="minor">
-            <a:schemeClr val="lt1"/>
-          </a:fontRef>
-        </p:style>
-        <p:txBody>
-          <a:bodyPr rtlCol="0" anchor="ctr"/>
-          <a:lstStyle/>
-          <a:p>
-            <a:pPr algn="ctr"/>
-            <a:r>
-              <a:rPr lang="en-US" sz="1600" b="1" dirty="0" smtClean="0"/>
-              <a:t>*.</a:t>
-            </a:r>
-            <a:r>
-              <a:rPr lang="en-US" sz="1600" b="1" dirty="0" err="1" smtClean="0"/>
-              <a:t>css</a:t>
-            </a:r>
-            <a:endParaRPr lang="en-SG" sz="1600" b="1" dirty="0"/>
-          </a:p>
-        </p:txBody>
-      </p:sp>
+        </p:grpSpPr>
+        <p:grpSp>
+          <p:nvGrpSpPr>
+            <p:cNvPr id="140" name="Group 139"/>
+            <p:cNvGrpSpPr/>
+            <p:nvPr/>
+          </p:nvGrpSpPr>
+          <p:grpSpPr>
+            <a:xfrm>
+              <a:off x="5342765" y="834694"/>
+              <a:ext cx="1789186" cy="1894064"/>
+              <a:chOff x="-3638550" y="1371600"/>
+              <a:chExt cx="4781550" cy="2481840"/>
+            </a:xfrm>
+            <a:solidFill>
+              <a:schemeClr val="bg1"/>
+            </a:solidFill>
+          </p:grpSpPr>
+          <p:sp>
+            <p:nvSpPr>
+              <p:cNvPr id="141" name="Rectangle 140"/>
+              <p:cNvSpPr/>
+              <p:nvPr/>
+            </p:nvSpPr>
+            <p:spPr>
+              <a:xfrm>
+                <a:off x="-3638550" y="1523999"/>
+                <a:ext cx="4781550" cy="2329441"/>
+              </a:xfrm>
+              <a:prstGeom prst="rect">
+                <a:avLst/>
+              </a:prstGeom>
+              <a:grpFill/>
+              <a:ln>
+                <a:solidFill>
+                  <a:schemeClr val="tx2">
+                    <a:lumMod val="40000"/>
+                    <a:lumOff val="60000"/>
+                  </a:schemeClr>
+                </a:solidFill>
+              </a:ln>
+            </p:spPr>
+            <p:style>
+              <a:lnRef idx="2">
+                <a:schemeClr val="accent1">
+                  <a:shade val="50000"/>
+                </a:schemeClr>
+              </a:lnRef>
+              <a:fillRef idx="1">
+                <a:schemeClr val="accent1"/>
+              </a:fillRef>
+              <a:effectRef idx="0">
+                <a:schemeClr val="accent1"/>
+              </a:effectRef>
+              <a:fontRef idx="minor">
+                <a:schemeClr val="lt1"/>
+              </a:fontRef>
+            </p:style>
+            <p:txBody>
+              <a:bodyPr rtlCol="0" anchor="t" anchorCtr="0"/>
+              <a:lstStyle/>
+              <a:p>
+                <a:pPr algn="r"/>
+                <a:r>
+                  <a:rPr lang="en-US" sz="1400" b="1" dirty="0" err="1" smtClean="0">
+                    <a:solidFill>
+                      <a:schemeClr val="tx2"/>
+                    </a:solidFill>
+                  </a:rPr>
+                  <a:t>ui</a:t>
+                </a:r>
+                <a:r>
+                  <a:rPr lang="en-US" sz="1400" b="1" dirty="0" smtClean="0">
+                    <a:solidFill>
+                      <a:schemeClr val="tx2"/>
+                    </a:solidFill>
+                  </a:rPr>
+                  <a:t>::servlet</a:t>
+                </a:r>
+                <a:endParaRPr lang="en-SG" sz="1400" b="1" dirty="0">
+                  <a:solidFill>
+                    <a:schemeClr val="tx2"/>
+                  </a:solidFill>
+                </a:endParaRPr>
+              </a:p>
+            </p:txBody>
+          </p:sp>
+          <p:sp>
+            <p:nvSpPr>
+              <p:cNvPr id="142" name="Rectangle 141"/>
+              <p:cNvSpPr/>
+              <p:nvPr/>
+            </p:nvSpPr>
+            <p:spPr>
+              <a:xfrm>
+                <a:off x="647700" y="1371600"/>
+                <a:ext cx="495300" cy="152400"/>
+              </a:xfrm>
+              <a:prstGeom prst="rect">
+                <a:avLst/>
+              </a:prstGeom>
+              <a:grpFill/>
+              <a:ln>
+                <a:solidFill>
+                  <a:schemeClr val="tx2">
+                    <a:lumMod val="40000"/>
+                    <a:lumOff val="60000"/>
+                  </a:schemeClr>
+                </a:solidFill>
+              </a:ln>
+            </p:spPr>
+            <p:style>
+              <a:lnRef idx="2">
+                <a:schemeClr val="accent1">
+                  <a:shade val="50000"/>
+                </a:schemeClr>
+              </a:lnRef>
+              <a:fillRef idx="1">
+                <a:schemeClr val="accent1"/>
+              </a:fillRef>
+              <a:effectRef idx="0">
+                <a:schemeClr val="accent1"/>
+              </a:effectRef>
+              <a:fontRef idx="minor">
+                <a:schemeClr val="lt1"/>
+              </a:fontRef>
+            </p:style>
+            <p:txBody>
+              <a:bodyPr rtlCol="0" anchor="t" anchorCtr="0"/>
+              <a:lstStyle/>
+              <a:p>
+                <a:endParaRPr lang="en-SG" sz="1400" b="1">
+                  <a:solidFill>
+                    <a:schemeClr val="tx2"/>
+                  </a:solidFill>
+                </a:endParaRPr>
+              </a:p>
+            </p:txBody>
+          </p:sp>
+        </p:grpSp>
+        <p:sp>
+          <p:nvSpPr>
+            <p:cNvPr id="197" name="Rectangle 196"/>
+            <p:cNvSpPr/>
+            <p:nvPr/>
+          </p:nvSpPr>
+          <p:spPr>
+            <a:xfrm>
+              <a:off x="5538050" y="1244181"/>
+              <a:ext cx="1466850" cy="292891"/>
+            </a:xfrm>
+            <a:prstGeom prst="rect">
+              <a:avLst/>
+            </a:prstGeom>
+          </p:spPr>
+          <p:style>
+            <a:lnRef idx="2">
+              <a:schemeClr val="accent2">
+                <a:shade val="50000"/>
+              </a:schemeClr>
+            </a:lnRef>
+            <a:fillRef idx="1">
+              <a:schemeClr val="accent2"/>
+            </a:fillRef>
+            <a:effectRef idx="0">
+              <a:schemeClr val="accent2"/>
+            </a:effectRef>
+            <a:fontRef idx="minor">
+              <a:schemeClr val="lt1"/>
+            </a:fontRef>
+          </p:style>
+          <p:txBody>
+            <a:bodyPr rtlCol="0" anchor="ctr"/>
+            <a:lstStyle/>
+            <a:p>
+              <a:pPr algn="ctr"/>
+              <a:r>
+                <a:rPr lang="en-US" sz="1600" b="1" dirty="0" err="1" smtClean="0"/>
+                <a:t>ActionServlet</a:t>
+              </a:r>
+              <a:endParaRPr lang="en-SG" sz="1600" b="1" dirty="0"/>
+            </a:p>
+          </p:txBody>
+        </p:sp>
+        <p:sp>
+          <p:nvSpPr>
+            <p:cNvPr id="199" name="Isosceles Triangle 198"/>
+            <p:cNvSpPr/>
+            <p:nvPr/>
+          </p:nvSpPr>
+          <p:spPr>
+            <a:xfrm>
+              <a:off x="6013091" y="1556298"/>
+              <a:ext cx="276225" cy="228600"/>
+            </a:xfrm>
+            <a:prstGeom prst="triangle">
+              <a:avLst/>
+            </a:prstGeom>
+          </p:spPr>
+          <p:style>
+            <a:lnRef idx="2">
+              <a:schemeClr val="accent2">
+                <a:shade val="50000"/>
+              </a:schemeClr>
+            </a:lnRef>
+            <a:fillRef idx="1">
+              <a:schemeClr val="accent2"/>
+            </a:fillRef>
+            <a:effectRef idx="0">
+              <a:schemeClr val="accent2"/>
+            </a:effectRef>
+            <a:fontRef idx="minor">
+              <a:schemeClr val="lt1"/>
+            </a:fontRef>
+          </p:style>
+          <p:txBody>
+            <a:bodyPr rtlCol="0" anchor="ctr"/>
+            <a:lstStyle/>
+            <a:p>
+              <a:pPr algn="ctr"/>
+              <a:endParaRPr lang="en-SG"/>
+            </a:p>
+          </p:txBody>
+        </p:sp>
+        <p:cxnSp>
+          <p:nvCxnSpPr>
+            <p:cNvPr id="201" name="Elbow Connector 200"/>
+            <p:cNvCxnSpPr>
+              <a:stCxn id="199" idx="3"/>
+            </p:cNvCxnSpPr>
+            <p:nvPr/>
+          </p:nvCxnSpPr>
+          <p:spPr>
+            <a:xfrm rot="5400000">
+              <a:off x="5967310" y="1968792"/>
+              <a:ext cx="367789" cy="1"/>
+            </a:xfrm>
+            <a:prstGeom prst="bentConnector3">
+              <a:avLst/>
+            </a:prstGeom>
+          </p:spPr>
+          <p:style>
+            <a:lnRef idx="2">
+              <a:schemeClr val="accent2">
+                <a:shade val="50000"/>
+              </a:schemeClr>
+            </a:lnRef>
+            <a:fillRef idx="1">
+              <a:schemeClr val="accent2"/>
+            </a:fillRef>
+            <a:effectRef idx="0">
+              <a:schemeClr val="accent2"/>
+            </a:effectRef>
+            <a:fontRef idx="minor">
+              <a:schemeClr val="lt1"/>
+            </a:fontRef>
+          </p:style>
+        </p:cxnSp>
+        <p:grpSp>
+          <p:nvGrpSpPr>
+            <p:cNvPr id="8" name="Group 7"/>
+            <p:cNvGrpSpPr/>
+            <p:nvPr/>
+          </p:nvGrpSpPr>
+          <p:grpSpPr>
+            <a:xfrm>
+              <a:off x="5492923" y="2113652"/>
+              <a:ext cx="1376780" cy="481800"/>
+              <a:chOff x="2716692" y="1988128"/>
+              <a:chExt cx="1583333" cy="692591"/>
+            </a:xfrm>
+          </p:grpSpPr>
+          <p:sp>
+            <p:nvSpPr>
+              <p:cNvPr id="198" name="Rectangle 197"/>
+              <p:cNvSpPr/>
+              <p:nvPr/>
+            </p:nvSpPr>
+            <p:spPr>
+              <a:xfrm>
+                <a:off x="2716692" y="1988128"/>
+                <a:ext cx="1466850" cy="609600"/>
+              </a:xfrm>
+              <a:prstGeom prst="rect">
+                <a:avLst/>
+              </a:prstGeom>
+            </p:spPr>
+            <p:style>
+              <a:lnRef idx="2">
+                <a:schemeClr val="accent2">
+                  <a:shade val="50000"/>
+                </a:schemeClr>
+              </a:lnRef>
+              <a:fillRef idx="1">
+                <a:schemeClr val="accent2"/>
+              </a:fillRef>
+              <a:effectRef idx="0">
+                <a:schemeClr val="accent2"/>
+              </a:effectRef>
+              <a:fontRef idx="minor">
+                <a:schemeClr val="lt1"/>
+              </a:fontRef>
+            </p:style>
+            <p:txBody>
+              <a:bodyPr rtlCol="0" anchor="ctr"/>
+              <a:lstStyle/>
+              <a:p>
+                <a:pPr algn="ctr"/>
+                <a:r>
+                  <a:rPr lang="en-US" sz="1600" b="1" dirty="0" smtClean="0"/>
+                  <a:t>_</a:t>
+                </a:r>
+                <a:r>
+                  <a:rPr lang="en-US" sz="1600" b="1" dirty="0" err="1" smtClean="0"/>
+                  <a:t>xyz_Servlet</a:t>
+                </a:r>
+                <a:endParaRPr lang="en-SG" sz="1600" b="1" dirty="0"/>
+              </a:p>
+            </p:txBody>
+          </p:sp>
+          <p:sp>
+            <p:nvSpPr>
+              <p:cNvPr id="232" name="Rectangle 231"/>
+              <p:cNvSpPr/>
+              <p:nvPr/>
+            </p:nvSpPr>
+            <p:spPr>
+              <a:xfrm>
+                <a:off x="2770973" y="2030054"/>
+                <a:ext cx="1466850" cy="609600"/>
+              </a:xfrm>
+              <a:prstGeom prst="rect">
+                <a:avLst/>
+              </a:prstGeom>
+            </p:spPr>
+            <p:style>
+              <a:lnRef idx="2">
+                <a:schemeClr val="accent2">
+                  <a:shade val="50000"/>
+                </a:schemeClr>
+              </a:lnRef>
+              <a:fillRef idx="1">
+                <a:schemeClr val="accent2"/>
+              </a:fillRef>
+              <a:effectRef idx="0">
+                <a:schemeClr val="accent2"/>
+              </a:effectRef>
+              <a:fontRef idx="minor">
+                <a:schemeClr val="lt1"/>
+              </a:fontRef>
+            </p:style>
+            <p:txBody>
+              <a:bodyPr rtlCol="0" anchor="ctr"/>
+              <a:lstStyle/>
+              <a:p>
+                <a:pPr algn="ctr"/>
+                <a:r>
+                  <a:rPr lang="en-US" sz="1600" b="1" dirty="0" smtClean="0"/>
+                  <a:t>_</a:t>
+                </a:r>
+                <a:r>
+                  <a:rPr lang="en-US" sz="1600" b="1" dirty="0" err="1" smtClean="0"/>
+                  <a:t>xyz_Servlet</a:t>
+                </a:r>
+                <a:endParaRPr lang="en-SG" sz="1600" b="1" dirty="0"/>
+              </a:p>
+            </p:txBody>
+          </p:sp>
+          <p:sp>
+            <p:nvSpPr>
+              <p:cNvPr id="233" name="Rectangle 232"/>
+              <p:cNvSpPr/>
+              <p:nvPr/>
+            </p:nvSpPr>
+            <p:spPr>
+              <a:xfrm>
+                <a:off x="2833175" y="2071119"/>
+                <a:ext cx="1466850" cy="609600"/>
+              </a:xfrm>
+              <a:prstGeom prst="rect">
+                <a:avLst/>
+              </a:prstGeom>
+            </p:spPr>
+            <p:style>
+              <a:lnRef idx="2">
+                <a:schemeClr val="accent2">
+                  <a:shade val="50000"/>
+                </a:schemeClr>
+              </a:lnRef>
+              <a:fillRef idx="1">
+                <a:schemeClr val="accent2"/>
+              </a:fillRef>
+              <a:effectRef idx="0">
+                <a:schemeClr val="accent2"/>
+              </a:effectRef>
+              <a:fontRef idx="minor">
+                <a:schemeClr val="lt1"/>
+              </a:fontRef>
+            </p:style>
+            <p:txBody>
+              <a:bodyPr rtlCol="0" anchor="ctr"/>
+              <a:lstStyle/>
+              <a:p>
+                <a:pPr algn="ctr"/>
+                <a:r>
+                  <a:rPr lang="en-US" sz="1600" b="1" dirty="0" smtClean="0"/>
+                  <a:t>_</a:t>
+                </a:r>
+                <a:r>
+                  <a:rPr lang="en-US" sz="1600" b="1" dirty="0" err="1" smtClean="0"/>
+                  <a:t>xyz_Servlet</a:t>
+                </a:r>
+                <a:endParaRPr lang="en-SG" sz="1600" b="1" dirty="0"/>
+              </a:p>
+            </p:txBody>
+          </p:sp>
+        </p:grpSp>
+      </p:grpSp>
       <p:cxnSp>
         <p:nvCxnSpPr>
-          <p:cNvPr id="220" name="Elbow Connector 219"/>
-          <p:cNvCxnSpPr>
-            <a:stCxn id="211" idx="2"/>
-            <a:endCxn id="215" idx="1"/>
-          </p:cNvCxnSpPr>
+          <p:cNvPr id="66" name="Elbow Connector 65"/>
+          <p:cNvCxnSpPr/>
           <p:nvPr/>
         </p:nvCxnSpPr>
         <p:spPr>
-          <a:xfrm rot="16200000" flipH="1">
-            <a:off x="1833983" y="3002229"/>
-            <a:ext cx="245335" cy="2247900"/>
-          </a:xfrm>
-          <a:prstGeom prst="bentConnector2">
-            <a:avLst/>
-          </a:prstGeom>
-          <a:ln>
-            <a:solidFill>
-              <a:schemeClr val="tx1"/>
-            </a:solidFill>
-            <a:prstDash val="dash"/>
-            <a:tailEnd type="arrow"/>
-          </a:ln>
-        </p:spPr>
-        <p:style>
-          <a:lnRef idx="2">
-            <a:schemeClr val="accent4">
-              <a:shade val="50000"/>
-            </a:schemeClr>
-          </a:lnRef>
-          <a:fillRef idx="1">
-            <a:schemeClr val="accent4"/>
-          </a:fillRef>
-          <a:effectRef idx="0">
-            <a:schemeClr val="accent4"/>
-          </a:effectRef>
-          <a:fontRef idx="minor">
-            <a:schemeClr val="lt1"/>
-          </a:fontRef>
-        </p:style>
-      </p:cxnSp>
-      <p:cxnSp>
-        <p:nvCxnSpPr>
-          <p:cNvPr id="221" name="Elbow Connector 220"/>
-          <p:cNvCxnSpPr>
-            <a:stCxn id="211" idx="2"/>
-            <a:endCxn id="219" idx="1"/>
-          </p:cNvCxnSpPr>
-          <p:nvPr/>
-        </p:nvCxnSpPr>
-        <p:spPr>
-          <a:xfrm rot="16200000" flipH="1">
-            <a:off x="1443902" y="3392309"/>
-            <a:ext cx="954280" cy="2176685"/>
-          </a:xfrm>
-          <a:prstGeom prst="bentConnector2">
-            <a:avLst/>
-          </a:prstGeom>
-          <a:ln>
-            <a:solidFill>
-              <a:schemeClr val="tx1"/>
-            </a:solidFill>
-            <a:prstDash val="dash"/>
-            <a:tailEnd type="arrow"/>
-          </a:ln>
-        </p:spPr>
-        <p:style>
-          <a:lnRef idx="2">
-            <a:schemeClr val="accent4">
-              <a:shade val="50000"/>
-            </a:schemeClr>
-          </a:lnRef>
-          <a:fillRef idx="1">
-            <a:schemeClr val="accent4"/>
-          </a:fillRef>
-          <a:effectRef idx="0">
-            <a:schemeClr val="accent4"/>
-          </a:effectRef>
-          <a:fontRef idx="minor">
-            <a:schemeClr val="lt1"/>
-          </a:fontRef>
-        </p:style>
-      </p:cxnSp>
-      <p:sp>
-        <p:nvSpPr>
-          <p:cNvPr id="222" name="Folded Corner 221"/>
-          <p:cNvSpPr/>
-          <p:nvPr/>
-        </p:nvSpPr>
-        <p:spPr>
-          <a:xfrm>
-            <a:off x="5528526" y="3684109"/>
-            <a:ext cx="1466850" cy="609600"/>
-          </a:xfrm>
-          <a:prstGeom prst="foldedCorner">
-            <a:avLst/>
-          </a:prstGeom>
-        </p:spPr>
-        <p:style>
-          <a:lnRef idx="2">
-            <a:schemeClr val="accent4">
-              <a:shade val="50000"/>
-            </a:schemeClr>
-          </a:lnRef>
-          <a:fillRef idx="1">
-            <a:schemeClr val="accent4"/>
-          </a:fillRef>
-          <a:effectRef idx="0">
-            <a:schemeClr val="accent4"/>
-          </a:effectRef>
-          <a:fontRef idx="minor">
-            <a:schemeClr val="lt1"/>
-          </a:fontRef>
-        </p:style>
-        <p:txBody>
-          <a:bodyPr rtlCol="0" anchor="ctr"/>
-          <a:lstStyle/>
-          <a:p>
-            <a:pPr algn="ctr"/>
-            <a:r>
-              <a:rPr lang="en-US" sz="1600" b="1" dirty="0" smtClean="0"/>
-              <a:t>_xyz_.</a:t>
-            </a:r>
-            <a:r>
-              <a:rPr lang="en-US" sz="1600" b="1" dirty="0" err="1" smtClean="0"/>
-              <a:t>jsp</a:t>
-            </a:r>
-            <a:endParaRPr lang="en-SG" sz="1600" b="1" dirty="0"/>
-          </a:p>
-        </p:txBody>
-      </p:sp>
-      <p:sp>
-        <p:nvSpPr>
-          <p:cNvPr id="223" name="Folded Corner 222"/>
-          <p:cNvSpPr/>
-          <p:nvPr/>
-        </p:nvSpPr>
-        <p:spPr>
-          <a:xfrm>
-            <a:off x="5606860" y="3738592"/>
-            <a:ext cx="1466850" cy="609600"/>
-          </a:xfrm>
-          <a:prstGeom prst="foldedCorner">
-            <a:avLst/>
-          </a:prstGeom>
-        </p:spPr>
-        <p:style>
-          <a:lnRef idx="2">
-            <a:schemeClr val="accent4">
-              <a:shade val="50000"/>
-            </a:schemeClr>
-          </a:lnRef>
-          <a:fillRef idx="1">
-            <a:schemeClr val="accent4"/>
-          </a:fillRef>
-          <a:effectRef idx="0">
-            <a:schemeClr val="accent4"/>
-          </a:effectRef>
-          <a:fontRef idx="minor">
-            <a:schemeClr val="lt1"/>
-          </a:fontRef>
-        </p:style>
-        <p:txBody>
-          <a:bodyPr rtlCol="0" anchor="ctr"/>
-          <a:lstStyle/>
-          <a:p>
-            <a:pPr algn="ctr"/>
-            <a:r>
-              <a:rPr lang="en-US" sz="1600" b="1" dirty="0" smtClean="0"/>
-              <a:t>_xyz_.</a:t>
-            </a:r>
-            <a:r>
-              <a:rPr lang="en-US" sz="1600" b="1" dirty="0" err="1" smtClean="0"/>
-              <a:t>jsp</a:t>
-            </a:r>
-            <a:endParaRPr lang="en-SG" sz="1600" b="1" dirty="0"/>
-          </a:p>
-        </p:txBody>
-      </p:sp>
-      <p:cxnSp>
-        <p:nvCxnSpPr>
-          <p:cNvPr id="224" name="Elbow Connector 223"/>
-          <p:cNvCxnSpPr>
-            <a:stCxn id="197" idx="3"/>
-            <a:endCxn id="202" idx="1"/>
-          </p:cNvCxnSpPr>
-          <p:nvPr/>
-        </p:nvCxnSpPr>
-        <p:spPr>
-          <a:xfrm flipV="1">
-            <a:off x="4774092" y="1445535"/>
-            <a:ext cx="706809" cy="2071"/>
+          <a:xfrm rot="10800000">
+            <a:off x="4492298" y="1925985"/>
+            <a:ext cx="846337" cy="1"/>
           </a:xfrm>
           <a:prstGeom prst="bentConnector3">
             <a:avLst>
@@ -5380,25 +6065,29 @@
       </p:cxnSp>
       <p:cxnSp>
         <p:nvCxnSpPr>
-          <p:cNvPr id="225" name="Elbow Connector 224"/>
-          <p:cNvCxnSpPr/>
+          <p:cNvPr id="106" name="Elbow Connector 105"/>
+          <p:cNvCxnSpPr>
+            <a:stCxn id="141" idx="3"/>
+          </p:cNvCxnSpPr>
           <p:nvPr/>
         </p:nvCxnSpPr>
         <p:spPr>
           <a:xfrm flipV="1">
-            <a:off x="3080600" y="1127919"/>
-            <a:ext cx="4800600" cy="860210"/>
+            <a:off x="7131951" y="1838517"/>
+            <a:ext cx="749249" cy="1362"/>
           </a:xfrm>
           <a:prstGeom prst="bentConnector3">
             <a:avLst>
-              <a:gd name="adj1" fmla="val -244"/>
+              <a:gd name="adj1" fmla="val 50000"/>
             </a:avLst>
           </a:prstGeom>
           <a:ln w="38100">
             <a:solidFill>
-              <a:schemeClr val="tx1"/>
+              <a:schemeClr val="accent2">
+                <a:lumMod val="75000"/>
+              </a:schemeClr>
             </a:solidFill>
-            <a:prstDash val="sysDash"/>
+            <a:prstDash val="sysDot"/>
             <a:tailEnd type="arrow"/>
           </a:ln>
         </p:spPr>
@@ -5417,349 +6106,6 @@
           </a:fontRef>
         </p:style>
       </p:cxnSp>
-      <p:sp>
-        <p:nvSpPr>
-          <p:cNvPr id="226" name="Rounded Rectangle 225"/>
-          <p:cNvSpPr/>
-          <p:nvPr/>
-        </p:nvSpPr>
-        <p:spPr>
-          <a:xfrm>
-            <a:off x="7881200" y="114387"/>
-            <a:ext cx="914400" cy="5525997"/>
-          </a:xfrm>
-          <a:prstGeom prst="roundRect">
-            <a:avLst>
-              <a:gd name="adj" fmla="val 23209"/>
-            </a:avLst>
-          </a:prstGeom>
-          <a:solidFill>
-            <a:schemeClr val="bg1">
-              <a:lumMod val="85000"/>
-            </a:schemeClr>
-          </a:solidFill>
-          <a:ln>
-            <a:solidFill>
-              <a:schemeClr val="bg1">
-                <a:lumMod val="75000"/>
-              </a:schemeClr>
-            </a:solidFill>
-          </a:ln>
-        </p:spPr>
-        <p:style>
-          <a:lnRef idx="2">
-            <a:schemeClr val="accent1">
-              <a:shade val="50000"/>
-            </a:schemeClr>
-          </a:lnRef>
-          <a:fillRef idx="1">
-            <a:schemeClr val="accent1"/>
-          </a:fillRef>
-          <a:effectRef idx="0">
-            <a:schemeClr val="accent1"/>
-          </a:effectRef>
-          <a:fontRef idx="minor">
-            <a:schemeClr val="lt1"/>
-          </a:fontRef>
-        </p:style>
-        <p:txBody>
-          <a:bodyPr vert="vert270" rtlCol="0" anchor="t" anchorCtr="1"/>
-          <a:lstStyle/>
-          <a:p>
-            <a:pPr algn="r"/>
-            <a:r>
-              <a:rPr lang="en-US" sz="1600" b="1" dirty="0" smtClean="0"/>
-              <a:t>Logic</a:t>
-            </a:r>
-            <a:endParaRPr lang="en-SG" sz="1600" b="1" dirty="0"/>
-          </a:p>
-        </p:txBody>
-      </p:sp>
-      <p:sp>
-        <p:nvSpPr>
-          <p:cNvPr id="227" name="Rectangle 226"/>
-          <p:cNvSpPr/>
-          <p:nvPr/>
-        </p:nvSpPr>
-        <p:spPr>
-          <a:xfrm>
-            <a:off x="8338400" y="-36513"/>
-            <a:ext cx="609600" cy="5867400"/>
-          </a:xfrm>
-          <a:prstGeom prst="rect">
-            <a:avLst/>
-          </a:prstGeom>
-          <a:solidFill>
-            <a:schemeClr val="bg1"/>
-          </a:solidFill>
-          <a:ln>
-            <a:noFill/>
-          </a:ln>
-          <a:effectLst>
-            <a:softEdge rad="63500"/>
-          </a:effectLst>
-        </p:spPr>
-        <p:style>
-          <a:lnRef idx="2">
-            <a:schemeClr val="accent1">
-              <a:shade val="50000"/>
-            </a:schemeClr>
-          </a:lnRef>
-          <a:fillRef idx="1">
-            <a:schemeClr val="accent1"/>
-          </a:fillRef>
-          <a:effectRef idx="0">
-            <a:schemeClr val="accent1"/>
-          </a:effectRef>
-          <a:fontRef idx="minor">
-            <a:schemeClr val="lt1"/>
-          </a:fontRef>
-        </p:style>
-        <p:txBody>
-          <a:bodyPr rtlCol="0" anchor="ctr"/>
-          <a:lstStyle/>
-          <a:p>
-            <a:pPr algn="ctr"/>
-            <a:endParaRPr lang="en-SG"/>
-          </a:p>
-        </p:txBody>
-      </p:sp>
-      <p:sp>
-        <p:nvSpPr>
-          <p:cNvPr id="230" name="Rectangle 229"/>
-          <p:cNvSpPr/>
-          <p:nvPr/>
-        </p:nvSpPr>
-        <p:spPr>
-          <a:xfrm>
-            <a:off x="2702894" y="594519"/>
-            <a:ext cx="1466850" cy="377438"/>
-          </a:xfrm>
-          <a:prstGeom prst="rect">
-            <a:avLst/>
-          </a:prstGeom>
-        </p:spPr>
-        <p:style>
-          <a:lnRef idx="2">
-            <a:schemeClr val="accent1">
-              <a:shade val="50000"/>
-            </a:schemeClr>
-          </a:lnRef>
-          <a:fillRef idx="1">
-            <a:schemeClr val="accent1"/>
-          </a:fillRef>
-          <a:effectRef idx="0">
-            <a:schemeClr val="accent1"/>
-          </a:effectRef>
-          <a:fontRef idx="minor">
-            <a:schemeClr val="lt1"/>
-          </a:fontRef>
-        </p:style>
-        <p:txBody>
-          <a:bodyPr rtlCol="0" anchor="ctr"/>
-          <a:lstStyle/>
-          <a:p>
-            <a:pPr algn="ctr"/>
-            <a:r>
-              <a:rPr lang="en-US" sz="1600" b="1" dirty="0" err="1" smtClean="0"/>
-              <a:t>LoginFilter</a:t>
-            </a:r>
-            <a:endParaRPr lang="en-SG" sz="1600" b="1" dirty="0"/>
-          </a:p>
-        </p:txBody>
-      </p:sp>
-      <p:sp>
-        <p:nvSpPr>
-          <p:cNvPr id="232" name="Rectangle 231"/>
-          <p:cNvSpPr/>
-          <p:nvPr/>
-        </p:nvSpPr>
-        <p:spPr>
-          <a:xfrm>
-            <a:off x="2770973" y="2030054"/>
-            <a:ext cx="1466850" cy="609600"/>
-          </a:xfrm>
-          <a:prstGeom prst="rect">
-            <a:avLst/>
-          </a:prstGeom>
-        </p:spPr>
-        <p:style>
-          <a:lnRef idx="2">
-            <a:schemeClr val="accent2">
-              <a:shade val="50000"/>
-            </a:schemeClr>
-          </a:lnRef>
-          <a:fillRef idx="1">
-            <a:schemeClr val="accent2"/>
-          </a:fillRef>
-          <a:effectRef idx="0">
-            <a:schemeClr val="accent2"/>
-          </a:effectRef>
-          <a:fontRef idx="minor">
-            <a:schemeClr val="lt1"/>
-          </a:fontRef>
-        </p:style>
-        <p:txBody>
-          <a:bodyPr rtlCol="0" anchor="ctr"/>
-          <a:lstStyle/>
-          <a:p>
-            <a:pPr algn="ctr"/>
-            <a:r>
-              <a:rPr lang="en-US" sz="1600" b="1" dirty="0" smtClean="0"/>
-              <a:t>_</a:t>
-            </a:r>
-            <a:r>
-              <a:rPr lang="en-US" sz="1600" b="1" dirty="0" err="1" smtClean="0"/>
-              <a:t>xyz_Servlet</a:t>
-            </a:r>
-            <a:endParaRPr lang="en-SG" sz="1600" b="1" dirty="0"/>
-          </a:p>
-        </p:txBody>
-      </p:sp>
-      <p:sp>
-        <p:nvSpPr>
-          <p:cNvPr id="233" name="Rectangle 232"/>
-          <p:cNvSpPr/>
-          <p:nvPr/>
-        </p:nvSpPr>
-        <p:spPr>
-          <a:xfrm>
-            <a:off x="2833175" y="2071119"/>
-            <a:ext cx="1466850" cy="609600"/>
-          </a:xfrm>
-          <a:prstGeom prst="rect">
-            <a:avLst/>
-          </a:prstGeom>
-        </p:spPr>
-        <p:style>
-          <a:lnRef idx="2">
-            <a:schemeClr val="accent2">
-              <a:shade val="50000"/>
-            </a:schemeClr>
-          </a:lnRef>
-          <a:fillRef idx="1">
-            <a:schemeClr val="accent2"/>
-          </a:fillRef>
-          <a:effectRef idx="0">
-            <a:schemeClr val="accent2"/>
-          </a:effectRef>
-          <a:fontRef idx="minor">
-            <a:schemeClr val="lt1"/>
-          </a:fontRef>
-        </p:style>
-        <p:txBody>
-          <a:bodyPr rtlCol="0" anchor="ctr"/>
-          <a:lstStyle/>
-          <a:p>
-            <a:pPr algn="ctr"/>
-            <a:r>
-              <a:rPr lang="en-US" sz="1600" b="1" dirty="0" smtClean="0"/>
-              <a:t>_</a:t>
-            </a:r>
-            <a:r>
-              <a:rPr lang="en-US" sz="1600" b="1" dirty="0" err="1" smtClean="0"/>
-              <a:t>xyz_Servlet</a:t>
-            </a:r>
-            <a:endParaRPr lang="en-SG" sz="1600" b="1" dirty="0"/>
-          </a:p>
-        </p:txBody>
-      </p:sp>
-      <p:sp>
-        <p:nvSpPr>
-          <p:cNvPr id="237" name="Rectangle 236"/>
-          <p:cNvSpPr/>
-          <p:nvPr/>
-        </p:nvSpPr>
-        <p:spPr>
-          <a:xfrm>
-            <a:off x="5526281" y="2022345"/>
-            <a:ext cx="1466850" cy="609600"/>
-          </a:xfrm>
-          <a:prstGeom prst="rect">
-            <a:avLst/>
-          </a:prstGeom>
-        </p:spPr>
-        <p:style>
-          <a:lnRef idx="2">
-            <a:schemeClr val="accent6">
-              <a:shade val="50000"/>
-            </a:schemeClr>
-          </a:lnRef>
-          <a:fillRef idx="1">
-            <a:schemeClr val="accent6"/>
-          </a:fillRef>
-          <a:effectRef idx="0">
-            <a:schemeClr val="accent6"/>
-          </a:effectRef>
-          <a:fontRef idx="minor">
-            <a:schemeClr val="lt1"/>
-          </a:fontRef>
-        </p:style>
-        <p:txBody>
-          <a:bodyPr rtlCol="0" anchor="ctr"/>
-          <a:lstStyle/>
-          <a:p>
-            <a:pPr algn="ctr"/>
-            <a:r>
-              <a:rPr lang="en-US" sz="1600" b="1" dirty="0" smtClean="0"/>
-              <a:t>_</a:t>
-            </a:r>
-            <a:r>
-              <a:rPr lang="en-US" sz="1600" b="1" dirty="0" err="1" smtClean="0"/>
-              <a:t>xyz_Helper</a:t>
-            </a:r>
-            <a:endParaRPr lang="en-SG" sz="1600" b="1" dirty="0"/>
-          </a:p>
-        </p:txBody>
-      </p:sp>
-      <p:sp>
-        <p:nvSpPr>
-          <p:cNvPr id="238" name="Rectangle 237"/>
-          <p:cNvSpPr/>
-          <p:nvPr/>
-        </p:nvSpPr>
-        <p:spPr>
-          <a:xfrm>
-            <a:off x="5604235" y="2065429"/>
-            <a:ext cx="1466850" cy="609600"/>
-          </a:xfrm>
-          <a:prstGeom prst="rect">
-            <a:avLst/>
-          </a:prstGeom>
-        </p:spPr>
-        <p:style>
-          <a:lnRef idx="2">
-            <a:schemeClr val="accent6">
-              <a:shade val="50000"/>
-            </a:schemeClr>
-          </a:lnRef>
-          <a:fillRef idx="1">
-            <a:schemeClr val="accent6"/>
-          </a:fillRef>
-          <a:effectRef idx="0">
-            <a:schemeClr val="accent6"/>
-          </a:effectRef>
-          <a:fontRef idx="minor">
-            <a:schemeClr val="lt1"/>
-          </a:fontRef>
-        </p:style>
-        <p:txBody>
-          <a:bodyPr rtlCol="0" anchor="ctr"/>
-          <a:lstStyle/>
-          <a:p>
-            <a:pPr algn="ctr"/>
-            <a:r>
-              <a:rPr lang="en-US" sz="1600" b="1" dirty="0" smtClean="0"/>
-              <a:t>_</a:t>
-            </a:r>
-            <a:r>
-              <a:rPr lang="en-US" sz="1600" b="1" dirty="0" err="1" smtClean="0"/>
-              <a:t>xyz_Helper</a:t>
-            </a:r>
-            <a:endParaRPr lang="en-SG" sz="1600" b="1" dirty="0"/>
-          </a:p>
-        </p:txBody>
-      </p:sp>
     </p:spTree>
     <p:extLst>
       <p:ext uri="{BB962C8B-B14F-4D97-AF65-F5344CB8AC3E}">

</xml_diff>

<commit_message>
Starting Issue 328 [Devman - add info on how to revert a merge if tests fail] Update Issue 328
</commit_message>
<xml_diff>
--- a/doc/diagrams/UiComponent.pptx
+++ b/doc/diagrams/UiComponent.pptx
@@ -192,7 +192,7 @@
           <a:p>
             <a:fld id="{DC50A2AC-D691-437C-A69B-81ECFE08AD4B}" type="datetimeFigureOut">
               <a:rPr lang="en-SG" smtClean="0"/>
-              <a:t>13/7/2012</a:t>
+              <a:t>1/10/2012</a:t>
             </a:fld>
             <a:endParaRPr lang="en-SG"/>
           </a:p>
@@ -731,7 +731,7 @@
             <a:fld id="{1D8BD707-D9CF-40AE-B4C6-C98DA3205C09}" type="datetimeFigureOut">
               <a:rPr lang="en-US" smtClean="0"/>
               <a:pPr/>
-              <a:t>7/13/2012</a:t>
+              <a:t>10/1/2012</a:t>
             </a:fld>
             <a:endParaRPr lang="en-US"/>
           </a:p>
@@ -898,7 +898,7 @@
             <a:fld id="{1D8BD707-D9CF-40AE-B4C6-C98DA3205C09}" type="datetimeFigureOut">
               <a:rPr lang="en-US" smtClean="0"/>
               <a:pPr/>
-              <a:t>7/13/2012</a:t>
+              <a:t>10/1/2012</a:t>
             </a:fld>
             <a:endParaRPr lang="en-US"/>
           </a:p>
@@ -1075,7 +1075,7 @@
             <a:fld id="{1D8BD707-D9CF-40AE-B4C6-C98DA3205C09}" type="datetimeFigureOut">
               <a:rPr lang="en-US" smtClean="0"/>
               <a:pPr/>
-              <a:t>7/13/2012</a:t>
+              <a:t>10/1/2012</a:t>
             </a:fld>
             <a:endParaRPr lang="en-US"/>
           </a:p>
@@ -1242,7 +1242,7 @@
             <a:fld id="{1D8BD707-D9CF-40AE-B4C6-C98DA3205C09}" type="datetimeFigureOut">
               <a:rPr lang="en-US" smtClean="0"/>
               <a:pPr/>
-              <a:t>7/13/2012</a:t>
+              <a:t>10/1/2012</a:t>
             </a:fld>
             <a:endParaRPr lang="en-US"/>
           </a:p>
@@ -1485,7 +1485,7 @@
             <a:fld id="{1D8BD707-D9CF-40AE-B4C6-C98DA3205C09}" type="datetimeFigureOut">
               <a:rPr lang="en-US" smtClean="0"/>
               <a:pPr/>
-              <a:t>7/13/2012</a:t>
+              <a:t>10/1/2012</a:t>
             </a:fld>
             <a:endParaRPr lang="en-US"/>
           </a:p>
@@ -1770,7 +1770,7 @@
             <a:fld id="{1D8BD707-D9CF-40AE-B4C6-C98DA3205C09}" type="datetimeFigureOut">
               <a:rPr lang="en-US" smtClean="0"/>
               <a:pPr/>
-              <a:t>7/13/2012</a:t>
+              <a:t>10/1/2012</a:t>
             </a:fld>
             <a:endParaRPr lang="en-US"/>
           </a:p>
@@ -2189,7 +2189,7 @@
             <a:fld id="{1D8BD707-D9CF-40AE-B4C6-C98DA3205C09}" type="datetimeFigureOut">
               <a:rPr lang="en-US" smtClean="0"/>
               <a:pPr/>
-              <a:t>7/13/2012</a:t>
+              <a:t>10/1/2012</a:t>
             </a:fld>
             <a:endParaRPr lang="en-US"/>
           </a:p>
@@ -2304,7 +2304,7 @@
             <a:fld id="{1D8BD707-D9CF-40AE-B4C6-C98DA3205C09}" type="datetimeFigureOut">
               <a:rPr lang="en-US" smtClean="0"/>
               <a:pPr/>
-              <a:t>7/13/2012</a:t>
+              <a:t>10/1/2012</a:t>
             </a:fld>
             <a:endParaRPr lang="en-US"/>
           </a:p>
@@ -2396,7 +2396,7 @@
             <a:fld id="{1D8BD707-D9CF-40AE-B4C6-C98DA3205C09}" type="datetimeFigureOut">
               <a:rPr lang="en-US" smtClean="0"/>
               <a:pPr/>
-              <a:t>7/13/2012</a:t>
+              <a:t>10/1/2012</a:t>
             </a:fld>
             <a:endParaRPr lang="en-US"/>
           </a:p>
@@ -2670,7 +2670,7 @@
             <a:fld id="{1D8BD707-D9CF-40AE-B4C6-C98DA3205C09}" type="datetimeFigureOut">
               <a:rPr lang="en-US" smtClean="0"/>
               <a:pPr/>
-              <a:t>7/13/2012</a:t>
+              <a:t>10/1/2012</a:t>
             </a:fld>
             <a:endParaRPr lang="en-US"/>
           </a:p>
@@ -2920,7 +2920,7 @@
             <a:fld id="{1D8BD707-D9CF-40AE-B4C6-C98DA3205C09}" type="datetimeFigureOut">
               <a:rPr lang="en-US" smtClean="0"/>
               <a:pPr/>
-              <a:t>7/13/2012</a:t>
+              <a:t>10/1/2012</a:t>
             </a:fld>
             <a:endParaRPr lang="en-US"/>
           </a:p>
@@ -3130,7 +3130,7 @@
             <a:fld id="{1D8BD707-D9CF-40AE-B4C6-C98DA3205C09}" type="datetimeFigureOut">
               <a:rPr lang="en-US" smtClean="0"/>
               <a:pPr/>
-              <a:t>7/13/2012</a:t>
+              <a:t>10/1/2012</a:t>
             </a:fld>
             <a:endParaRPr lang="en-US"/>
           </a:p>
@@ -3674,7 +3674,7 @@
             <a:bodyPr rtlCol="0" anchor="t" anchorCtr="0"/>
             <a:lstStyle/>
             <a:p>
-              <a:pPr algn="r"/>
+              <a:pPr algn="ctr"/>
               <a:r>
                 <a:rPr lang="en-US" sz="1400" b="1" dirty="0" err="1" smtClean="0">
                   <a:solidFill>
@@ -3813,7 +3813,7 @@
             <a:bodyPr rtlCol="0" anchor="t" anchorCtr="0"/>
             <a:lstStyle/>
             <a:p>
-              <a:pPr algn="r"/>
+              <a:pPr algn="ctr"/>
               <a:r>
                 <a:rPr lang="en-US" sz="1400" b="1" dirty="0" smtClean="0">
                   <a:solidFill>
@@ -3899,21 +3899,515 @@
           </p:txBody>
         </p:sp>
       </p:grpSp>
+      <p:sp>
+        <p:nvSpPr>
+          <p:cNvPr id="197" name="Rectangle 196"/>
+          <p:cNvSpPr/>
+          <p:nvPr/>
+        </p:nvSpPr>
+        <p:spPr>
+          <a:xfrm>
+            <a:off x="2796381" y="1258887"/>
+            <a:ext cx="1466850" cy="377438"/>
+          </a:xfrm>
+          <a:prstGeom prst="rect">
+            <a:avLst/>
+          </a:prstGeom>
+        </p:spPr>
+        <p:style>
+          <a:lnRef idx="2">
+            <a:schemeClr val="accent2">
+              <a:shade val="50000"/>
+            </a:schemeClr>
+          </a:lnRef>
+          <a:fillRef idx="1">
+            <a:schemeClr val="accent2"/>
+          </a:fillRef>
+          <a:effectRef idx="0">
+            <a:schemeClr val="accent2"/>
+          </a:effectRef>
+          <a:fontRef idx="minor">
+            <a:schemeClr val="lt1"/>
+          </a:fontRef>
+        </p:style>
+        <p:txBody>
+          <a:bodyPr rtlCol="0" anchor="ctr"/>
+          <a:lstStyle/>
+          <a:p>
+            <a:pPr algn="ctr"/>
+            <a:r>
+              <a:rPr lang="en-US" sz="1600" b="1" dirty="0" err="1" smtClean="0"/>
+              <a:t>ActionServlet</a:t>
+            </a:r>
+            <a:endParaRPr lang="en-SG" sz="1600" b="1" dirty="0"/>
+          </a:p>
+        </p:txBody>
+      </p:sp>
+      <p:sp>
+        <p:nvSpPr>
+          <p:cNvPr id="198" name="Rectangle 197"/>
+          <p:cNvSpPr/>
+          <p:nvPr/>
+        </p:nvSpPr>
+        <p:spPr>
+          <a:xfrm>
+            <a:off x="2716692" y="1988128"/>
+            <a:ext cx="1466850" cy="609600"/>
+          </a:xfrm>
+          <a:prstGeom prst="rect">
+            <a:avLst/>
+          </a:prstGeom>
+        </p:spPr>
+        <p:style>
+          <a:lnRef idx="2">
+            <a:schemeClr val="accent2">
+              <a:shade val="50000"/>
+            </a:schemeClr>
+          </a:lnRef>
+          <a:fillRef idx="1">
+            <a:schemeClr val="accent2"/>
+          </a:fillRef>
+          <a:effectRef idx="0">
+            <a:schemeClr val="accent2"/>
+          </a:effectRef>
+          <a:fontRef idx="minor">
+            <a:schemeClr val="lt1"/>
+          </a:fontRef>
+        </p:style>
+        <p:txBody>
+          <a:bodyPr rtlCol="0" anchor="ctr"/>
+          <a:lstStyle/>
+          <a:p>
+            <a:pPr algn="ctr"/>
+            <a:r>
+              <a:rPr lang="en-US" sz="1600" b="1" dirty="0" smtClean="0"/>
+              <a:t>_</a:t>
+            </a:r>
+            <a:r>
+              <a:rPr lang="en-US" sz="1600" b="1" dirty="0" err="1" smtClean="0"/>
+              <a:t>xyz_Servlet</a:t>
+            </a:r>
+            <a:endParaRPr lang="en-SG" sz="1600" b="1" dirty="0"/>
+          </a:p>
+        </p:txBody>
+      </p:sp>
+      <p:sp>
+        <p:nvSpPr>
+          <p:cNvPr id="199" name="Isosceles Triangle 198"/>
+          <p:cNvSpPr/>
+          <p:nvPr/>
+        </p:nvSpPr>
+        <p:spPr>
+          <a:xfrm>
+            <a:off x="3329781" y="1639887"/>
+            <a:ext cx="276225" cy="228600"/>
+          </a:xfrm>
+          <a:prstGeom prst="triangle">
+            <a:avLst/>
+          </a:prstGeom>
+        </p:spPr>
+        <p:style>
+          <a:lnRef idx="2">
+            <a:schemeClr val="accent2">
+              <a:shade val="50000"/>
+            </a:schemeClr>
+          </a:lnRef>
+          <a:fillRef idx="1">
+            <a:schemeClr val="accent2"/>
+          </a:fillRef>
+          <a:effectRef idx="0">
+            <a:schemeClr val="accent2"/>
+          </a:effectRef>
+          <a:fontRef idx="minor">
+            <a:schemeClr val="lt1"/>
+          </a:fontRef>
+        </p:style>
+        <p:txBody>
+          <a:bodyPr rtlCol="0" anchor="ctr"/>
+          <a:lstStyle/>
+          <a:p>
+            <a:pPr algn="ctr"/>
+            <a:endParaRPr lang="en-SG"/>
+          </a:p>
+        </p:txBody>
+      </p:sp>
+      <p:sp>
+        <p:nvSpPr>
+          <p:cNvPr id="200" name="Rectangle 199"/>
+          <p:cNvSpPr/>
+          <p:nvPr/>
+        </p:nvSpPr>
+        <p:spPr>
+          <a:xfrm>
+            <a:off x="5468615" y="1988128"/>
+            <a:ext cx="1466850" cy="609600"/>
+          </a:xfrm>
+          <a:prstGeom prst="rect">
+            <a:avLst/>
+          </a:prstGeom>
+          <a:solidFill>
+            <a:srgbClr val="92D050"/>
+          </a:solidFill>
+          <a:ln>
+            <a:solidFill>
+              <a:srgbClr val="00B050"/>
+            </a:solidFill>
+          </a:ln>
+        </p:spPr>
+        <p:style>
+          <a:lnRef idx="2">
+            <a:schemeClr val="accent6">
+              <a:shade val="50000"/>
+            </a:schemeClr>
+          </a:lnRef>
+          <a:fillRef idx="1">
+            <a:schemeClr val="accent6"/>
+          </a:fillRef>
+          <a:effectRef idx="0">
+            <a:schemeClr val="accent6"/>
+          </a:effectRef>
+          <a:fontRef idx="minor">
+            <a:schemeClr val="lt1"/>
+          </a:fontRef>
+        </p:style>
+        <p:txBody>
+          <a:bodyPr rtlCol="0" anchor="ctr"/>
+          <a:lstStyle/>
+          <a:p>
+            <a:pPr algn="ctr"/>
+            <a:r>
+              <a:rPr lang="en-US" sz="1600" b="1" dirty="0" smtClean="0"/>
+              <a:t>_</a:t>
+            </a:r>
+            <a:r>
+              <a:rPr lang="en-US" sz="1600" b="1" dirty="0" err="1" smtClean="0"/>
+              <a:t>xyz_Helper</a:t>
+            </a:r>
+            <a:endParaRPr lang="en-SG" sz="1600" b="1" dirty="0"/>
+          </a:p>
+        </p:txBody>
+      </p:sp>
+      <p:cxnSp>
+        <p:nvCxnSpPr>
+          <p:cNvPr id="201" name="Elbow Connector 200"/>
+          <p:cNvCxnSpPr>
+            <a:stCxn id="199" idx="3"/>
+          </p:cNvCxnSpPr>
+          <p:nvPr/>
+        </p:nvCxnSpPr>
+        <p:spPr>
+          <a:xfrm rot="16200000" flipH="1">
+            <a:off x="3401231" y="1935150"/>
+            <a:ext cx="134239" cy="912"/>
+          </a:xfrm>
+          <a:prstGeom prst="bentConnector3">
+            <a:avLst/>
+          </a:prstGeom>
+        </p:spPr>
+        <p:style>
+          <a:lnRef idx="2">
+            <a:schemeClr val="accent2">
+              <a:shade val="50000"/>
+            </a:schemeClr>
+          </a:lnRef>
+          <a:fillRef idx="1">
+            <a:schemeClr val="accent2"/>
+          </a:fillRef>
+          <a:effectRef idx="0">
+            <a:schemeClr val="accent2"/>
+          </a:effectRef>
+          <a:fontRef idx="minor">
+            <a:schemeClr val="lt1"/>
+          </a:fontRef>
+        </p:style>
+      </p:cxnSp>
+      <p:sp>
+        <p:nvSpPr>
+          <p:cNvPr id="202" name="Rectangle 201"/>
+          <p:cNvSpPr/>
+          <p:nvPr/>
+        </p:nvSpPr>
+        <p:spPr>
+          <a:xfrm>
+            <a:off x="5480901" y="1258887"/>
+            <a:ext cx="1454388" cy="373296"/>
+          </a:xfrm>
+          <a:prstGeom prst="rect">
+            <a:avLst/>
+          </a:prstGeom>
+          <a:solidFill>
+            <a:srgbClr val="92D050"/>
+          </a:solidFill>
+          <a:ln>
+            <a:solidFill>
+              <a:srgbClr val="00B050"/>
+            </a:solidFill>
+          </a:ln>
+        </p:spPr>
+        <p:style>
+          <a:lnRef idx="2">
+            <a:schemeClr val="accent6">
+              <a:shade val="50000"/>
+            </a:schemeClr>
+          </a:lnRef>
+          <a:fillRef idx="1">
+            <a:schemeClr val="accent6"/>
+          </a:fillRef>
+          <a:effectRef idx="0">
+            <a:schemeClr val="accent6"/>
+          </a:effectRef>
+          <a:fontRef idx="minor">
+            <a:schemeClr val="lt1"/>
+          </a:fontRef>
+        </p:style>
+        <p:txBody>
+          <a:bodyPr rtlCol="0" anchor="ctr"/>
+          <a:lstStyle/>
+          <a:p>
+            <a:pPr algn="ctr"/>
+            <a:r>
+              <a:rPr lang="en-US" sz="1600" b="1" dirty="0" smtClean="0"/>
+              <a:t>Helper</a:t>
+            </a:r>
+            <a:endParaRPr lang="en-SG" sz="1600" b="1" dirty="0"/>
+          </a:p>
+        </p:txBody>
+      </p:sp>
+      <p:sp>
+        <p:nvSpPr>
+          <p:cNvPr id="203" name="Isosceles Triangle 202"/>
+          <p:cNvSpPr/>
+          <p:nvPr/>
+        </p:nvSpPr>
+        <p:spPr>
+          <a:xfrm>
+            <a:off x="6061435" y="1620902"/>
+            <a:ext cx="276225" cy="228600"/>
+          </a:xfrm>
+          <a:prstGeom prst="triangle">
+            <a:avLst/>
+          </a:prstGeom>
+          <a:solidFill>
+            <a:srgbClr val="92D050"/>
+          </a:solidFill>
+          <a:ln>
+            <a:solidFill>
+              <a:srgbClr val="00B050"/>
+            </a:solidFill>
+          </a:ln>
+        </p:spPr>
+        <p:style>
+          <a:lnRef idx="2">
+            <a:schemeClr val="accent6">
+              <a:shade val="50000"/>
+            </a:schemeClr>
+          </a:lnRef>
+          <a:fillRef idx="1">
+            <a:schemeClr val="accent6"/>
+          </a:fillRef>
+          <a:effectRef idx="0">
+            <a:schemeClr val="accent6"/>
+          </a:effectRef>
+          <a:fontRef idx="minor">
+            <a:schemeClr val="lt1"/>
+          </a:fontRef>
+        </p:style>
+        <p:txBody>
+          <a:bodyPr rtlCol="0" anchor="ctr"/>
+          <a:lstStyle/>
+          <a:p>
+            <a:pPr algn="ctr"/>
+            <a:endParaRPr lang="en-SG"/>
+          </a:p>
+        </p:txBody>
+      </p:sp>
+      <p:cxnSp>
+        <p:nvCxnSpPr>
+          <p:cNvPr id="204" name="Elbow Connector 203"/>
+          <p:cNvCxnSpPr>
+            <a:stCxn id="203" idx="3"/>
+            <a:endCxn id="200" idx="0"/>
+          </p:cNvCxnSpPr>
+          <p:nvPr/>
+        </p:nvCxnSpPr>
+        <p:spPr>
+          <a:xfrm rot="16200000" flipH="1">
+            <a:off x="6131481" y="1917569"/>
+            <a:ext cx="138626" cy="2492"/>
+          </a:xfrm>
+          <a:prstGeom prst="bentConnector3">
+            <a:avLst>
+              <a:gd name="adj1" fmla="val 50000"/>
+            </a:avLst>
+          </a:prstGeom>
+          <a:ln>
+            <a:solidFill>
+              <a:srgbClr val="00B050"/>
+            </a:solidFill>
+          </a:ln>
+        </p:spPr>
+        <p:style>
+          <a:lnRef idx="2">
+            <a:schemeClr val="accent6">
+              <a:shade val="50000"/>
+            </a:schemeClr>
+          </a:lnRef>
+          <a:fillRef idx="1">
+            <a:schemeClr val="accent6"/>
+          </a:fillRef>
+          <a:effectRef idx="0">
+            <a:schemeClr val="accent6"/>
+          </a:effectRef>
+          <a:fontRef idx="minor">
+            <a:schemeClr val="lt1"/>
+          </a:fontRef>
+        </p:style>
+      </p:cxnSp>
+      <p:sp>
+        <p:nvSpPr>
+          <p:cNvPr id="205" name="Folded Corner 204"/>
+          <p:cNvSpPr/>
+          <p:nvPr/>
+        </p:nvSpPr>
+        <p:spPr>
+          <a:xfrm>
+            <a:off x="5468438" y="3614677"/>
+            <a:ext cx="1466850" cy="609600"/>
+          </a:xfrm>
+          <a:prstGeom prst="foldedCorner">
+            <a:avLst/>
+          </a:prstGeom>
+        </p:spPr>
+        <p:style>
+          <a:lnRef idx="2">
+            <a:schemeClr val="accent4">
+              <a:shade val="50000"/>
+            </a:schemeClr>
+          </a:lnRef>
+          <a:fillRef idx="1">
+            <a:schemeClr val="accent4"/>
+          </a:fillRef>
+          <a:effectRef idx="0">
+            <a:schemeClr val="accent4"/>
+          </a:effectRef>
+          <a:fontRef idx="minor">
+            <a:schemeClr val="lt1"/>
+          </a:fontRef>
+        </p:style>
+        <p:txBody>
+          <a:bodyPr rtlCol="0" anchor="ctr"/>
+          <a:lstStyle/>
+          <a:p>
+            <a:pPr algn="ctr"/>
+            <a:r>
+              <a:rPr lang="en-US" sz="1600" b="1" dirty="0" smtClean="0"/>
+              <a:t>_xyz_.</a:t>
+            </a:r>
+            <a:r>
+              <a:rPr lang="en-US" sz="1600" b="1" dirty="0" err="1" smtClean="0"/>
+              <a:t>jsp</a:t>
+            </a:r>
+            <a:endParaRPr lang="en-SG" sz="1600" b="1" dirty="0"/>
+          </a:p>
+        </p:txBody>
+      </p:sp>
+      <p:cxnSp>
+        <p:nvCxnSpPr>
+          <p:cNvPr id="206" name="Straight Arrow Connector 205"/>
+          <p:cNvCxnSpPr>
+            <a:stCxn id="198" idx="3"/>
+            <a:endCxn id="200" idx="1"/>
+          </p:cNvCxnSpPr>
+          <p:nvPr/>
+        </p:nvCxnSpPr>
+        <p:spPr>
+          <a:xfrm>
+            <a:off x="4183542" y="2292928"/>
+            <a:ext cx="1285073" cy="0"/>
+          </a:xfrm>
+          <a:prstGeom prst="straightConnector1">
+            <a:avLst/>
+          </a:prstGeom>
+          <a:ln w="38100">
+            <a:solidFill>
+              <a:schemeClr val="accent2">
+                <a:lumMod val="75000"/>
+              </a:schemeClr>
+            </a:solidFill>
+            <a:prstDash val="sysDot"/>
+            <a:tailEnd type="arrow"/>
+          </a:ln>
+        </p:spPr>
+        <p:style>
+          <a:lnRef idx="1">
+            <a:schemeClr val="accent1"/>
+          </a:lnRef>
+          <a:fillRef idx="0">
+            <a:schemeClr val="accent1"/>
+          </a:fillRef>
+          <a:effectRef idx="0">
+            <a:schemeClr val="accent1"/>
+          </a:effectRef>
+          <a:fontRef idx="minor">
+            <a:schemeClr val="tx1"/>
+          </a:fontRef>
+        </p:style>
+      </p:cxnSp>
+      <p:cxnSp>
+        <p:nvCxnSpPr>
+          <p:cNvPr id="207" name="Elbow Connector 206"/>
+          <p:cNvCxnSpPr>
+            <a:stCxn id="205" idx="0"/>
+          </p:cNvCxnSpPr>
+          <p:nvPr/>
+        </p:nvCxnSpPr>
+        <p:spPr>
+          <a:xfrm rot="16200000" flipV="1">
+            <a:off x="5733726" y="3146540"/>
+            <a:ext cx="933958" cy="2316"/>
+          </a:xfrm>
+          <a:prstGeom prst="bentConnector3">
+            <a:avLst>
+              <a:gd name="adj1" fmla="val 50000"/>
+            </a:avLst>
+          </a:prstGeom>
+          <a:ln w="38100">
+            <a:prstDash val="sysDot"/>
+            <a:tailEnd type="arrow"/>
+          </a:ln>
+        </p:spPr>
+        <p:style>
+          <a:lnRef idx="2">
+            <a:schemeClr val="accent4">
+              <a:shade val="50000"/>
+            </a:schemeClr>
+          </a:lnRef>
+          <a:fillRef idx="1">
+            <a:schemeClr val="accent4"/>
+          </a:fillRef>
+          <a:effectRef idx="0">
+            <a:schemeClr val="accent4"/>
+          </a:effectRef>
+          <a:fontRef idx="minor">
+            <a:schemeClr val="lt1"/>
+          </a:fontRef>
+        </p:style>
+      </p:cxnSp>
       <p:cxnSp>
         <p:nvCxnSpPr>
           <p:cNvPr id="208" name="Straight Arrow Connector 207"/>
-          <p:cNvCxnSpPr/>
+          <p:cNvCxnSpPr>
+            <a:stCxn id="209" idx="3"/>
+          </p:cNvCxnSpPr>
           <p:nvPr/>
         </p:nvCxnSpPr>
         <p:spPr>
-          <a:xfrm rot="5400000" flipH="1" flipV="1">
-            <a:off x="2763103" y="-863835"/>
-            <a:ext cx="1266442" cy="4896113"/>
-          </a:xfrm>
-          <a:prstGeom prst="bentConnector3">
-            <a:avLst>
-              <a:gd name="adj1" fmla="val 129932"/>
-            </a:avLst>
+          <a:xfrm flipV="1">
+            <a:off x="1351501" y="2369128"/>
+            <a:ext cx="1405115" cy="2203"/>
+          </a:xfrm>
+          <a:prstGeom prst="straightConnector1">
+            <a:avLst/>
           </a:prstGeom>
           <a:ln w="38100">
             <a:solidFill>
@@ -4063,232 +4557,13 @@
       </p:sp>
       <p:sp>
         <p:nvSpPr>
-          <p:cNvPr id="211" name="Folded Corner 210"/>
-          <p:cNvSpPr/>
-          <p:nvPr/>
-        </p:nvSpPr>
-        <p:spPr>
-          <a:xfrm>
-            <a:off x="261200" y="2597729"/>
-            <a:ext cx="1143000" cy="1405783"/>
-          </a:xfrm>
-          <a:prstGeom prst="foldedCorner">
-            <a:avLst/>
-          </a:prstGeom>
-          <a:solidFill>
-            <a:schemeClr val="bg1"/>
-          </a:solidFill>
-          <a:ln>
-            <a:solidFill>
-              <a:schemeClr val="tx1"/>
-            </a:solidFill>
-          </a:ln>
-        </p:spPr>
-        <p:style>
-          <a:lnRef idx="2">
-            <a:schemeClr val="accent4">
-              <a:shade val="50000"/>
-            </a:schemeClr>
-          </a:lnRef>
-          <a:fillRef idx="1">
-            <a:schemeClr val="accent4"/>
-          </a:fillRef>
-          <a:effectRef idx="0">
-            <a:schemeClr val="accent4"/>
-          </a:effectRef>
-          <a:fontRef idx="minor">
-            <a:schemeClr val="lt1"/>
-          </a:fontRef>
-        </p:style>
-        <p:txBody>
-          <a:bodyPr rtlCol="0" anchor="ctr"/>
-          <a:lstStyle/>
-          <a:p>
-            <a:pPr algn="ctr"/>
-            <a:r>
-              <a:rPr lang="en-US" sz="1600" b="1" dirty="0" smtClean="0">
-                <a:solidFill>
-                  <a:schemeClr val="tx1"/>
-                </a:solidFill>
-              </a:rPr>
-              <a:t>Web page</a:t>
-            </a:r>
-            <a:endParaRPr lang="en-SG" sz="1600" b="1" dirty="0">
-              <a:solidFill>
-                <a:schemeClr val="tx1"/>
-              </a:solidFill>
-            </a:endParaRPr>
-          </a:p>
-        </p:txBody>
-      </p:sp>
-      <p:grpSp>
-        <p:nvGrpSpPr>
-          <p:cNvPr id="30" name="Group 29"/>
-          <p:cNvGrpSpPr/>
-          <p:nvPr/>
-        </p:nvGrpSpPr>
-        <p:grpSpPr>
-          <a:xfrm>
-            <a:off x="2851680" y="3965768"/>
-            <a:ext cx="1640617" cy="609600"/>
-            <a:chOff x="2904698" y="3849687"/>
-            <a:chExt cx="1640617" cy="609600"/>
-          </a:xfrm>
-        </p:grpSpPr>
-        <p:sp>
-          <p:nvSpPr>
-            <p:cNvPr id="213" name="Folded Corner 212"/>
-            <p:cNvSpPr/>
-            <p:nvPr/>
-          </p:nvSpPr>
-          <p:spPr>
-            <a:xfrm>
-              <a:off x="2904698" y="3849687"/>
-              <a:ext cx="1464715" cy="420881"/>
-            </a:xfrm>
-            <a:prstGeom prst="foldedCorner">
-              <a:avLst/>
-            </a:prstGeom>
-          </p:spPr>
-          <p:style>
-            <a:lnRef idx="2">
-              <a:schemeClr val="accent3">
-                <a:shade val="50000"/>
-              </a:schemeClr>
-            </a:lnRef>
-            <a:fillRef idx="1">
-              <a:schemeClr val="accent3"/>
-            </a:fillRef>
-            <a:effectRef idx="0">
-              <a:schemeClr val="accent3"/>
-            </a:effectRef>
-            <a:fontRef idx="minor">
-              <a:schemeClr val="lt1"/>
-            </a:fontRef>
-          </p:style>
-          <p:txBody>
-            <a:bodyPr rtlCol="0" anchor="ctr"/>
-            <a:lstStyle/>
-            <a:p>
-              <a:pPr algn="ctr"/>
-              <a:r>
-                <a:rPr lang="en-US" sz="1600" b="1" dirty="0" smtClean="0"/>
-                <a:t>*.</a:t>
-              </a:r>
-              <a:r>
-                <a:rPr lang="en-US" sz="1600" b="1" dirty="0" err="1" smtClean="0"/>
-                <a:t>js</a:t>
-              </a:r>
-              <a:endParaRPr lang="en-SG" sz="1600" b="1" dirty="0"/>
-            </a:p>
-          </p:txBody>
-        </p:sp>
-        <p:sp>
-          <p:nvSpPr>
-            <p:cNvPr id="214" name="Folded Corner 213"/>
-            <p:cNvSpPr/>
-            <p:nvPr/>
-          </p:nvSpPr>
-          <p:spPr>
-            <a:xfrm>
-              <a:off x="3004400" y="3935145"/>
-              <a:ext cx="1464715" cy="420881"/>
-            </a:xfrm>
-            <a:prstGeom prst="foldedCorner">
-              <a:avLst/>
-            </a:prstGeom>
-          </p:spPr>
-          <p:style>
-            <a:lnRef idx="2">
-              <a:schemeClr val="accent3">
-                <a:shade val="50000"/>
-              </a:schemeClr>
-            </a:lnRef>
-            <a:fillRef idx="1">
-              <a:schemeClr val="accent3"/>
-            </a:fillRef>
-            <a:effectRef idx="0">
-              <a:schemeClr val="accent3"/>
-            </a:effectRef>
-            <a:fontRef idx="minor">
-              <a:schemeClr val="lt1"/>
-            </a:fontRef>
-          </p:style>
-          <p:txBody>
-            <a:bodyPr rtlCol="0" anchor="ctr"/>
-            <a:lstStyle/>
-            <a:p>
-              <a:pPr algn="ctr"/>
-              <a:r>
-                <a:rPr lang="en-US" sz="1600" b="1" dirty="0" smtClean="0"/>
-                <a:t>*.</a:t>
-              </a:r>
-              <a:r>
-                <a:rPr lang="en-US" sz="1600" b="1" dirty="0" err="1" smtClean="0"/>
-                <a:t>js</a:t>
-              </a:r>
-              <a:endParaRPr lang="en-SG" sz="1600" b="1" dirty="0"/>
-            </a:p>
-          </p:txBody>
-        </p:sp>
-        <p:sp>
-          <p:nvSpPr>
-            <p:cNvPr id="215" name="Folded Corner 214"/>
-            <p:cNvSpPr/>
-            <p:nvPr/>
-          </p:nvSpPr>
-          <p:spPr>
-            <a:xfrm>
-              <a:off x="3080600" y="4038406"/>
-              <a:ext cx="1464715" cy="420881"/>
-            </a:xfrm>
-            <a:prstGeom prst="foldedCorner">
-              <a:avLst/>
-            </a:prstGeom>
-          </p:spPr>
-          <p:style>
-            <a:lnRef idx="2">
-              <a:schemeClr val="accent3">
-                <a:shade val="50000"/>
-              </a:schemeClr>
-            </a:lnRef>
-            <a:fillRef idx="1">
-              <a:schemeClr val="accent3"/>
-            </a:fillRef>
-            <a:effectRef idx="0">
-              <a:schemeClr val="accent3"/>
-            </a:effectRef>
-            <a:fontRef idx="minor">
-              <a:schemeClr val="lt1"/>
-            </a:fontRef>
-          </p:style>
-          <p:txBody>
-            <a:bodyPr rtlCol="0" anchor="ctr"/>
-            <a:lstStyle/>
-            <a:p>
-              <a:pPr algn="ctr"/>
-              <a:r>
-                <a:rPr lang="en-US" sz="1600" b="1" dirty="0" smtClean="0"/>
-                <a:t>*.</a:t>
-              </a:r>
-              <a:r>
-                <a:rPr lang="en-US" sz="1600" b="1" dirty="0" err="1" smtClean="0"/>
-                <a:t>js</a:t>
-              </a:r>
-              <a:endParaRPr lang="en-SG" sz="1600" b="1" dirty="0"/>
-            </a:p>
-          </p:txBody>
-        </p:sp>
-      </p:grpSp>
-      <p:sp>
-        <p:nvSpPr>
-          <p:cNvPr id="217" name="TextBox 216"/>
+          <p:cNvPr id="210" name="TextBox 209"/>
           <p:cNvSpPr txBox="1"/>
           <p:nvPr/>
         </p:nvSpPr>
         <p:spPr>
           <a:xfrm>
-            <a:off x="2471000" y="3399481"/>
+            <a:off x="4411073" y="1985151"/>
             <a:ext cx="1066800" cy="307777"/>
           </a:xfrm>
           <a:prstGeom prst="rect">
@@ -4388,194 +4663,295 @@
           <a:p>
             <a:pPr algn="r"/>
             <a:r>
-              <a:rPr lang="en-US" dirty="0" smtClean="0"/>
+              <a:rPr lang="en-US" dirty="0" smtClean="0">
+                <a:solidFill>
+                  <a:schemeClr val="accent2">
+                    <a:lumMod val="75000"/>
+                  </a:schemeClr>
+                </a:solidFill>
+              </a:rPr>
               <a:t>&lt;&lt;create&gt;&gt;</a:t>
             </a:r>
-            <a:endParaRPr lang="en-SG" dirty="0"/>
-          </a:p>
-        </p:txBody>
-      </p:sp>
-      <p:grpSp>
-        <p:nvGrpSpPr>
-          <p:cNvPr id="31" name="Group 30"/>
-          <p:cNvGrpSpPr/>
+            <a:endParaRPr lang="en-SG" dirty="0">
+              <a:solidFill>
+                <a:schemeClr val="accent2">
+                  <a:lumMod val="75000"/>
+                </a:schemeClr>
+              </a:solidFill>
+            </a:endParaRPr>
+          </a:p>
+        </p:txBody>
+      </p:sp>
+      <p:sp>
+        <p:nvSpPr>
+          <p:cNvPr id="211" name="Folded Corner 210"/>
+          <p:cNvSpPr/>
           <p:nvPr/>
-        </p:nvGrpSpPr>
-        <p:grpSpPr>
+        </p:nvSpPr>
+        <p:spPr>
           <a:xfrm>
-            <a:off x="2938936" y="4759593"/>
-            <a:ext cx="1545900" cy="527703"/>
-            <a:chOff x="2928200" y="4617384"/>
-            <a:chExt cx="1545900" cy="527703"/>
-          </a:xfrm>
-        </p:grpSpPr>
-        <p:sp>
-          <p:nvSpPr>
-            <p:cNvPr id="212" name="Folded Corner 211"/>
-            <p:cNvSpPr/>
-            <p:nvPr/>
-          </p:nvSpPr>
-          <p:spPr>
-            <a:xfrm>
-              <a:off x="2928200" y="4617384"/>
-              <a:ext cx="1464715" cy="374591"/>
-            </a:xfrm>
-            <a:prstGeom prst="foldedCorner">
-              <a:avLst/>
-            </a:prstGeom>
-          </p:spPr>
-          <p:style>
-            <a:lnRef idx="2">
-              <a:schemeClr val="accent5">
-                <a:shade val="50000"/>
-              </a:schemeClr>
-            </a:lnRef>
-            <a:fillRef idx="1">
-              <a:schemeClr val="accent5"/>
-            </a:fillRef>
-            <a:effectRef idx="0">
-              <a:schemeClr val="accent5"/>
-            </a:effectRef>
-            <a:fontRef idx="minor">
-              <a:schemeClr val="lt1"/>
-            </a:fontRef>
-          </p:style>
-          <p:txBody>
-            <a:bodyPr rtlCol="0" anchor="ctr"/>
-            <a:lstStyle/>
-            <a:p>
-              <a:pPr algn="ctr"/>
-              <a:r>
-                <a:rPr lang="en-US" sz="1600" b="1" dirty="0" smtClean="0"/>
-                <a:t>*.</a:t>
-              </a:r>
-              <a:r>
-                <a:rPr lang="en-US" sz="1600" b="1" dirty="0" err="1" smtClean="0"/>
-                <a:t>css</a:t>
-              </a:r>
-              <a:endParaRPr lang="en-SG" sz="1600" b="1" dirty="0"/>
-            </a:p>
-          </p:txBody>
-        </p:sp>
-        <p:sp>
-          <p:nvSpPr>
-            <p:cNvPr id="218" name="Folded Corner 217"/>
-            <p:cNvSpPr/>
-            <p:nvPr/>
-          </p:nvSpPr>
-          <p:spPr>
-            <a:xfrm>
-              <a:off x="2967369" y="4699993"/>
-              <a:ext cx="1464715" cy="374591"/>
-            </a:xfrm>
-            <a:prstGeom prst="foldedCorner">
-              <a:avLst/>
-            </a:prstGeom>
-          </p:spPr>
-          <p:style>
-            <a:lnRef idx="2">
-              <a:schemeClr val="accent5">
-                <a:shade val="50000"/>
-              </a:schemeClr>
-            </a:lnRef>
-            <a:fillRef idx="1">
-              <a:schemeClr val="accent5"/>
-            </a:fillRef>
-            <a:effectRef idx="0">
-              <a:schemeClr val="accent5"/>
-            </a:effectRef>
-            <a:fontRef idx="minor">
-              <a:schemeClr val="lt1"/>
-            </a:fontRef>
-          </p:style>
-          <p:txBody>
-            <a:bodyPr rtlCol="0" anchor="ctr"/>
-            <a:lstStyle/>
-            <a:p>
-              <a:pPr algn="ctr"/>
-              <a:r>
-                <a:rPr lang="en-US" sz="1600" b="1" dirty="0" smtClean="0"/>
-                <a:t>*.</a:t>
-              </a:r>
-              <a:r>
-                <a:rPr lang="en-US" sz="1600" b="1" dirty="0" err="1" smtClean="0"/>
-                <a:t>css</a:t>
-              </a:r>
-              <a:endParaRPr lang="en-SG" sz="1600" b="1" dirty="0"/>
-            </a:p>
-          </p:txBody>
-        </p:sp>
-        <p:sp>
-          <p:nvSpPr>
-            <p:cNvPr id="219" name="Folded Corner 218"/>
-            <p:cNvSpPr/>
-            <p:nvPr/>
-          </p:nvSpPr>
-          <p:spPr>
-            <a:xfrm>
-              <a:off x="3009385" y="4770496"/>
-              <a:ext cx="1464715" cy="374591"/>
-            </a:xfrm>
-            <a:prstGeom prst="foldedCorner">
-              <a:avLst/>
-            </a:prstGeom>
-          </p:spPr>
-          <p:style>
-            <a:lnRef idx="2">
-              <a:schemeClr val="accent5">
-                <a:shade val="50000"/>
-              </a:schemeClr>
-            </a:lnRef>
-            <a:fillRef idx="1">
-              <a:schemeClr val="accent5"/>
-            </a:fillRef>
-            <a:effectRef idx="0">
-              <a:schemeClr val="accent5"/>
-            </a:effectRef>
-            <a:fontRef idx="minor">
-              <a:schemeClr val="lt1"/>
-            </a:fontRef>
-          </p:style>
-          <p:txBody>
-            <a:bodyPr rtlCol="0" anchor="ctr"/>
-            <a:lstStyle/>
-            <a:p>
-              <a:pPr algn="ctr"/>
-              <a:r>
-                <a:rPr lang="en-US" sz="1600" b="1" dirty="0" smtClean="0"/>
-                <a:t>*.</a:t>
-              </a:r>
-              <a:r>
-                <a:rPr lang="en-US" sz="1600" b="1" dirty="0" err="1" smtClean="0"/>
-                <a:t>css</a:t>
-              </a:r>
-              <a:endParaRPr lang="en-SG" sz="1600" b="1" dirty="0"/>
-            </a:p>
-          </p:txBody>
-        </p:sp>
-      </p:grpSp>
-      <p:cxnSp>
-        <p:nvCxnSpPr>
-          <p:cNvPr id="220" name="Elbow Connector 219"/>
-          <p:cNvCxnSpPr>
-            <a:stCxn id="211" idx="2"/>
-            <a:endCxn id="215" idx="1"/>
-          </p:cNvCxnSpPr>
-          <p:nvPr/>
-        </p:nvCxnSpPr>
-        <p:spPr>
-          <a:xfrm rot="16200000" flipH="1">
-            <a:off x="1749433" y="3086779"/>
-            <a:ext cx="361416" cy="2194882"/>
-          </a:xfrm>
-          <a:prstGeom prst="bentConnector2">
+            <a:off x="261200" y="2597729"/>
+            <a:ext cx="1143000" cy="1405783"/>
+          </a:xfrm>
+          <a:prstGeom prst="foldedCorner">
             <a:avLst/>
           </a:prstGeom>
+          <a:solidFill>
+            <a:schemeClr val="bg1"/>
+          </a:solidFill>
           <a:ln>
             <a:solidFill>
               <a:schemeClr val="tx1"/>
             </a:solidFill>
-            <a:prstDash val="dash"/>
+          </a:ln>
+        </p:spPr>
+        <p:style>
+          <a:lnRef idx="2">
+            <a:schemeClr val="accent4">
+              <a:shade val="50000"/>
+            </a:schemeClr>
+          </a:lnRef>
+          <a:fillRef idx="1">
+            <a:schemeClr val="accent4"/>
+          </a:fillRef>
+          <a:effectRef idx="0">
+            <a:schemeClr val="accent4"/>
+          </a:effectRef>
+          <a:fontRef idx="minor">
+            <a:schemeClr val="lt1"/>
+          </a:fontRef>
+        </p:style>
+        <p:txBody>
+          <a:bodyPr rtlCol="0" anchor="ctr"/>
+          <a:lstStyle/>
+          <a:p>
+            <a:pPr algn="ctr"/>
+            <a:r>
+              <a:rPr lang="en-US" sz="1600" b="1" dirty="0" smtClean="0">
+                <a:solidFill>
+                  <a:schemeClr val="tx1"/>
+                </a:solidFill>
+              </a:rPr>
+              <a:t>Web page</a:t>
+            </a:r>
+            <a:endParaRPr lang="en-SG" sz="1600" b="1" dirty="0">
+              <a:solidFill>
+                <a:schemeClr val="tx1"/>
+              </a:solidFill>
+            </a:endParaRPr>
+          </a:p>
+        </p:txBody>
+      </p:sp>
+      <p:sp>
+        <p:nvSpPr>
+          <p:cNvPr id="212" name="Folded Corner 211"/>
+          <p:cNvSpPr/>
+          <p:nvPr/>
+        </p:nvSpPr>
+        <p:spPr>
+          <a:xfrm>
+            <a:off x="2928200" y="4617384"/>
+            <a:ext cx="1464715" cy="374591"/>
+          </a:xfrm>
+          <a:prstGeom prst="foldedCorner">
+            <a:avLst/>
+          </a:prstGeom>
+        </p:spPr>
+        <p:style>
+          <a:lnRef idx="2">
+            <a:schemeClr val="accent5">
+              <a:shade val="50000"/>
+            </a:schemeClr>
+          </a:lnRef>
+          <a:fillRef idx="1">
+            <a:schemeClr val="accent5"/>
+          </a:fillRef>
+          <a:effectRef idx="0">
+            <a:schemeClr val="accent5"/>
+          </a:effectRef>
+          <a:fontRef idx="minor">
+            <a:schemeClr val="lt1"/>
+          </a:fontRef>
+        </p:style>
+        <p:txBody>
+          <a:bodyPr rtlCol="0" anchor="ctr"/>
+          <a:lstStyle/>
+          <a:p>
+            <a:pPr algn="ctr"/>
+            <a:r>
+              <a:rPr lang="en-US" sz="1600" b="1" dirty="0" smtClean="0"/>
+              <a:t>*.</a:t>
+            </a:r>
+            <a:r>
+              <a:rPr lang="en-US" sz="1600" b="1" dirty="0" err="1" smtClean="0"/>
+              <a:t>css</a:t>
+            </a:r>
+            <a:endParaRPr lang="en-SG" sz="1600" b="1" dirty="0"/>
+          </a:p>
+        </p:txBody>
+      </p:sp>
+      <p:sp>
+        <p:nvSpPr>
+          <p:cNvPr id="213" name="Folded Corner 212"/>
+          <p:cNvSpPr/>
+          <p:nvPr/>
+        </p:nvSpPr>
+        <p:spPr>
+          <a:xfrm>
+            <a:off x="2904698" y="3849687"/>
+            <a:ext cx="1464715" cy="420881"/>
+          </a:xfrm>
+          <a:prstGeom prst="foldedCorner">
+            <a:avLst/>
+          </a:prstGeom>
+        </p:spPr>
+        <p:style>
+          <a:lnRef idx="2">
+            <a:schemeClr val="accent5">
+              <a:shade val="50000"/>
+            </a:schemeClr>
+          </a:lnRef>
+          <a:fillRef idx="1">
+            <a:schemeClr val="accent5"/>
+          </a:fillRef>
+          <a:effectRef idx="0">
+            <a:schemeClr val="accent5"/>
+          </a:effectRef>
+          <a:fontRef idx="minor">
+            <a:schemeClr val="lt1"/>
+          </a:fontRef>
+        </p:style>
+        <p:txBody>
+          <a:bodyPr rtlCol="0" anchor="ctr"/>
+          <a:lstStyle/>
+          <a:p>
+            <a:pPr algn="ctr"/>
+            <a:r>
+              <a:rPr lang="en-US" sz="1600" b="1" dirty="0" smtClean="0"/>
+              <a:t>*.</a:t>
+            </a:r>
+            <a:r>
+              <a:rPr lang="en-US" sz="1600" b="1" dirty="0" err="1" smtClean="0"/>
+              <a:t>js</a:t>
+            </a:r>
+            <a:endParaRPr lang="en-SG" sz="1600" b="1" dirty="0"/>
+          </a:p>
+        </p:txBody>
+      </p:sp>
+      <p:sp>
+        <p:nvSpPr>
+          <p:cNvPr id="214" name="Folded Corner 213"/>
+          <p:cNvSpPr/>
+          <p:nvPr/>
+        </p:nvSpPr>
+        <p:spPr>
+          <a:xfrm>
+            <a:off x="3004400" y="3935145"/>
+            <a:ext cx="1464715" cy="420881"/>
+          </a:xfrm>
+          <a:prstGeom prst="foldedCorner">
+            <a:avLst/>
+          </a:prstGeom>
+        </p:spPr>
+        <p:style>
+          <a:lnRef idx="2">
+            <a:schemeClr val="accent5">
+              <a:shade val="50000"/>
+            </a:schemeClr>
+          </a:lnRef>
+          <a:fillRef idx="1">
+            <a:schemeClr val="accent5"/>
+          </a:fillRef>
+          <a:effectRef idx="0">
+            <a:schemeClr val="accent5"/>
+          </a:effectRef>
+          <a:fontRef idx="minor">
+            <a:schemeClr val="lt1"/>
+          </a:fontRef>
+        </p:style>
+        <p:txBody>
+          <a:bodyPr rtlCol="0" anchor="ctr"/>
+          <a:lstStyle/>
+          <a:p>
+            <a:pPr algn="ctr"/>
+            <a:r>
+              <a:rPr lang="en-US" sz="1600" b="1" dirty="0" smtClean="0"/>
+              <a:t>*.</a:t>
+            </a:r>
+            <a:r>
+              <a:rPr lang="en-US" sz="1600" b="1" dirty="0" err="1" smtClean="0"/>
+              <a:t>js</a:t>
+            </a:r>
+            <a:endParaRPr lang="en-SG" sz="1600" b="1" dirty="0"/>
+          </a:p>
+        </p:txBody>
+      </p:sp>
+      <p:sp>
+        <p:nvSpPr>
+          <p:cNvPr id="215" name="Folded Corner 214"/>
+          <p:cNvSpPr/>
+          <p:nvPr/>
+        </p:nvSpPr>
+        <p:spPr>
+          <a:xfrm>
+            <a:off x="3080600" y="4038406"/>
+            <a:ext cx="1464715" cy="420881"/>
+          </a:xfrm>
+          <a:prstGeom prst="foldedCorner">
+            <a:avLst/>
+          </a:prstGeom>
+        </p:spPr>
+        <p:style>
+          <a:lnRef idx="2">
+            <a:schemeClr val="accent5">
+              <a:shade val="50000"/>
+            </a:schemeClr>
+          </a:lnRef>
+          <a:fillRef idx="1">
+            <a:schemeClr val="accent5"/>
+          </a:fillRef>
+          <a:effectRef idx="0">
+            <a:schemeClr val="accent5"/>
+          </a:effectRef>
+          <a:fontRef idx="minor">
+            <a:schemeClr val="lt1"/>
+          </a:fontRef>
+        </p:style>
+        <p:txBody>
+          <a:bodyPr rtlCol="0" anchor="ctr"/>
+          <a:lstStyle/>
+          <a:p>
+            <a:pPr algn="ctr"/>
+            <a:r>
+              <a:rPr lang="en-US" sz="1600" b="1" dirty="0" smtClean="0"/>
+              <a:t>*.</a:t>
+            </a:r>
+            <a:r>
+              <a:rPr lang="en-US" sz="1600" b="1" dirty="0" err="1" smtClean="0"/>
+              <a:t>js</a:t>
+            </a:r>
+            <a:endParaRPr lang="en-SG" sz="1600" b="1" dirty="0"/>
+          </a:p>
+        </p:txBody>
+      </p:sp>
+      <p:cxnSp>
+        <p:nvCxnSpPr>
+          <p:cNvPr id="216" name="Elbow Connector 215"/>
+          <p:cNvCxnSpPr/>
+          <p:nvPr/>
+        </p:nvCxnSpPr>
+        <p:spPr>
+          <a:xfrm rot="10800000">
+            <a:off x="1404200" y="3697288"/>
+            <a:ext cx="4064239" cy="12700"/>
+          </a:xfrm>
+          <a:prstGeom prst="bentConnector3">
+            <a:avLst>
+              <a:gd name="adj1" fmla="val 50000"/>
+            </a:avLst>
+          </a:prstGeom>
+          <a:ln w="38100">
+            <a:prstDash val="sysDot"/>
             <a:tailEnd type="arrow"/>
           </a:ln>
         </p:spPr>
@@ -4596,883 +4972,15 @@
           </a:fontRef>
         </p:style>
       </p:cxnSp>
-      <p:cxnSp>
-        <p:nvCxnSpPr>
-          <p:cNvPr id="221" name="Elbow Connector 220"/>
-          <p:cNvCxnSpPr>
-            <a:stCxn id="211" idx="2"/>
-            <a:endCxn id="219" idx="1"/>
-          </p:cNvCxnSpPr>
-          <p:nvPr/>
-        </p:nvCxnSpPr>
-        <p:spPr>
-          <a:xfrm rot="16200000" flipH="1">
-            <a:off x="1378166" y="3458045"/>
-            <a:ext cx="1096489" cy="2187421"/>
-          </a:xfrm>
-          <a:prstGeom prst="bentConnector2">
-            <a:avLst/>
-          </a:prstGeom>
-          <a:ln>
-            <a:solidFill>
-              <a:schemeClr val="tx1"/>
-            </a:solidFill>
-            <a:prstDash val="dash"/>
-            <a:tailEnd type="arrow"/>
-          </a:ln>
-        </p:spPr>
-        <p:style>
-          <a:lnRef idx="2">
-            <a:schemeClr val="accent4">
-              <a:shade val="50000"/>
-            </a:schemeClr>
-          </a:lnRef>
-          <a:fillRef idx="1">
-            <a:schemeClr val="accent4"/>
-          </a:fillRef>
-          <a:effectRef idx="0">
-            <a:schemeClr val="accent4"/>
-          </a:effectRef>
-          <a:fontRef idx="minor">
-            <a:schemeClr val="lt1"/>
-          </a:fontRef>
-        </p:style>
-      </p:cxnSp>
-      <p:grpSp>
-        <p:nvGrpSpPr>
-          <p:cNvPr id="9" name="Group 8"/>
-          <p:cNvGrpSpPr/>
-          <p:nvPr/>
-        </p:nvGrpSpPr>
-        <p:grpSpPr>
-          <a:xfrm>
-            <a:off x="5342765" y="3653134"/>
-            <a:ext cx="1605272" cy="733515"/>
-            <a:chOff x="5468438" y="3614677"/>
-            <a:chExt cx="1605272" cy="733515"/>
-          </a:xfrm>
-        </p:grpSpPr>
-        <p:sp>
-          <p:nvSpPr>
-            <p:cNvPr id="205" name="Folded Corner 204"/>
-            <p:cNvSpPr/>
-            <p:nvPr/>
-          </p:nvSpPr>
-          <p:spPr>
-            <a:xfrm>
-              <a:off x="5468438" y="3614677"/>
-              <a:ext cx="1466850" cy="609600"/>
-            </a:xfrm>
-            <a:prstGeom prst="foldedCorner">
-              <a:avLst/>
-            </a:prstGeom>
-          </p:spPr>
-          <p:style>
-            <a:lnRef idx="2">
-              <a:schemeClr val="accent4">
-                <a:shade val="50000"/>
-              </a:schemeClr>
-            </a:lnRef>
-            <a:fillRef idx="1">
-              <a:schemeClr val="accent4"/>
-            </a:fillRef>
-            <a:effectRef idx="0">
-              <a:schemeClr val="accent4"/>
-            </a:effectRef>
-            <a:fontRef idx="minor">
-              <a:schemeClr val="lt1"/>
-            </a:fontRef>
-          </p:style>
-          <p:txBody>
-            <a:bodyPr rtlCol="0" anchor="ctr"/>
-            <a:lstStyle/>
-            <a:p>
-              <a:pPr algn="ctr"/>
-              <a:r>
-                <a:rPr lang="en-US" sz="1600" b="1" dirty="0" smtClean="0"/>
-                <a:t>_xyz_.</a:t>
-              </a:r>
-              <a:r>
-                <a:rPr lang="en-US" sz="1600" b="1" dirty="0" err="1" smtClean="0"/>
-                <a:t>jsp</a:t>
-              </a:r>
-              <a:endParaRPr lang="en-SG" sz="1600" b="1" dirty="0"/>
-            </a:p>
-          </p:txBody>
-        </p:sp>
-        <p:sp>
-          <p:nvSpPr>
-            <p:cNvPr id="222" name="Folded Corner 221"/>
-            <p:cNvSpPr/>
-            <p:nvPr/>
-          </p:nvSpPr>
-          <p:spPr>
-            <a:xfrm>
-              <a:off x="5528526" y="3684109"/>
-              <a:ext cx="1466850" cy="609600"/>
-            </a:xfrm>
-            <a:prstGeom prst="foldedCorner">
-              <a:avLst/>
-            </a:prstGeom>
-          </p:spPr>
-          <p:style>
-            <a:lnRef idx="2">
-              <a:schemeClr val="accent4">
-                <a:shade val="50000"/>
-              </a:schemeClr>
-            </a:lnRef>
-            <a:fillRef idx="1">
-              <a:schemeClr val="accent4"/>
-            </a:fillRef>
-            <a:effectRef idx="0">
-              <a:schemeClr val="accent4"/>
-            </a:effectRef>
-            <a:fontRef idx="minor">
-              <a:schemeClr val="lt1"/>
-            </a:fontRef>
-          </p:style>
-          <p:txBody>
-            <a:bodyPr rtlCol="0" anchor="ctr"/>
-            <a:lstStyle/>
-            <a:p>
-              <a:pPr algn="ctr"/>
-              <a:r>
-                <a:rPr lang="en-US" sz="1600" b="1" dirty="0" smtClean="0"/>
-                <a:t>_xyz_.</a:t>
-              </a:r>
-              <a:r>
-                <a:rPr lang="en-US" sz="1600" b="1" dirty="0" err="1" smtClean="0"/>
-                <a:t>jsp</a:t>
-              </a:r>
-              <a:endParaRPr lang="en-SG" sz="1600" b="1" dirty="0"/>
-            </a:p>
-          </p:txBody>
-        </p:sp>
-        <p:sp>
-          <p:nvSpPr>
-            <p:cNvPr id="223" name="Folded Corner 222"/>
-            <p:cNvSpPr/>
-            <p:nvPr/>
-          </p:nvSpPr>
-          <p:spPr>
-            <a:xfrm>
-              <a:off x="5606860" y="3738592"/>
-              <a:ext cx="1466850" cy="609600"/>
-            </a:xfrm>
-            <a:prstGeom prst="foldedCorner">
-              <a:avLst/>
-            </a:prstGeom>
-          </p:spPr>
-          <p:style>
-            <a:lnRef idx="2">
-              <a:schemeClr val="accent4">
-                <a:shade val="50000"/>
-              </a:schemeClr>
-            </a:lnRef>
-            <a:fillRef idx="1">
-              <a:schemeClr val="accent4"/>
-            </a:fillRef>
-            <a:effectRef idx="0">
-              <a:schemeClr val="accent4"/>
-            </a:effectRef>
-            <a:fontRef idx="minor">
-              <a:schemeClr val="lt1"/>
-            </a:fontRef>
-          </p:style>
-          <p:txBody>
-            <a:bodyPr rtlCol="0" anchor="ctr"/>
-            <a:lstStyle/>
-            <a:p>
-              <a:pPr algn="ctr"/>
-              <a:r>
-                <a:rPr lang="en-US" sz="1600" b="1" dirty="0" smtClean="0"/>
-                <a:t>_xyz_.</a:t>
-              </a:r>
-              <a:r>
-                <a:rPr lang="en-US" sz="1600" b="1" dirty="0" err="1" smtClean="0"/>
-                <a:t>jsp</a:t>
-              </a:r>
-              <a:endParaRPr lang="en-SG" sz="1600" b="1" dirty="0"/>
-            </a:p>
-          </p:txBody>
-        </p:sp>
-      </p:grpSp>
-      <p:sp>
-        <p:nvSpPr>
-          <p:cNvPr id="226" name="Rounded Rectangle 225"/>
-          <p:cNvSpPr/>
-          <p:nvPr/>
-        </p:nvSpPr>
-        <p:spPr>
-          <a:xfrm>
-            <a:off x="7881200" y="114387"/>
-            <a:ext cx="914400" cy="5525997"/>
-          </a:xfrm>
-          <a:prstGeom prst="roundRect">
-            <a:avLst>
-              <a:gd name="adj" fmla="val 23209"/>
-            </a:avLst>
-          </a:prstGeom>
-          <a:solidFill>
-            <a:schemeClr val="bg1">
-              <a:lumMod val="85000"/>
-            </a:schemeClr>
-          </a:solidFill>
-          <a:ln>
-            <a:solidFill>
-              <a:schemeClr val="bg1">
-                <a:lumMod val="75000"/>
-              </a:schemeClr>
-            </a:solidFill>
-          </a:ln>
-        </p:spPr>
-        <p:style>
-          <a:lnRef idx="2">
-            <a:schemeClr val="accent1">
-              <a:shade val="50000"/>
-            </a:schemeClr>
-          </a:lnRef>
-          <a:fillRef idx="1">
-            <a:schemeClr val="accent1"/>
-          </a:fillRef>
-          <a:effectRef idx="0">
-            <a:schemeClr val="accent1"/>
-          </a:effectRef>
-          <a:fontRef idx="minor">
-            <a:schemeClr val="lt1"/>
-          </a:fontRef>
-        </p:style>
-        <p:txBody>
-          <a:bodyPr vert="vert270" rtlCol="0" anchor="t" anchorCtr="1"/>
-          <a:lstStyle/>
-          <a:p>
-            <a:pPr algn="r"/>
-            <a:r>
-              <a:rPr lang="en-US" sz="1600" b="1" dirty="0" smtClean="0"/>
-              <a:t>Logic</a:t>
-            </a:r>
-            <a:endParaRPr lang="en-SG" sz="1600" b="1" dirty="0"/>
-          </a:p>
-        </p:txBody>
-      </p:sp>
-      <p:sp>
-        <p:nvSpPr>
-          <p:cNvPr id="227" name="Rectangle 226"/>
-          <p:cNvSpPr/>
-          <p:nvPr/>
-        </p:nvSpPr>
-        <p:spPr>
-          <a:xfrm>
-            <a:off x="8338400" y="-36513"/>
-            <a:ext cx="609600" cy="5867400"/>
-          </a:xfrm>
-          <a:prstGeom prst="rect">
-            <a:avLst/>
-          </a:prstGeom>
-          <a:solidFill>
-            <a:schemeClr val="bg1"/>
-          </a:solidFill>
-          <a:ln>
-            <a:noFill/>
-          </a:ln>
-          <a:effectLst>
-            <a:softEdge rad="63500"/>
-          </a:effectLst>
-        </p:spPr>
-        <p:style>
-          <a:lnRef idx="2">
-            <a:schemeClr val="accent1">
-              <a:shade val="50000"/>
-            </a:schemeClr>
-          </a:lnRef>
-          <a:fillRef idx="1">
-            <a:schemeClr val="accent1"/>
-          </a:fillRef>
-          <a:effectRef idx="0">
-            <a:schemeClr val="accent1"/>
-          </a:effectRef>
-          <a:fontRef idx="minor">
-            <a:schemeClr val="lt1"/>
-          </a:fontRef>
-        </p:style>
-        <p:txBody>
-          <a:bodyPr rtlCol="0" anchor="ctr"/>
-          <a:lstStyle/>
-          <a:p>
-            <a:pPr algn="ctr"/>
-            <a:endParaRPr lang="en-SG"/>
-          </a:p>
-        </p:txBody>
-      </p:sp>
-      <p:sp>
-        <p:nvSpPr>
-          <p:cNvPr id="230" name="Rectangle 229"/>
-          <p:cNvSpPr/>
-          <p:nvPr/>
-        </p:nvSpPr>
-        <p:spPr>
-          <a:xfrm>
-            <a:off x="2712604" y="645975"/>
-            <a:ext cx="1466850" cy="199692"/>
-          </a:xfrm>
-          <a:prstGeom prst="rect">
-            <a:avLst/>
-          </a:prstGeom>
-        </p:spPr>
-        <p:style>
-          <a:lnRef idx="2">
-            <a:schemeClr val="accent1">
-              <a:shade val="50000"/>
-            </a:schemeClr>
-          </a:lnRef>
-          <a:fillRef idx="1">
-            <a:schemeClr val="accent1"/>
-          </a:fillRef>
-          <a:effectRef idx="0">
-            <a:schemeClr val="accent1"/>
-          </a:effectRef>
-          <a:fontRef idx="minor">
-            <a:schemeClr val="lt1"/>
-          </a:fontRef>
-        </p:style>
-        <p:txBody>
-          <a:bodyPr rtlCol="0" anchor="ctr"/>
-          <a:lstStyle/>
-          <a:p>
-            <a:pPr algn="ctr"/>
-            <a:r>
-              <a:rPr lang="en-US" sz="1600" b="1" dirty="0" err="1" smtClean="0"/>
-              <a:t>LoginFilter</a:t>
-            </a:r>
-            <a:endParaRPr lang="en-SG" sz="1600" b="1" dirty="0"/>
-          </a:p>
-        </p:txBody>
-      </p:sp>
-      <p:cxnSp>
-        <p:nvCxnSpPr>
-          <p:cNvPr id="96" name="Straight Arrow Connector 207"/>
-          <p:cNvCxnSpPr>
-            <a:stCxn id="205" idx="1"/>
-          </p:cNvCxnSpPr>
-          <p:nvPr/>
-        </p:nvCxnSpPr>
-        <p:spPr>
-          <a:xfrm rot="10800000">
-            <a:off x="1404203" y="3742156"/>
-            <a:ext cx="3938562" cy="215778"/>
-          </a:xfrm>
-          <a:prstGeom prst="bentConnector3">
-            <a:avLst>
-              <a:gd name="adj1" fmla="val 15028"/>
-            </a:avLst>
-          </a:prstGeom>
-          <a:ln w="25400">
-            <a:solidFill>
-              <a:schemeClr val="accent4">
-                <a:lumMod val="75000"/>
-              </a:schemeClr>
-            </a:solidFill>
-            <a:prstDash val="sysDash"/>
-            <a:tailEnd type="arrow"/>
-          </a:ln>
-        </p:spPr>
-        <p:style>
-          <a:lnRef idx="1">
-            <a:schemeClr val="accent1"/>
-          </a:lnRef>
-          <a:fillRef idx="0">
-            <a:schemeClr val="accent1"/>
-          </a:fillRef>
-          <a:effectRef idx="0">
-            <a:schemeClr val="accent1"/>
-          </a:effectRef>
-          <a:fontRef idx="minor">
-            <a:schemeClr val="tx1"/>
-          </a:fontRef>
-        </p:style>
-      </p:cxnSp>
-      <p:cxnSp>
-        <p:nvCxnSpPr>
-          <p:cNvPr id="112" name="Straight Arrow Connector 207"/>
-          <p:cNvCxnSpPr/>
-          <p:nvPr/>
-        </p:nvCxnSpPr>
-        <p:spPr>
-          <a:xfrm rot="16200000" flipV="1">
-            <a:off x="4066478" y="2060481"/>
-            <a:ext cx="881473" cy="2267463"/>
-          </a:xfrm>
-          <a:prstGeom prst="bentConnector3">
-            <a:avLst>
-              <a:gd name="adj1" fmla="val 50000"/>
-            </a:avLst>
-          </a:prstGeom>
-          <a:ln w="25400">
-            <a:solidFill>
-              <a:schemeClr val="accent4">
-                <a:lumMod val="75000"/>
-              </a:schemeClr>
-            </a:solidFill>
-            <a:prstDash val="sysDash"/>
-            <a:tailEnd type="arrow"/>
-          </a:ln>
-        </p:spPr>
-        <p:style>
-          <a:lnRef idx="1">
-            <a:schemeClr val="accent1"/>
-          </a:lnRef>
-          <a:fillRef idx="0">
-            <a:schemeClr val="accent1"/>
-          </a:fillRef>
-          <a:effectRef idx="0">
-            <a:schemeClr val="accent1"/>
-          </a:effectRef>
-          <a:fontRef idx="minor">
-            <a:schemeClr val="tx1"/>
-          </a:fontRef>
-        </p:style>
-      </p:cxnSp>
-      <p:grpSp>
-        <p:nvGrpSpPr>
-          <p:cNvPr id="114" name="Group 113"/>
-          <p:cNvGrpSpPr/>
-          <p:nvPr/>
-        </p:nvGrpSpPr>
-        <p:grpSpPr>
-          <a:xfrm>
-            <a:off x="2671664" y="877597"/>
-            <a:ext cx="1820633" cy="1894064"/>
-            <a:chOff x="2644706" y="841228"/>
-            <a:chExt cx="1820633" cy="1894064"/>
-          </a:xfrm>
-        </p:grpSpPr>
-        <p:grpSp>
-          <p:nvGrpSpPr>
-            <p:cNvPr id="128" name="Group 127"/>
-            <p:cNvGrpSpPr/>
-            <p:nvPr/>
-          </p:nvGrpSpPr>
-          <p:grpSpPr>
-            <a:xfrm>
-              <a:off x="2644706" y="841228"/>
-              <a:ext cx="1820633" cy="1894064"/>
-              <a:chOff x="-3638550" y="1371600"/>
-              <a:chExt cx="4781550" cy="2481840"/>
-            </a:xfrm>
-            <a:solidFill>
-              <a:schemeClr val="bg1"/>
-            </a:solidFill>
-          </p:grpSpPr>
-          <p:sp>
-            <p:nvSpPr>
-              <p:cNvPr id="129" name="Rectangle 128"/>
-              <p:cNvSpPr/>
-              <p:nvPr/>
-            </p:nvSpPr>
-            <p:spPr>
-              <a:xfrm>
-                <a:off x="-3638550" y="1523999"/>
-                <a:ext cx="4781550" cy="2329441"/>
-              </a:xfrm>
-              <a:prstGeom prst="rect">
-                <a:avLst/>
-              </a:prstGeom>
-              <a:grpFill/>
-              <a:ln>
-                <a:solidFill>
-                  <a:schemeClr val="tx2">
-                    <a:lumMod val="40000"/>
-                    <a:lumOff val="60000"/>
-                  </a:schemeClr>
-                </a:solidFill>
-              </a:ln>
-            </p:spPr>
-            <p:style>
-              <a:lnRef idx="2">
-                <a:schemeClr val="accent1">
-                  <a:shade val="50000"/>
-                </a:schemeClr>
-              </a:lnRef>
-              <a:fillRef idx="1">
-                <a:schemeClr val="accent1"/>
-              </a:fillRef>
-              <a:effectRef idx="0">
-                <a:schemeClr val="accent1"/>
-              </a:effectRef>
-              <a:fontRef idx="minor">
-                <a:schemeClr val="lt1"/>
-              </a:fontRef>
-            </p:style>
-            <p:txBody>
-              <a:bodyPr rtlCol="0" anchor="t" anchorCtr="0"/>
-              <a:lstStyle/>
-              <a:p>
-                <a:pPr algn="r"/>
-                <a:r>
-                  <a:rPr lang="en-US" sz="1400" b="1" dirty="0" err="1" smtClean="0">
-                    <a:solidFill>
-                      <a:schemeClr val="tx2"/>
-                    </a:solidFill>
-                  </a:rPr>
-                  <a:t>ui</a:t>
-                </a:r>
-                <a:r>
-                  <a:rPr lang="en-US" sz="1400" b="1" dirty="0" smtClean="0">
-                    <a:solidFill>
-                      <a:schemeClr val="tx2"/>
-                    </a:solidFill>
-                  </a:rPr>
-                  <a:t>::helper</a:t>
-                </a:r>
-                <a:endParaRPr lang="en-SG" sz="1400" b="1" dirty="0">
-                  <a:solidFill>
-                    <a:schemeClr val="tx2"/>
-                  </a:solidFill>
-                </a:endParaRPr>
-              </a:p>
-            </p:txBody>
-          </p:sp>
-          <p:sp>
-            <p:nvSpPr>
-              <p:cNvPr id="130" name="Rectangle 129"/>
-              <p:cNvSpPr/>
-              <p:nvPr/>
-            </p:nvSpPr>
-            <p:spPr>
-              <a:xfrm>
-                <a:off x="647700" y="1371600"/>
-                <a:ext cx="495300" cy="152400"/>
-              </a:xfrm>
-              <a:prstGeom prst="rect">
-                <a:avLst/>
-              </a:prstGeom>
-              <a:grpFill/>
-              <a:ln>
-                <a:solidFill>
-                  <a:schemeClr val="tx2">
-                    <a:lumMod val="40000"/>
-                    <a:lumOff val="60000"/>
-                  </a:schemeClr>
-                </a:solidFill>
-              </a:ln>
-            </p:spPr>
-            <p:style>
-              <a:lnRef idx="2">
-                <a:schemeClr val="accent1">
-                  <a:shade val="50000"/>
-                </a:schemeClr>
-              </a:lnRef>
-              <a:fillRef idx="1">
-                <a:schemeClr val="accent1"/>
-              </a:fillRef>
-              <a:effectRef idx="0">
-                <a:schemeClr val="accent1"/>
-              </a:effectRef>
-              <a:fontRef idx="minor">
-                <a:schemeClr val="lt1"/>
-              </a:fontRef>
-            </p:style>
-            <p:txBody>
-              <a:bodyPr rtlCol="0" anchor="t" anchorCtr="0"/>
-              <a:lstStyle/>
-              <a:p>
-                <a:endParaRPr lang="en-SG" sz="1400" b="1">
-                  <a:solidFill>
-                    <a:schemeClr val="tx2"/>
-                  </a:solidFill>
-                </a:endParaRPr>
-              </a:p>
-            </p:txBody>
-          </p:sp>
-        </p:grpSp>
-        <p:sp>
-          <p:nvSpPr>
-            <p:cNvPr id="202" name="Rectangle 201"/>
-            <p:cNvSpPr/>
-            <p:nvPr/>
-          </p:nvSpPr>
-          <p:spPr>
-            <a:xfrm>
-              <a:off x="2760094" y="1242699"/>
-              <a:ext cx="1226777" cy="297095"/>
-            </a:xfrm>
-            <a:prstGeom prst="rect">
-              <a:avLst/>
-            </a:prstGeom>
-          </p:spPr>
-          <p:style>
-            <a:lnRef idx="2">
-              <a:schemeClr val="accent6">
-                <a:shade val="50000"/>
-              </a:schemeClr>
-            </a:lnRef>
-            <a:fillRef idx="1">
-              <a:schemeClr val="accent6"/>
-            </a:fillRef>
-            <a:effectRef idx="0">
-              <a:schemeClr val="accent6"/>
-            </a:effectRef>
-            <a:fontRef idx="minor">
-              <a:schemeClr val="lt1"/>
-            </a:fontRef>
-          </p:style>
-          <p:txBody>
-            <a:bodyPr rtlCol="0" anchor="ctr"/>
-            <a:lstStyle/>
-            <a:p>
-              <a:pPr algn="ctr"/>
-              <a:r>
-                <a:rPr lang="en-US" sz="1600" b="1" dirty="0" smtClean="0"/>
-                <a:t>Helper</a:t>
-              </a:r>
-              <a:endParaRPr lang="en-SG" sz="1600" b="1" dirty="0"/>
-            </a:p>
-          </p:txBody>
-        </p:sp>
-        <p:sp>
-          <p:nvSpPr>
-            <p:cNvPr id="203" name="Isosceles Triangle 202"/>
-            <p:cNvSpPr/>
-            <p:nvPr/>
-          </p:nvSpPr>
-          <p:spPr>
-            <a:xfrm>
-              <a:off x="3281917" y="1534646"/>
-              <a:ext cx="276225" cy="228600"/>
-            </a:xfrm>
-            <a:prstGeom prst="triangle">
-              <a:avLst/>
-            </a:prstGeom>
-          </p:spPr>
-          <p:style>
-            <a:lnRef idx="2">
-              <a:schemeClr val="accent6">
-                <a:shade val="50000"/>
-              </a:schemeClr>
-            </a:lnRef>
-            <a:fillRef idx="1">
-              <a:schemeClr val="accent6"/>
-            </a:fillRef>
-            <a:effectRef idx="0">
-              <a:schemeClr val="accent6"/>
-            </a:effectRef>
-            <a:fontRef idx="minor">
-              <a:schemeClr val="lt1"/>
-            </a:fontRef>
-          </p:style>
-          <p:txBody>
-            <a:bodyPr rtlCol="0" anchor="ctr"/>
-            <a:lstStyle/>
-            <a:p>
-              <a:pPr algn="ctr"/>
-              <a:endParaRPr lang="en-SG"/>
-            </a:p>
-          </p:txBody>
-        </p:sp>
-        <p:cxnSp>
-          <p:nvCxnSpPr>
-            <p:cNvPr id="204" name="Elbow Connector 203"/>
-            <p:cNvCxnSpPr>
-              <a:stCxn id="203" idx="3"/>
-              <a:endCxn id="200" idx="0"/>
-            </p:cNvCxnSpPr>
-            <p:nvPr/>
-          </p:nvCxnSpPr>
-          <p:spPr>
-            <a:xfrm>
-              <a:off x="3420030" y="1763246"/>
-              <a:ext cx="0" cy="325476"/>
-            </a:xfrm>
-            <a:prstGeom prst="straightConnector1">
-              <a:avLst/>
-            </a:prstGeom>
-          </p:spPr>
-          <p:style>
-            <a:lnRef idx="2">
-              <a:schemeClr val="accent6">
-                <a:shade val="50000"/>
-              </a:schemeClr>
-            </a:lnRef>
-            <a:fillRef idx="1">
-              <a:schemeClr val="accent6"/>
-            </a:fillRef>
-            <a:effectRef idx="0">
-              <a:schemeClr val="accent6"/>
-            </a:effectRef>
-            <a:fontRef idx="minor">
-              <a:schemeClr val="lt1"/>
-            </a:fontRef>
-          </p:style>
-        </p:cxnSp>
-        <p:grpSp>
-          <p:nvGrpSpPr>
-            <p:cNvPr id="7" name="Group 6"/>
-            <p:cNvGrpSpPr/>
-            <p:nvPr/>
-          </p:nvGrpSpPr>
-          <p:grpSpPr>
-            <a:xfrm>
-              <a:off x="2731647" y="2088722"/>
-              <a:ext cx="1504057" cy="461935"/>
-              <a:chOff x="5468615" y="1988128"/>
-              <a:chExt cx="1602470" cy="686901"/>
-            </a:xfrm>
-          </p:grpSpPr>
-          <p:sp>
-            <p:nvSpPr>
-              <p:cNvPr id="200" name="Rectangle 199"/>
-              <p:cNvSpPr/>
-              <p:nvPr/>
-            </p:nvSpPr>
-            <p:spPr>
-              <a:xfrm>
-                <a:off x="5468615" y="1988128"/>
-                <a:ext cx="1466850" cy="609600"/>
-              </a:xfrm>
-              <a:prstGeom prst="rect">
-                <a:avLst/>
-              </a:prstGeom>
-            </p:spPr>
-            <p:style>
-              <a:lnRef idx="2">
-                <a:schemeClr val="accent6">
-                  <a:shade val="50000"/>
-                </a:schemeClr>
-              </a:lnRef>
-              <a:fillRef idx="1">
-                <a:schemeClr val="accent6"/>
-              </a:fillRef>
-              <a:effectRef idx="0">
-                <a:schemeClr val="accent6"/>
-              </a:effectRef>
-              <a:fontRef idx="minor">
-                <a:schemeClr val="lt1"/>
-              </a:fontRef>
-            </p:style>
-            <p:txBody>
-              <a:bodyPr rtlCol="0" anchor="ctr"/>
-              <a:lstStyle/>
-              <a:p>
-                <a:pPr algn="ctr"/>
-                <a:r>
-                  <a:rPr lang="en-US" sz="1600" b="1" dirty="0" smtClean="0"/>
-                  <a:t>_</a:t>
-                </a:r>
-                <a:r>
-                  <a:rPr lang="en-US" sz="1600" b="1" dirty="0" err="1" smtClean="0"/>
-                  <a:t>xyz_Helper</a:t>
-                </a:r>
-                <a:endParaRPr lang="en-SG" sz="1600" b="1" dirty="0"/>
-              </a:p>
-            </p:txBody>
-          </p:sp>
-          <p:sp>
-            <p:nvSpPr>
-              <p:cNvPr id="237" name="Rectangle 236"/>
-              <p:cNvSpPr/>
-              <p:nvPr/>
-            </p:nvSpPr>
-            <p:spPr>
-              <a:xfrm>
-                <a:off x="5526281" y="2022345"/>
-                <a:ext cx="1466850" cy="609600"/>
-              </a:xfrm>
-              <a:prstGeom prst="rect">
-                <a:avLst/>
-              </a:prstGeom>
-            </p:spPr>
-            <p:style>
-              <a:lnRef idx="2">
-                <a:schemeClr val="accent6">
-                  <a:shade val="50000"/>
-                </a:schemeClr>
-              </a:lnRef>
-              <a:fillRef idx="1">
-                <a:schemeClr val="accent6"/>
-              </a:fillRef>
-              <a:effectRef idx="0">
-                <a:schemeClr val="accent6"/>
-              </a:effectRef>
-              <a:fontRef idx="minor">
-                <a:schemeClr val="lt1"/>
-              </a:fontRef>
-            </p:style>
-            <p:txBody>
-              <a:bodyPr rtlCol="0" anchor="ctr"/>
-              <a:lstStyle/>
-              <a:p>
-                <a:pPr algn="ctr"/>
-                <a:r>
-                  <a:rPr lang="en-US" sz="1600" b="1" dirty="0" smtClean="0"/>
-                  <a:t>_</a:t>
-                </a:r>
-                <a:r>
-                  <a:rPr lang="en-US" sz="1600" b="1" dirty="0" err="1" smtClean="0"/>
-                  <a:t>xyz_Helper</a:t>
-                </a:r>
-                <a:endParaRPr lang="en-SG" sz="1600" b="1" dirty="0"/>
-              </a:p>
-            </p:txBody>
-          </p:sp>
-          <p:sp>
-            <p:nvSpPr>
-              <p:cNvPr id="238" name="Rectangle 237"/>
-              <p:cNvSpPr/>
-              <p:nvPr/>
-            </p:nvSpPr>
-            <p:spPr>
-              <a:xfrm>
-                <a:off x="5604235" y="2065429"/>
-                <a:ext cx="1466850" cy="609600"/>
-              </a:xfrm>
-              <a:prstGeom prst="rect">
-                <a:avLst/>
-              </a:prstGeom>
-            </p:spPr>
-            <p:style>
-              <a:lnRef idx="2">
-                <a:schemeClr val="accent6">
-                  <a:shade val="50000"/>
-                </a:schemeClr>
-              </a:lnRef>
-              <a:fillRef idx="1">
-                <a:schemeClr val="accent6"/>
-              </a:fillRef>
-              <a:effectRef idx="0">
-                <a:schemeClr val="accent6"/>
-              </a:effectRef>
-              <a:fontRef idx="minor">
-                <a:schemeClr val="lt1"/>
-              </a:fontRef>
-            </p:style>
-            <p:txBody>
-              <a:bodyPr rtlCol="0" anchor="ctr"/>
-              <a:lstStyle/>
-              <a:p>
-                <a:pPr algn="ctr"/>
-                <a:r>
-                  <a:rPr lang="en-US" sz="1600" b="1" dirty="0" smtClean="0"/>
-                  <a:t>_</a:t>
-                </a:r>
-                <a:r>
-                  <a:rPr lang="en-US" sz="1600" b="1" dirty="0" err="1" smtClean="0"/>
-                  <a:t>xyz_Helper</a:t>
-                </a:r>
-                <a:endParaRPr lang="en-SG" sz="1600" b="1" dirty="0"/>
-              </a:p>
-            </p:txBody>
-          </p:sp>
-        </p:grpSp>
-      </p:grpSp>
-      <p:sp>
-        <p:nvSpPr>
-          <p:cNvPr id="210" name="TextBox 209"/>
+      <p:sp>
+        <p:nvSpPr>
+          <p:cNvPr id="217" name="TextBox 216"/>
           <p:cNvSpPr txBox="1"/>
           <p:nvPr/>
         </p:nvSpPr>
         <p:spPr>
           <a:xfrm>
-            <a:off x="4336053" y="1530740"/>
+            <a:off x="2471000" y="3399481"/>
             <a:ext cx="1066800" cy="307777"/>
           </a:xfrm>
           <a:prstGeom prst="rect">
@@ -5572,479 +5080,131 @@
           <a:p>
             <a:pPr algn="r"/>
             <a:r>
-              <a:rPr lang="en-US" dirty="0" smtClean="0">
-                <a:solidFill>
-                  <a:schemeClr val="accent2">
-                    <a:lumMod val="75000"/>
-                  </a:schemeClr>
-                </a:solidFill>
-              </a:rPr>
+              <a:rPr lang="en-US" dirty="0" smtClean="0"/>
               <a:t>&lt;&lt;create&gt;&gt;</a:t>
             </a:r>
-            <a:endParaRPr lang="en-SG" dirty="0">
-              <a:solidFill>
-                <a:schemeClr val="accent2">
-                  <a:lumMod val="75000"/>
-                </a:schemeClr>
-              </a:solidFill>
-            </a:endParaRPr>
-          </a:p>
-        </p:txBody>
-      </p:sp>
-      <p:grpSp>
-        <p:nvGrpSpPr>
-          <p:cNvPr id="135" name="Group 134"/>
-          <p:cNvGrpSpPr/>
+            <a:endParaRPr lang="en-SG" dirty="0"/>
+          </a:p>
+        </p:txBody>
+      </p:sp>
+      <p:sp>
+        <p:nvSpPr>
+          <p:cNvPr id="218" name="Folded Corner 217"/>
+          <p:cNvSpPr/>
           <p:nvPr/>
-        </p:nvGrpSpPr>
-        <p:grpSpPr>
+        </p:nvSpPr>
+        <p:spPr>
           <a:xfrm>
-            <a:off x="5342765" y="834694"/>
-            <a:ext cx="1789186" cy="1894064"/>
-            <a:chOff x="5342765" y="834694"/>
-            <a:chExt cx="1789186" cy="1894064"/>
-          </a:xfrm>
-        </p:grpSpPr>
-        <p:grpSp>
-          <p:nvGrpSpPr>
-            <p:cNvPr id="140" name="Group 139"/>
-            <p:cNvGrpSpPr/>
-            <p:nvPr/>
-          </p:nvGrpSpPr>
-          <p:grpSpPr>
-            <a:xfrm>
-              <a:off x="5342765" y="834694"/>
-              <a:ext cx="1789186" cy="1894064"/>
-              <a:chOff x="-3638550" y="1371600"/>
-              <a:chExt cx="4781550" cy="2481840"/>
-            </a:xfrm>
-            <a:solidFill>
-              <a:schemeClr val="bg1"/>
-            </a:solidFill>
-          </p:grpSpPr>
-          <p:sp>
-            <p:nvSpPr>
-              <p:cNvPr id="141" name="Rectangle 140"/>
-              <p:cNvSpPr/>
-              <p:nvPr/>
-            </p:nvSpPr>
-            <p:spPr>
-              <a:xfrm>
-                <a:off x="-3638550" y="1523999"/>
-                <a:ext cx="4781550" cy="2329441"/>
-              </a:xfrm>
-              <a:prstGeom prst="rect">
-                <a:avLst/>
-              </a:prstGeom>
-              <a:grpFill/>
-              <a:ln>
-                <a:solidFill>
-                  <a:schemeClr val="tx2">
-                    <a:lumMod val="40000"/>
-                    <a:lumOff val="60000"/>
-                  </a:schemeClr>
-                </a:solidFill>
-              </a:ln>
-            </p:spPr>
-            <p:style>
-              <a:lnRef idx="2">
-                <a:schemeClr val="accent1">
-                  <a:shade val="50000"/>
-                </a:schemeClr>
-              </a:lnRef>
-              <a:fillRef idx="1">
-                <a:schemeClr val="accent1"/>
-              </a:fillRef>
-              <a:effectRef idx="0">
-                <a:schemeClr val="accent1"/>
-              </a:effectRef>
-              <a:fontRef idx="minor">
-                <a:schemeClr val="lt1"/>
-              </a:fontRef>
-            </p:style>
-            <p:txBody>
-              <a:bodyPr rtlCol="0" anchor="t" anchorCtr="0"/>
-              <a:lstStyle/>
-              <a:p>
-                <a:pPr algn="r"/>
-                <a:r>
-                  <a:rPr lang="en-US" sz="1400" b="1" dirty="0" err="1" smtClean="0">
-                    <a:solidFill>
-                      <a:schemeClr val="tx2"/>
-                    </a:solidFill>
-                  </a:rPr>
-                  <a:t>ui</a:t>
-                </a:r>
-                <a:r>
-                  <a:rPr lang="en-US" sz="1400" b="1" dirty="0" smtClean="0">
-                    <a:solidFill>
-                      <a:schemeClr val="tx2"/>
-                    </a:solidFill>
-                  </a:rPr>
-                  <a:t>::servlet</a:t>
-                </a:r>
-                <a:endParaRPr lang="en-SG" sz="1400" b="1" dirty="0">
-                  <a:solidFill>
-                    <a:schemeClr val="tx2"/>
-                  </a:solidFill>
-                </a:endParaRPr>
-              </a:p>
-            </p:txBody>
-          </p:sp>
-          <p:sp>
-            <p:nvSpPr>
-              <p:cNvPr id="142" name="Rectangle 141"/>
-              <p:cNvSpPr/>
-              <p:nvPr/>
-            </p:nvSpPr>
-            <p:spPr>
-              <a:xfrm>
-                <a:off x="647700" y="1371600"/>
-                <a:ext cx="495300" cy="152400"/>
-              </a:xfrm>
-              <a:prstGeom prst="rect">
-                <a:avLst/>
-              </a:prstGeom>
-              <a:grpFill/>
-              <a:ln>
-                <a:solidFill>
-                  <a:schemeClr val="tx2">
-                    <a:lumMod val="40000"/>
-                    <a:lumOff val="60000"/>
-                  </a:schemeClr>
-                </a:solidFill>
-              </a:ln>
-            </p:spPr>
-            <p:style>
-              <a:lnRef idx="2">
-                <a:schemeClr val="accent1">
-                  <a:shade val="50000"/>
-                </a:schemeClr>
-              </a:lnRef>
-              <a:fillRef idx="1">
-                <a:schemeClr val="accent1"/>
-              </a:fillRef>
-              <a:effectRef idx="0">
-                <a:schemeClr val="accent1"/>
-              </a:effectRef>
-              <a:fontRef idx="minor">
-                <a:schemeClr val="lt1"/>
-              </a:fontRef>
-            </p:style>
-            <p:txBody>
-              <a:bodyPr rtlCol="0" anchor="t" anchorCtr="0"/>
-              <a:lstStyle/>
-              <a:p>
-                <a:endParaRPr lang="en-SG" sz="1400" b="1">
-                  <a:solidFill>
-                    <a:schemeClr val="tx2"/>
-                  </a:solidFill>
-                </a:endParaRPr>
-              </a:p>
-            </p:txBody>
-          </p:sp>
-        </p:grpSp>
-        <p:sp>
-          <p:nvSpPr>
-            <p:cNvPr id="197" name="Rectangle 196"/>
-            <p:cNvSpPr/>
-            <p:nvPr/>
-          </p:nvSpPr>
-          <p:spPr>
-            <a:xfrm>
-              <a:off x="5538050" y="1244181"/>
-              <a:ext cx="1466850" cy="292891"/>
-            </a:xfrm>
-            <a:prstGeom prst="rect">
-              <a:avLst/>
-            </a:prstGeom>
-          </p:spPr>
-          <p:style>
-            <a:lnRef idx="2">
-              <a:schemeClr val="accent2">
-                <a:shade val="50000"/>
-              </a:schemeClr>
-            </a:lnRef>
-            <a:fillRef idx="1">
-              <a:schemeClr val="accent2"/>
-            </a:fillRef>
-            <a:effectRef idx="0">
-              <a:schemeClr val="accent2"/>
-            </a:effectRef>
-            <a:fontRef idx="minor">
-              <a:schemeClr val="lt1"/>
-            </a:fontRef>
-          </p:style>
-          <p:txBody>
-            <a:bodyPr rtlCol="0" anchor="ctr"/>
-            <a:lstStyle/>
-            <a:p>
-              <a:pPr algn="ctr"/>
-              <a:r>
-                <a:rPr lang="en-US" sz="1600" b="1" dirty="0" err="1" smtClean="0"/>
-                <a:t>ActionServlet</a:t>
-              </a:r>
-              <a:endParaRPr lang="en-SG" sz="1600" b="1" dirty="0"/>
-            </a:p>
-          </p:txBody>
-        </p:sp>
-        <p:sp>
-          <p:nvSpPr>
-            <p:cNvPr id="199" name="Isosceles Triangle 198"/>
-            <p:cNvSpPr/>
-            <p:nvPr/>
-          </p:nvSpPr>
-          <p:spPr>
-            <a:xfrm>
-              <a:off x="6013091" y="1556298"/>
-              <a:ext cx="276225" cy="228600"/>
-            </a:xfrm>
-            <a:prstGeom prst="triangle">
-              <a:avLst/>
-            </a:prstGeom>
-          </p:spPr>
-          <p:style>
-            <a:lnRef idx="2">
-              <a:schemeClr val="accent2">
-                <a:shade val="50000"/>
-              </a:schemeClr>
-            </a:lnRef>
-            <a:fillRef idx="1">
-              <a:schemeClr val="accent2"/>
-            </a:fillRef>
-            <a:effectRef idx="0">
-              <a:schemeClr val="accent2"/>
-            </a:effectRef>
-            <a:fontRef idx="minor">
-              <a:schemeClr val="lt1"/>
-            </a:fontRef>
-          </p:style>
-          <p:txBody>
-            <a:bodyPr rtlCol="0" anchor="ctr"/>
-            <a:lstStyle/>
-            <a:p>
-              <a:pPr algn="ctr"/>
-              <a:endParaRPr lang="en-SG"/>
-            </a:p>
-          </p:txBody>
-        </p:sp>
-        <p:cxnSp>
-          <p:nvCxnSpPr>
-            <p:cNvPr id="201" name="Elbow Connector 200"/>
-            <p:cNvCxnSpPr>
-              <a:stCxn id="199" idx="3"/>
-            </p:cNvCxnSpPr>
-            <p:nvPr/>
-          </p:nvCxnSpPr>
-          <p:spPr>
-            <a:xfrm rot="5400000">
-              <a:off x="5967310" y="1968792"/>
-              <a:ext cx="367789" cy="1"/>
-            </a:xfrm>
-            <a:prstGeom prst="bentConnector3">
-              <a:avLst/>
-            </a:prstGeom>
-          </p:spPr>
-          <p:style>
-            <a:lnRef idx="2">
-              <a:schemeClr val="accent2">
-                <a:shade val="50000"/>
-              </a:schemeClr>
-            </a:lnRef>
-            <a:fillRef idx="1">
-              <a:schemeClr val="accent2"/>
-            </a:fillRef>
-            <a:effectRef idx="0">
-              <a:schemeClr val="accent2"/>
-            </a:effectRef>
-            <a:fontRef idx="minor">
-              <a:schemeClr val="lt1"/>
-            </a:fontRef>
-          </p:style>
-        </p:cxnSp>
-        <p:grpSp>
-          <p:nvGrpSpPr>
-            <p:cNvPr id="8" name="Group 7"/>
-            <p:cNvGrpSpPr/>
-            <p:nvPr/>
-          </p:nvGrpSpPr>
-          <p:grpSpPr>
-            <a:xfrm>
-              <a:off x="5492923" y="2113652"/>
-              <a:ext cx="1376780" cy="481800"/>
-              <a:chOff x="2716692" y="1988128"/>
-              <a:chExt cx="1583333" cy="692591"/>
-            </a:xfrm>
-          </p:grpSpPr>
-          <p:sp>
-            <p:nvSpPr>
-              <p:cNvPr id="198" name="Rectangle 197"/>
-              <p:cNvSpPr/>
-              <p:nvPr/>
-            </p:nvSpPr>
-            <p:spPr>
-              <a:xfrm>
-                <a:off x="2716692" y="1988128"/>
-                <a:ext cx="1466850" cy="609600"/>
-              </a:xfrm>
-              <a:prstGeom prst="rect">
-                <a:avLst/>
-              </a:prstGeom>
-            </p:spPr>
-            <p:style>
-              <a:lnRef idx="2">
-                <a:schemeClr val="accent2">
-                  <a:shade val="50000"/>
-                </a:schemeClr>
-              </a:lnRef>
-              <a:fillRef idx="1">
-                <a:schemeClr val="accent2"/>
-              </a:fillRef>
-              <a:effectRef idx="0">
-                <a:schemeClr val="accent2"/>
-              </a:effectRef>
-              <a:fontRef idx="minor">
-                <a:schemeClr val="lt1"/>
-              </a:fontRef>
-            </p:style>
-            <p:txBody>
-              <a:bodyPr rtlCol="0" anchor="ctr"/>
-              <a:lstStyle/>
-              <a:p>
-                <a:pPr algn="ctr"/>
-                <a:r>
-                  <a:rPr lang="en-US" sz="1600" b="1" dirty="0" smtClean="0"/>
-                  <a:t>_</a:t>
-                </a:r>
-                <a:r>
-                  <a:rPr lang="en-US" sz="1600" b="1" dirty="0" err="1" smtClean="0"/>
-                  <a:t>xyz_Servlet</a:t>
-                </a:r>
-                <a:endParaRPr lang="en-SG" sz="1600" b="1" dirty="0"/>
-              </a:p>
-            </p:txBody>
-          </p:sp>
-          <p:sp>
-            <p:nvSpPr>
-              <p:cNvPr id="232" name="Rectangle 231"/>
-              <p:cNvSpPr/>
-              <p:nvPr/>
-            </p:nvSpPr>
-            <p:spPr>
-              <a:xfrm>
-                <a:off x="2770973" y="2030054"/>
-                <a:ext cx="1466850" cy="609600"/>
-              </a:xfrm>
-              <a:prstGeom prst="rect">
-                <a:avLst/>
-              </a:prstGeom>
-            </p:spPr>
-            <p:style>
-              <a:lnRef idx="2">
-                <a:schemeClr val="accent2">
-                  <a:shade val="50000"/>
-                </a:schemeClr>
-              </a:lnRef>
-              <a:fillRef idx="1">
-                <a:schemeClr val="accent2"/>
-              </a:fillRef>
-              <a:effectRef idx="0">
-                <a:schemeClr val="accent2"/>
-              </a:effectRef>
-              <a:fontRef idx="minor">
-                <a:schemeClr val="lt1"/>
-              </a:fontRef>
-            </p:style>
-            <p:txBody>
-              <a:bodyPr rtlCol="0" anchor="ctr"/>
-              <a:lstStyle/>
-              <a:p>
-                <a:pPr algn="ctr"/>
-                <a:r>
-                  <a:rPr lang="en-US" sz="1600" b="1" dirty="0" smtClean="0"/>
-                  <a:t>_</a:t>
-                </a:r>
-                <a:r>
-                  <a:rPr lang="en-US" sz="1600" b="1" dirty="0" err="1" smtClean="0"/>
-                  <a:t>xyz_Servlet</a:t>
-                </a:r>
-                <a:endParaRPr lang="en-SG" sz="1600" b="1" dirty="0"/>
-              </a:p>
-            </p:txBody>
-          </p:sp>
-          <p:sp>
-            <p:nvSpPr>
-              <p:cNvPr id="233" name="Rectangle 232"/>
-              <p:cNvSpPr/>
-              <p:nvPr/>
-            </p:nvSpPr>
-            <p:spPr>
-              <a:xfrm>
-                <a:off x="2833175" y="2071119"/>
-                <a:ext cx="1466850" cy="609600"/>
-              </a:xfrm>
-              <a:prstGeom prst="rect">
-                <a:avLst/>
-              </a:prstGeom>
-            </p:spPr>
-            <p:style>
-              <a:lnRef idx="2">
-                <a:schemeClr val="accent2">
-                  <a:shade val="50000"/>
-                </a:schemeClr>
-              </a:lnRef>
-              <a:fillRef idx="1">
-                <a:schemeClr val="accent2"/>
-              </a:fillRef>
-              <a:effectRef idx="0">
-                <a:schemeClr val="accent2"/>
-              </a:effectRef>
-              <a:fontRef idx="minor">
-                <a:schemeClr val="lt1"/>
-              </a:fontRef>
-            </p:style>
-            <p:txBody>
-              <a:bodyPr rtlCol="0" anchor="ctr"/>
-              <a:lstStyle/>
-              <a:p>
-                <a:pPr algn="ctr"/>
-                <a:r>
-                  <a:rPr lang="en-US" sz="1600" b="1" dirty="0" smtClean="0"/>
-                  <a:t>_</a:t>
-                </a:r>
-                <a:r>
-                  <a:rPr lang="en-US" sz="1600" b="1" dirty="0" err="1" smtClean="0"/>
-                  <a:t>xyz_Servlet</a:t>
-                </a:r>
-                <a:endParaRPr lang="en-SG" sz="1600" b="1" dirty="0"/>
-              </a:p>
-            </p:txBody>
-          </p:sp>
-        </p:grpSp>
-      </p:grpSp>
+            <a:off x="2967369" y="4699993"/>
+            <a:ext cx="1464715" cy="374591"/>
+          </a:xfrm>
+          <a:prstGeom prst="foldedCorner">
+            <a:avLst/>
+          </a:prstGeom>
+        </p:spPr>
+        <p:style>
+          <a:lnRef idx="2">
+            <a:schemeClr val="accent5">
+              <a:shade val="50000"/>
+            </a:schemeClr>
+          </a:lnRef>
+          <a:fillRef idx="1">
+            <a:schemeClr val="accent5"/>
+          </a:fillRef>
+          <a:effectRef idx="0">
+            <a:schemeClr val="accent5"/>
+          </a:effectRef>
+          <a:fontRef idx="minor">
+            <a:schemeClr val="lt1"/>
+          </a:fontRef>
+        </p:style>
+        <p:txBody>
+          <a:bodyPr rtlCol="0" anchor="ctr"/>
+          <a:lstStyle/>
+          <a:p>
+            <a:pPr algn="ctr"/>
+            <a:r>
+              <a:rPr lang="en-US" sz="1600" b="1" dirty="0" smtClean="0"/>
+              <a:t>*.</a:t>
+            </a:r>
+            <a:r>
+              <a:rPr lang="en-US" sz="1600" b="1" dirty="0" err="1" smtClean="0"/>
+              <a:t>css</a:t>
+            </a:r>
+            <a:endParaRPr lang="en-SG" sz="1600" b="1" dirty="0"/>
+          </a:p>
+        </p:txBody>
+      </p:sp>
+      <p:sp>
+        <p:nvSpPr>
+          <p:cNvPr id="219" name="Folded Corner 218"/>
+          <p:cNvSpPr/>
+          <p:nvPr/>
+        </p:nvSpPr>
+        <p:spPr>
+          <a:xfrm>
+            <a:off x="3009385" y="4770496"/>
+            <a:ext cx="1464715" cy="374591"/>
+          </a:xfrm>
+          <a:prstGeom prst="foldedCorner">
+            <a:avLst/>
+          </a:prstGeom>
+        </p:spPr>
+        <p:style>
+          <a:lnRef idx="2">
+            <a:schemeClr val="accent5">
+              <a:shade val="50000"/>
+            </a:schemeClr>
+          </a:lnRef>
+          <a:fillRef idx="1">
+            <a:schemeClr val="accent5"/>
+          </a:fillRef>
+          <a:effectRef idx="0">
+            <a:schemeClr val="accent5"/>
+          </a:effectRef>
+          <a:fontRef idx="minor">
+            <a:schemeClr val="lt1"/>
+          </a:fontRef>
+        </p:style>
+        <p:txBody>
+          <a:bodyPr rtlCol="0" anchor="ctr"/>
+          <a:lstStyle/>
+          <a:p>
+            <a:pPr algn="ctr"/>
+            <a:r>
+              <a:rPr lang="en-US" sz="1600" b="1" dirty="0" smtClean="0"/>
+              <a:t>*.</a:t>
+            </a:r>
+            <a:r>
+              <a:rPr lang="en-US" sz="1600" b="1" dirty="0" err="1" smtClean="0"/>
+              <a:t>css</a:t>
+            </a:r>
+            <a:endParaRPr lang="en-SG" sz="1600" b="1" dirty="0"/>
+          </a:p>
+        </p:txBody>
+      </p:sp>
       <p:cxnSp>
         <p:nvCxnSpPr>
-          <p:cNvPr id="66" name="Elbow Connector 65"/>
-          <p:cNvCxnSpPr/>
+          <p:cNvPr id="220" name="Elbow Connector 219"/>
+          <p:cNvCxnSpPr>
+            <a:stCxn id="211" idx="2"/>
+            <a:endCxn id="215" idx="1"/>
+          </p:cNvCxnSpPr>
           <p:nvPr/>
         </p:nvCxnSpPr>
         <p:spPr>
-          <a:xfrm rot="10800000">
-            <a:off x="4492298" y="1925985"/>
-            <a:ext cx="846337" cy="1"/>
-          </a:xfrm>
-          <a:prstGeom prst="bentConnector3">
-            <a:avLst>
-              <a:gd name="adj1" fmla="val 50000"/>
-            </a:avLst>
+          <a:xfrm rot="16200000" flipH="1">
+            <a:off x="1833983" y="3002229"/>
+            <a:ext cx="245335" cy="2247900"/>
+          </a:xfrm>
+          <a:prstGeom prst="bentConnector2">
+            <a:avLst/>
           </a:prstGeom>
           <a:ln w="38100">
             <a:solidFill>
-              <a:schemeClr val="accent2">
-                <a:lumMod val="75000"/>
-              </a:schemeClr>
+              <a:schemeClr val="tx1"/>
             </a:solidFill>
-            <a:prstDash val="sysDot"/>
+            <a:prstDash val="sysDash"/>
             <a:tailEnd type="arrow"/>
           </a:ln>
         </p:spPr>
@@ -6065,29 +5225,26 @@
       </p:cxnSp>
       <p:cxnSp>
         <p:nvCxnSpPr>
-          <p:cNvPr id="106" name="Elbow Connector 105"/>
+          <p:cNvPr id="221" name="Elbow Connector 220"/>
           <p:cNvCxnSpPr>
-            <a:stCxn id="141" idx="3"/>
+            <a:stCxn id="211" idx="2"/>
+            <a:endCxn id="219" idx="1"/>
           </p:cNvCxnSpPr>
           <p:nvPr/>
         </p:nvCxnSpPr>
         <p:spPr>
-          <a:xfrm flipV="1">
-            <a:off x="7131951" y="1838517"/>
-            <a:ext cx="749249" cy="1362"/>
-          </a:xfrm>
-          <a:prstGeom prst="bentConnector3">
-            <a:avLst>
-              <a:gd name="adj1" fmla="val 50000"/>
-            </a:avLst>
+          <a:xfrm rot="16200000" flipH="1">
+            <a:off x="1443902" y="3392309"/>
+            <a:ext cx="954280" cy="2176685"/>
+          </a:xfrm>
+          <a:prstGeom prst="bentConnector2">
+            <a:avLst/>
           </a:prstGeom>
           <a:ln w="38100">
             <a:solidFill>
-              <a:schemeClr val="accent2">
-                <a:lumMod val="75000"/>
-              </a:schemeClr>
+              <a:schemeClr val="tx1"/>
             </a:solidFill>
-            <a:prstDash val="sysDot"/>
+            <a:prstDash val="sysDash"/>
             <a:tailEnd type="arrow"/>
           </a:ln>
         </p:spPr>
@@ -6106,6 +5263,544 @@
           </a:fontRef>
         </p:style>
       </p:cxnSp>
+      <p:sp>
+        <p:nvSpPr>
+          <p:cNvPr id="222" name="Folded Corner 221"/>
+          <p:cNvSpPr/>
+          <p:nvPr/>
+        </p:nvSpPr>
+        <p:spPr>
+          <a:xfrm>
+            <a:off x="5528526" y="3684109"/>
+            <a:ext cx="1466850" cy="609600"/>
+          </a:xfrm>
+          <a:prstGeom prst="foldedCorner">
+            <a:avLst/>
+          </a:prstGeom>
+        </p:spPr>
+        <p:style>
+          <a:lnRef idx="2">
+            <a:schemeClr val="accent4">
+              <a:shade val="50000"/>
+            </a:schemeClr>
+          </a:lnRef>
+          <a:fillRef idx="1">
+            <a:schemeClr val="accent4"/>
+          </a:fillRef>
+          <a:effectRef idx="0">
+            <a:schemeClr val="accent4"/>
+          </a:effectRef>
+          <a:fontRef idx="minor">
+            <a:schemeClr val="lt1"/>
+          </a:fontRef>
+        </p:style>
+        <p:txBody>
+          <a:bodyPr rtlCol="0" anchor="ctr"/>
+          <a:lstStyle/>
+          <a:p>
+            <a:pPr algn="ctr"/>
+            <a:r>
+              <a:rPr lang="en-US" sz="1600" b="1" dirty="0" smtClean="0"/>
+              <a:t>_xyz_.</a:t>
+            </a:r>
+            <a:r>
+              <a:rPr lang="en-US" sz="1600" b="1" dirty="0" err="1" smtClean="0"/>
+              <a:t>jsp</a:t>
+            </a:r>
+            <a:endParaRPr lang="en-SG" sz="1600" b="1" dirty="0"/>
+          </a:p>
+        </p:txBody>
+      </p:sp>
+      <p:sp>
+        <p:nvSpPr>
+          <p:cNvPr id="223" name="Folded Corner 222"/>
+          <p:cNvSpPr/>
+          <p:nvPr/>
+        </p:nvSpPr>
+        <p:spPr>
+          <a:xfrm>
+            <a:off x="5606860" y="3738592"/>
+            <a:ext cx="1466850" cy="609600"/>
+          </a:xfrm>
+          <a:prstGeom prst="foldedCorner">
+            <a:avLst/>
+          </a:prstGeom>
+        </p:spPr>
+        <p:style>
+          <a:lnRef idx="2">
+            <a:schemeClr val="accent4">
+              <a:shade val="50000"/>
+            </a:schemeClr>
+          </a:lnRef>
+          <a:fillRef idx="1">
+            <a:schemeClr val="accent4"/>
+          </a:fillRef>
+          <a:effectRef idx="0">
+            <a:schemeClr val="accent4"/>
+          </a:effectRef>
+          <a:fontRef idx="minor">
+            <a:schemeClr val="lt1"/>
+          </a:fontRef>
+        </p:style>
+        <p:txBody>
+          <a:bodyPr rtlCol="0" anchor="ctr"/>
+          <a:lstStyle/>
+          <a:p>
+            <a:pPr algn="ctr"/>
+            <a:r>
+              <a:rPr lang="en-US" sz="1600" b="1" dirty="0" smtClean="0"/>
+              <a:t>_xyz_.</a:t>
+            </a:r>
+            <a:r>
+              <a:rPr lang="en-US" sz="1600" b="1" dirty="0" err="1" smtClean="0"/>
+              <a:t>jsp</a:t>
+            </a:r>
+            <a:endParaRPr lang="en-SG" sz="1600" b="1" dirty="0"/>
+          </a:p>
+        </p:txBody>
+      </p:sp>
+      <p:cxnSp>
+        <p:nvCxnSpPr>
+          <p:cNvPr id="224" name="Elbow Connector 223"/>
+          <p:cNvCxnSpPr>
+            <a:stCxn id="197" idx="3"/>
+            <a:endCxn id="202" idx="1"/>
+          </p:cNvCxnSpPr>
+          <p:nvPr/>
+        </p:nvCxnSpPr>
+        <p:spPr>
+          <a:xfrm flipV="1">
+            <a:off x="4263231" y="1445535"/>
+            <a:ext cx="1217670" cy="2071"/>
+          </a:xfrm>
+          <a:prstGeom prst="bentConnector3">
+            <a:avLst>
+              <a:gd name="adj1" fmla="val 50000"/>
+            </a:avLst>
+          </a:prstGeom>
+          <a:ln w="38100">
+            <a:solidFill>
+              <a:schemeClr val="accent2">
+                <a:lumMod val="75000"/>
+              </a:schemeClr>
+            </a:solidFill>
+            <a:prstDash val="sysDot"/>
+            <a:tailEnd type="arrow"/>
+          </a:ln>
+        </p:spPr>
+        <p:style>
+          <a:lnRef idx="1">
+            <a:schemeClr val="accent1"/>
+          </a:lnRef>
+          <a:fillRef idx="0">
+            <a:schemeClr val="accent1"/>
+          </a:fillRef>
+          <a:effectRef idx="0">
+            <a:schemeClr val="accent1"/>
+          </a:effectRef>
+          <a:fontRef idx="minor">
+            <a:schemeClr val="tx1"/>
+          </a:fontRef>
+        </p:style>
+      </p:cxnSp>
+      <p:cxnSp>
+        <p:nvCxnSpPr>
+          <p:cNvPr id="225" name="Elbow Connector 224"/>
+          <p:cNvCxnSpPr>
+            <a:stCxn id="197" idx="0"/>
+          </p:cNvCxnSpPr>
+          <p:nvPr/>
+        </p:nvCxnSpPr>
+        <p:spPr>
+          <a:xfrm rot="5400000" flipH="1" flipV="1">
+            <a:off x="5640019" y="-982296"/>
+            <a:ext cx="130970" cy="4351396"/>
+          </a:xfrm>
+          <a:prstGeom prst="bentConnector2">
+            <a:avLst/>
+          </a:prstGeom>
+          <a:ln w="38100">
+            <a:solidFill>
+              <a:schemeClr val="tx1"/>
+            </a:solidFill>
+            <a:prstDash val="sysDash"/>
+            <a:tailEnd type="arrow"/>
+          </a:ln>
+        </p:spPr>
+        <p:style>
+          <a:lnRef idx="1">
+            <a:schemeClr val="accent1"/>
+          </a:lnRef>
+          <a:fillRef idx="0">
+            <a:schemeClr val="accent1"/>
+          </a:fillRef>
+          <a:effectRef idx="0">
+            <a:schemeClr val="accent1"/>
+          </a:effectRef>
+          <a:fontRef idx="minor">
+            <a:schemeClr val="tx1"/>
+          </a:fontRef>
+        </p:style>
+      </p:cxnSp>
+      <p:sp>
+        <p:nvSpPr>
+          <p:cNvPr id="226" name="Rounded Rectangle 225"/>
+          <p:cNvSpPr/>
+          <p:nvPr/>
+        </p:nvSpPr>
+        <p:spPr>
+          <a:xfrm>
+            <a:off x="7881200" y="114387"/>
+            <a:ext cx="914400" cy="5525997"/>
+          </a:xfrm>
+          <a:prstGeom prst="roundRect">
+            <a:avLst>
+              <a:gd name="adj" fmla="val 23209"/>
+            </a:avLst>
+          </a:prstGeom>
+          <a:solidFill>
+            <a:schemeClr val="bg1">
+              <a:lumMod val="85000"/>
+            </a:schemeClr>
+          </a:solidFill>
+          <a:ln>
+            <a:solidFill>
+              <a:schemeClr val="bg1">
+                <a:lumMod val="75000"/>
+              </a:schemeClr>
+            </a:solidFill>
+          </a:ln>
+        </p:spPr>
+        <p:style>
+          <a:lnRef idx="2">
+            <a:schemeClr val="accent1">
+              <a:shade val="50000"/>
+            </a:schemeClr>
+          </a:lnRef>
+          <a:fillRef idx="1">
+            <a:schemeClr val="accent1"/>
+          </a:fillRef>
+          <a:effectRef idx="0">
+            <a:schemeClr val="accent1"/>
+          </a:effectRef>
+          <a:fontRef idx="minor">
+            <a:schemeClr val="lt1"/>
+          </a:fontRef>
+        </p:style>
+        <p:txBody>
+          <a:bodyPr vert="vert270" rtlCol="0" anchor="t" anchorCtr="1"/>
+          <a:lstStyle/>
+          <a:p>
+            <a:pPr algn="r"/>
+            <a:r>
+              <a:rPr lang="en-US" sz="1600" b="1" dirty="0" smtClean="0"/>
+              <a:t>Logic</a:t>
+            </a:r>
+            <a:endParaRPr lang="en-SG" sz="1600" b="1" dirty="0"/>
+          </a:p>
+        </p:txBody>
+      </p:sp>
+      <p:sp>
+        <p:nvSpPr>
+          <p:cNvPr id="227" name="Rectangle 226"/>
+          <p:cNvSpPr/>
+          <p:nvPr/>
+        </p:nvSpPr>
+        <p:spPr>
+          <a:xfrm>
+            <a:off x="8338400" y="-36513"/>
+            <a:ext cx="609600" cy="5867400"/>
+          </a:xfrm>
+          <a:prstGeom prst="rect">
+            <a:avLst/>
+          </a:prstGeom>
+          <a:solidFill>
+            <a:schemeClr val="bg1"/>
+          </a:solidFill>
+          <a:ln>
+            <a:noFill/>
+          </a:ln>
+          <a:effectLst>
+            <a:softEdge rad="63500"/>
+          </a:effectLst>
+        </p:spPr>
+        <p:style>
+          <a:lnRef idx="2">
+            <a:schemeClr val="accent1">
+              <a:shade val="50000"/>
+            </a:schemeClr>
+          </a:lnRef>
+          <a:fillRef idx="1">
+            <a:schemeClr val="accent1"/>
+          </a:fillRef>
+          <a:effectRef idx="0">
+            <a:schemeClr val="accent1"/>
+          </a:effectRef>
+          <a:fontRef idx="minor">
+            <a:schemeClr val="lt1"/>
+          </a:fontRef>
+        </p:style>
+        <p:txBody>
+          <a:bodyPr rtlCol="0" anchor="ctr"/>
+          <a:lstStyle/>
+          <a:p>
+            <a:pPr algn="ctr"/>
+            <a:endParaRPr lang="en-SG"/>
+          </a:p>
+        </p:txBody>
+      </p:sp>
+      <p:sp>
+        <p:nvSpPr>
+          <p:cNvPr id="230" name="Rectangle 229"/>
+          <p:cNvSpPr/>
+          <p:nvPr/>
+        </p:nvSpPr>
+        <p:spPr>
+          <a:xfrm>
+            <a:off x="2702894" y="594519"/>
+            <a:ext cx="1466850" cy="377438"/>
+          </a:xfrm>
+          <a:prstGeom prst="rect">
+            <a:avLst/>
+          </a:prstGeom>
+        </p:spPr>
+        <p:style>
+          <a:lnRef idx="2">
+            <a:schemeClr val="accent6">
+              <a:shade val="50000"/>
+            </a:schemeClr>
+          </a:lnRef>
+          <a:fillRef idx="1">
+            <a:schemeClr val="accent6"/>
+          </a:fillRef>
+          <a:effectRef idx="0">
+            <a:schemeClr val="accent6"/>
+          </a:effectRef>
+          <a:fontRef idx="minor">
+            <a:schemeClr val="lt1"/>
+          </a:fontRef>
+        </p:style>
+        <p:txBody>
+          <a:bodyPr rtlCol="0" anchor="ctr"/>
+          <a:lstStyle/>
+          <a:p>
+            <a:pPr algn="ctr"/>
+            <a:r>
+              <a:rPr lang="en-US" sz="1600" b="1" dirty="0" err="1"/>
+              <a:t>LoginFilter</a:t>
+            </a:r>
+            <a:endParaRPr lang="en-SG" sz="1600" b="1" dirty="0"/>
+          </a:p>
+        </p:txBody>
+      </p:sp>
+      <p:sp>
+        <p:nvSpPr>
+          <p:cNvPr id="232" name="Rectangle 231"/>
+          <p:cNvSpPr/>
+          <p:nvPr/>
+        </p:nvSpPr>
+        <p:spPr>
+          <a:xfrm>
+            <a:off x="2770973" y="2030054"/>
+            <a:ext cx="1466850" cy="609600"/>
+          </a:xfrm>
+          <a:prstGeom prst="rect">
+            <a:avLst/>
+          </a:prstGeom>
+        </p:spPr>
+        <p:style>
+          <a:lnRef idx="2">
+            <a:schemeClr val="accent2">
+              <a:shade val="50000"/>
+            </a:schemeClr>
+          </a:lnRef>
+          <a:fillRef idx="1">
+            <a:schemeClr val="accent2"/>
+          </a:fillRef>
+          <a:effectRef idx="0">
+            <a:schemeClr val="accent2"/>
+          </a:effectRef>
+          <a:fontRef idx="minor">
+            <a:schemeClr val="lt1"/>
+          </a:fontRef>
+        </p:style>
+        <p:txBody>
+          <a:bodyPr rtlCol="0" anchor="ctr"/>
+          <a:lstStyle/>
+          <a:p>
+            <a:pPr algn="ctr"/>
+            <a:r>
+              <a:rPr lang="en-US" sz="1600" b="1" dirty="0" smtClean="0"/>
+              <a:t>_</a:t>
+            </a:r>
+            <a:r>
+              <a:rPr lang="en-US" sz="1600" b="1" dirty="0" err="1" smtClean="0"/>
+              <a:t>xyz_Servlet</a:t>
+            </a:r>
+            <a:endParaRPr lang="en-SG" sz="1600" b="1" dirty="0"/>
+          </a:p>
+        </p:txBody>
+      </p:sp>
+      <p:sp>
+        <p:nvSpPr>
+          <p:cNvPr id="233" name="Rectangle 232"/>
+          <p:cNvSpPr/>
+          <p:nvPr/>
+        </p:nvSpPr>
+        <p:spPr>
+          <a:xfrm>
+            <a:off x="2833175" y="2071119"/>
+            <a:ext cx="1466850" cy="609600"/>
+          </a:xfrm>
+          <a:prstGeom prst="rect">
+            <a:avLst/>
+          </a:prstGeom>
+        </p:spPr>
+        <p:style>
+          <a:lnRef idx="2">
+            <a:schemeClr val="accent2">
+              <a:shade val="50000"/>
+            </a:schemeClr>
+          </a:lnRef>
+          <a:fillRef idx="1">
+            <a:schemeClr val="accent2"/>
+          </a:fillRef>
+          <a:effectRef idx="0">
+            <a:schemeClr val="accent2"/>
+          </a:effectRef>
+          <a:fontRef idx="minor">
+            <a:schemeClr val="lt1"/>
+          </a:fontRef>
+        </p:style>
+        <p:txBody>
+          <a:bodyPr rtlCol="0" anchor="ctr"/>
+          <a:lstStyle/>
+          <a:p>
+            <a:pPr algn="ctr"/>
+            <a:r>
+              <a:rPr lang="en-US" sz="1600" b="1" dirty="0" smtClean="0"/>
+              <a:t>_</a:t>
+            </a:r>
+            <a:r>
+              <a:rPr lang="en-US" sz="1600" b="1" dirty="0" err="1" smtClean="0"/>
+              <a:t>xyz_Servlet</a:t>
+            </a:r>
+            <a:endParaRPr lang="en-SG" sz="1600" b="1" dirty="0"/>
+          </a:p>
+        </p:txBody>
+      </p:sp>
+      <p:sp>
+        <p:nvSpPr>
+          <p:cNvPr id="237" name="Rectangle 236"/>
+          <p:cNvSpPr/>
+          <p:nvPr/>
+        </p:nvSpPr>
+        <p:spPr>
+          <a:xfrm>
+            <a:off x="5526281" y="2022345"/>
+            <a:ext cx="1466850" cy="609600"/>
+          </a:xfrm>
+          <a:prstGeom prst="rect">
+            <a:avLst/>
+          </a:prstGeom>
+          <a:solidFill>
+            <a:srgbClr val="92D050"/>
+          </a:solidFill>
+          <a:ln>
+            <a:solidFill>
+              <a:srgbClr val="00B050"/>
+            </a:solidFill>
+          </a:ln>
+        </p:spPr>
+        <p:style>
+          <a:lnRef idx="2">
+            <a:schemeClr val="accent6">
+              <a:shade val="50000"/>
+            </a:schemeClr>
+          </a:lnRef>
+          <a:fillRef idx="1">
+            <a:schemeClr val="accent6"/>
+          </a:fillRef>
+          <a:effectRef idx="0">
+            <a:schemeClr val="accent6"/>
+          </a:effectRef>
+          <a:fontRef idx="minor">
+            <a:schemeClr val="lt1"/>
+          </a:fontRef>
+        </p:style>
+        <p:txBody>
+          <a:bodyPr rtlCol="0" anchor="ctr"/>
+          <a:lstStyle/>
+          <a:p>
+            <a:pPr algn="ctr"/>
+            <a:r>
+              <a:rPr lang="en-US" sz="1600" b="1" dirty="0" smtClean="0"/>
+              <a:t>_</a:t>
+            </a:r>
+            <a:r>
+              <a:rPr lang="en-US" sz="1600" b="1" dirty="0" err="1" smtClean="0"/>
+              <a:t>xyz_Helper</a:t>
+            </a:r>
+            <a:endParaRPr lang="en-SG" sz="1600" b="1" dirty="0"/>
+          </a:p>
+        </p:txBody>
+      </p:sp>
+      <p:sp>
+        <p:nvSpPr>
+          <p:cNvPr id="238" name="Rectangle 237"/>
+          <p:cNvSpPr/>
+          <p:nvPr/>
+        </p:nvSpPr>
+        <p:spPr>
+          <a:xfrm>
+            <a:off x="5604235" y="2065429"/>
+            <a:ext cx="1466850" cy="609600"/>
+          </a:xfrm>
+          <a:prstGeom prst="rect">
+            <a:avLst/>
+          </a:prstGeom>
+          <a:solidFill>
+            <a:srgbClr val="92D050"/>
+          </a:solidFill>
+          <a:ln>
+            <a:solidFill>
+              <a:srgbClr val="00B050"/>
+            </a:solidFill>
+          </a:ln>
+        </p:spPr>
+        <p:style>
+          <a:lnRef idx="2">
+            <a:schemeClr val="accent6">
+              <a:shade val="50000"/>
+            </a:schemeClr>
+          </a:lnRef>
+          <a:fillRef idx="1">
+            <a:schemeClr val="accent6"/>
+          </a:fillRef>
+          <a:effectRef idx="0">
+            <a:schemeClr val="accent6"/>
+          </a:effectRef>
+          <a:fontRef idx="minor">
+            <a:schemeClr val="lt1"/>
+          </a:fontRef>
+        </p:style>
+        <p:txBody>
+          <a:bodyPr rtlCol="0" anchor="ctr"/>
+          <a:lstStyle/>
+          <a:p>
+            <a:pPr algn="ctr"/>
+            <a:r>
+              <a:rPr lang="en-US" sz="1600" b="1" dirty="0" smtClean="0"/>
+              <a:t>_</a:t>
+            </a:r>
+            <a:r>
+              <a:rPr lang="en-US" sz="1600" b="1" dirty="0" err="1" smtClean="0"/>
+              <a:t>xyz_Helper</a:t>
+            </a:r>
+            <a:endParaRPr lang="en-SG" sz="1600" b="1" dirty="0"/>
+          </a:p>
+        </p:txBody>
+      </p:sp>
     </p:spTree>
     <p:extLst>
       <p:ext uri="{BB962C8B-B14F-4D97-AF65-F5344CB8AC3E}">

</xml_diff>